<commit_message>
Actualizada presentación con datos de validación de ontología y actualización de la ontología ROH
</commit_message>
<xml_diff>
--- a/20200109 HERCULES ASIO -ROH-Validación.pptx
+++ b/20200109 HERCULES ASIO -ROH-Validación.pptx
@@ -5,19 +5,31 @@
     <p:sldMasterId id="2147483660" r:id="rId1"/>
   </p:sldMasterIdLst>
   <p:notesMasterIdLst>
-    <p:notesMasterId r:id="rId12"/>
+    <p:notesMasterId r:id="rId24"/>
   </p:notesMasterIdLst>
   <p:sldIdLst>
     <p:sldId id="256" r:id="rId2"/>
     <p:sldId id="261" r:id="rId3"/>
     <p:sldId id="294" r:id="rId4"/>
-    <p:sldId id="272" r:id="rId5"/>
-    <p:sldId id="287" r:id="rId6"/>
-    <p:sldId id="290" r:id="rId7"/>
-    <p:sldId id="291" r:id="rId8"/>
-    <p:sldId id="293" r:id="rId9"/>
-    <p:sldId id="292" r:id="rId10"/>
-    <p:sldId id="288" r:id="rId11"/>
+    <p:sldId id="295" r:id="rId5"/>
+    <p:sldId id="272" r:id="rId6"/>
+    <p:sldId id="287" r:id="rId7"/>
+    <p:sldId id="290" r:id="rId8"/>
+    <p:sldId id="291" r:id="rId9"/>
+    <p:sldId id="293" r:id="rId10"/>
+    <p:sldId id="292" r:id="rId11"/>
+    <p:sldId id="288" r:id="rId12"/>
+    <p:sldId id="297" r:id="rId13"/>
+    <p:sldId id="298" r:id="rId14"/>
+    <p:sldId id="299" r:id="rId15"/>
+    <p:sldId id="300" r:id="rId16"/>
+    <p:sldId id="301" r:id="rId17"/>
+    <p:sldId id="302" r:id="rId18"/>
+    <p:sldId id="303" r:id="rId19"/>
+    <p:sldId id="304" r:id="rId20"/>
+    <p:sldId id="305" r:id="rId21"/>
+    <p:sldId id="306" r:id="rId22"/>
+    <p:sldId id="307" r:id="rId23"/>
   </p:sldIdLst>
   <p:sldSz cx="12192000" cy="6858000"/>
   <p:notesSz cx="6858000" cy="9144000"/>
@@ -124,6 +136,7 @@
             <p14:sldId id="256"/>
             <p14:sldId id="261"/>
             <p14:sldId id="294"/>
+            <p14:sldId id="295"/>
             <p14:sldId id="272"/>
             <p14:sldId id="287"/>
             <p14:sldId id="290"/>
@@ -131,6 +144,17 @@
             <p14:sldId id="293"/>
             <p14:sldId id="292"/>
             <p14:sldId id="288"/>
+            <p14:sldId id="297"/>
+            <p14:sldId id="298"/>
+            <p14:sldId id="299"/>
+            <p14:sldId id="300"/>
+            <p14:sldId id="301"/>
+            <p14:sldId id="302"/>
+            <p14:sldId id="303"/>
+            <p14:sldId id="304"/>
+            <p14:sldId id="305"/>
+            <p14:sldId id="306"/>
+            <p14:sldId id="307"/>
           </p14:sldIdLst>
         </p14:section>
       </p14:sectionLst>
@@ -227,7 +251,7 @@
           <a:p>
             <a:fld id="{56E48EA3-3722-4C34-A311-3963E6171647}" type="datetimeFigureOut">
               <a:rPr lang="en-GB" smtClean="0"/>
-              <a:t>05/02/2020</a:t>
+              <a:t>06/02/2020</a:t>
             </a:fld>
             <a:endParaRPr lang="en-GB"/>
           </a:p>
@@ -3343,6 +3367,127 @@
         </p:nvSpPr>
         <p:spPr>
           <a:xfrm>
+            <a:off x="600364" y="1459343"/>
+            <a:ext cx="10935854" cy="3108543"/>
+          </a:xfrm>
+          <a:prstGeom prst="rect">
+            <a:avLst/>
+          </a:prstGeom>
+          <a:noFill/>
+        </p:spPr>
+        <p:txBody>
+          <a:bodyPr wrap="square" rtlCol="0">
+            <a:spAutoFit/>
+          </a:bodyPr>
+          <a:lstStyle/>
+          <a:p>
+            <a:r>
+              <a:rPr lang="es-ES" sz="2800" dirty="0">
+                <a:solidFill>
+                  <a:srgbClr val="6494ED"/>
+                </a:solidFill>
+                <a:latin typeface="Hypatia Sans Pro" panose="020B0502020204020303" pitchFamily="34" charset="0"/>
+                <a:ea typeface="+mj-ea"/>
+                <a:cs typeface="+mj-cs"/>
+              </a:rPr>
+              <a:t>Reflexiones análisis preguntas de competencia: Rangos de valores</a:t>
+            </a:r>
+          </a:p>
+          <a:p>
+            <a:endParaRPr lang="es-ES" sz="2400" dirty="0"/>
+          </a:p>
+          <a:p>
+            <a:pPr marL="342900" indent="-342900">
+              <a:buFont typeface="Wingdings" panose="05000000000000000000" pitchFamily="2" charset="2"/>
+              <a:buChar char="q"/>
+            </a:pPr>
+            <a:r>
+              <a:rPr lang="es-ES" sz="2400" dirty="0" err="1"/>
+              <a:t>FundingProgram</a:t>
+            </a:r>
+            <a:r>
+              <a:rPr lang="es-ES" sz="2400" dirty="0"/>
+              <a:t>, necesario añadir instancias de programas de financiación, considerar que en un programa como H2020 hay diferentes </a:t>
+            </a:r>
+            <a:r>
+              <a:rPr lang="es-ES" sz="2400" dirty="0" err="1"/>
+              <a:t>topics</a:t>
+            </a:r>
+            <a:endParaRPr lang="es-ES" sz="2400" dirty="0"/>
+          </a:p>
+          <a:p>
+            <a:pPr marL="342900" indent="-342900">
+              <a:buFont typeface="Wingdings" panose="05000000000000000000" pitchFamily="2" charset="2"/>
+              <a:buChar char="q"/>
+            </a:pPr>
+            <a:r>
+              <a:rPr lang="es-ES" sz="2400" dirty="0"/>
+              <a:t>Position, necesario añadir todas las posibles </a:t>
+            </a:r>
+          </a:p>
+          <a:p>
+            <a:pPr marL="342900" indent="-342900">
+              <a:buFont typeface="Arial" panose="020B0604020202020204" pitchFamily="34" charset="0"/>
+              <a:buChar char="•"/>
+            </a:pPr>
+            <a:endParaRPr lang="es-ES" sz="2400" dirty="0"/>
+          </a:p>
+          <a:p>
+            <a:pPr marL="342900" indent="-342900">
+              <a:buFont typeface="Wingdings" panose="05000000000000000000" pitchFamily="2" charset="2"/>
+              <a:buChar char="q"/>
+            </a:pPr>
+            <a:endParaRPr lang="es-ES" sz="2400" dirty="0"/>
+          </a:p>
+          <a:p>
+            <a:endParaRPr lang="es-ES" sz="2400" dirty="0"/>
+          </a:p>
+        </p:txBody>
+      </p:sp>
+    </p:spTree>
+    <p:extLst>
+      <p:ext uri="{BB962C8B-B14F-4D97-AF65-F5344CB8AC3E}">
+        <p14:creationId xmlns:p14="http://schemas.microsoft.com/office/powerpoint/2010/main" val="1208421197"/>
+      </p:ext>
+    </p:extLst>
+  </p:cSld>
+  <p:clrMapOvr>
+    <a:masterClrMapping/>
+  </p:clrMapOvr>
+</p:sld>
+</file>
+
+<file path=ppt/slides/slide11.xml><?xml version="1.0" encoding="utf-8"?>
+<p:sld xmlns:a="http://schemas.openxmlformats.org/drawingml/2006/main" xmlns:r="http://schemas.openxmlformats.org/officeDocument/2006/relationships" xmlns:p="http://schemas.openxmlformats.org/presentationml/2006/main">
+  <p:cSld>
+    <p:spTree>
+      <p:nvGrpSpPr>
+        <p:cNvPr id="1" name=""/>
+        <p:cNvGrpSpPr/>
+        <p:nvPr/>
+      </p:nvGrpSpPr>
+      <p:grpSpPr>
+        <a:xfrm>
+          <a:off x="0" y="0"/>
+          <a:ext cx="0" cy="0"/>
+          <a:chOff x="0" y="0"/>
+          <a:chExt cx="0" cy="0"/>
+        </a:xfrm>
+      </p:grpSpPr>
+      <p:sp>
+        <p:nvSpPr>
+          <p:cNvPr id="2" name="CuadroTexto 1">
+            <a:extLst>
+              <a:ext uri="{FF2B5EF4-FFF2-40B4-BE49-F238E27FC236}">
+                <a16:creationId xmlns:a16="http://schemas.microsoft.com/office/drawing/2014/main" id="{C2868FB5-BED5-419D-A369-D81E9F984AF1}"/>
+              </a:ext>
+            </a:extLst>
+          </p:cNvPr>
+          <p:cNvSpPr txBox="1"/>
+          <p:nvPr/>
+        </p:nvSpPr>
+        <p:spPr>
+          <a:xfrm>
             <a:off x="600364" y="1277830"/>
             <a:ext cx="10935854" cy="5078313"/>
           </a:xfrm>
@@ -3526,6 +3671,1596 @@
     <p:extLst>
       <p:ext uri="{BB962C8B-B14F-4D97-AF65-F5344CB8AC3E}">
         <p14:creationId xmlns:p14="http://schemas.microsoft.com/office/powerpoint/2010/main" val="795448152"/>
+      </p:ext>
+    </p:extLst>
+  </p:cSld>
+  <p:clrMapOvr>
+    <a:masterClrMapping/>
+  </p:clrMapOvr>
+</p:sld>
+</file>
+
+<file path=ppt/slides/slide12.xml><?xml version="1.0" encoding="utf-8"?>
+<p:sld xmlns:a="http://schemas.openxmlformats.org/drawingml/2006/main" xmlns:r="http://schemas.openxmlformats.org/officeDocument/2006/relationships" xmlns:p="http://schemas.openxmlformats.org/presentationml/2006/main">
+  <p:cSld>
+    <p:spTree>
+      <p:nvGrpSpPr>
+        <p:cNvPr id="1" name=""/>
+        <p:cNvGrpSpPr/>
+        <p:nvPr/>
+      </p:nvGrpSpPr>
+      <p:grpSpPr>
+        <a:xfrm>
+          <a:off x="0" y="0"/>
+          <a:ext cx="0" cy="0"/>
+          <a:chOff x="0" y="0"/>
+          <a:chExt cx="0" cy="0"/>
+        </a:xfrm>
+      </p:grpSpPr>
+      <p:sp>
+        <p:nvSpPr>
+          <p:cNvPr id="2" name="CuadroTexto 1">
+            <a:extLst>
+              <a:ext uri="{FF2B5EF4-FFF2-40B4-BE49-F238E27FC236}">
+                <a16:creationId xmlns:a16="http://schemas.microsoft.com/office/drawing/2014/main" id="{C2868FB5-BED5-419D-A369-D81E9F984AF1}"/>
+              </a:ext>
+            </a:extLst>
+          </p:cNvPr>
+          <p:cNvSpPr txBox="1"/>
+          <p:nvPr/>
+        </p:nvSpPr>
+        <p:spPr>
+          <a:xfrm>
+            <a:off x="600364" y="1277830"/>
+            <a:ext cx="10935854" cy="4770537"/>
+          </a:xfrm>
+          <a:prstGeom prst="rect">
+            <a:avLst/>
+          </a:prstGeom>
+          <a:noFill/>
+        </p:spPr>
+        <p:txBody>
+          <a:bodyPr wrap="square" rtlCol="0">
+            <a:spAutoFit/>
+          </a:bodyPr>
+          <a:lstStyle/>
+          <a:p>
+            <a:r>
+              <a:rPr lang="es-ES" sz="2400" dirty="0">
+                <a:solidFill>
+                  <a:srgbClr val="6494ED"/>
+                </a:solidFill>
+                <a:latin typeface="Hypatia Sans Pro" panose="020B0502020204020303" pitchFamily="34" charset="0"/>
+                <a:ea typeface="+mj-ea"/>
+                <a:cs typeface="+mj-cs"/>
+              </a:rPr>
+              <a:t>Revisión del </a:t>
+            </a:r>
+            <a:r>
+              <a:rPr lang="es-ES" sz="2400" dirty="0" err="1">
+                <a:solidFill>
+                  <a:srgbClr val="6494ED"/>
+                </a:solidFill>
+                <a:latin typeface="Hypatia Sans Pro" panose="020B0502020204020303" pitchFamily="34" charset="0"/>
+                <a:ea typeface="+mj-ea"/>
+                <a:cs typeface="+mj-cs"/>
+              </a:rPr>
+              <a:t>dump</a:t>
+            </a:r>
+            <a:r>
+              <a:rPr lang="es-ES" sz="2400" dirty="0">
+                <a:solidFill>
+                  <a:srgbClr val="6494ED"/>
+                </a:solidFill>
+                <a:latin typeface="Hypatia Sans Pro" panose="020B0502020204020303" pitchFamily="34" charset="0"/>
+                <a:ea typeface="+mj-ea"/>
+                <a:cs typeface="+mj-cs"/>
+              </a:rPr>
+              <a:t> de Universidad de Murcia</a:t>
+            </a:r>
+          </a:p>
+          <a:p>
+            <a:endParaRPr lang="es-ES" sz="2000" dirty="0"/>
+          </a:p>
+          <a:p>
+            <a:pPr marL="342900" indent="-342900">
+              <a:buFont typeface="Wingdings" panose="05000000000000000000" pitchFamily="2" charset="2"/>
+              <a:buChar char="q"/>
+            </a:pPr>
+            <a:r>
+              <a:rPr lang="es-ES" sz="2000" dirty="0"/>
+              <a:t>Proyectos y su gestión</a:t>
+            </a:r>
+          </a:p>
+          <a:p>
+            <a:pPr marL="342900" indent="-342900">
+              <a:buFont typeface="Wingdings" panose="05000000000000000000" pitchFamily="2" charset="2"/>
+              <a:buChar char="q"/>
+            </a:pPr>
+            <a:r>
+              <a:rPr lang="es-ES" sz="2000" dirty="0"/>
+              <a:t>Recursos humanos</a:t>
+            </a:r>
+          </a:p>
+          <a:p>
+            <a:pPr marL="342900" indent="-342900">
+              <a:buFont typeface="Wingdings" panose="05000000000000000000" pitchFamily="2" charset="2"/>
+              <a:buChar char="q"/>
+            </a:pPr>
+            <a:r>
+              <a:rPr lang="es-ES" sz="2000" dirty="0"/>
+              <a:t>Ayudas</a:t>
+            </a:r>
+          </a:p>
+          <a:p>
+            <a:pPr marL="342900" indent="-342900">
+              <a:buFont typeface="Wingdings" panose="05000000000000000000" pitchFamily="2" charset="2"/>
+              <a:buChar char="q"/>
+            </a:pPr>
+            <a:r>
+              <a:rPr lang="es-ES" sz="2000" dirty="0"/>
+              <a:t>Contratos</a:t>
+            </a:r>
+          </a:p>
+          <a:p>
+            <a:pPr marL="342900" indent="-342900">
+              <a:buFont typeface="Wingdings" panose="05000000000000000000" pitchFamily="2" charset="2"/>
+              <a:buChar char="q"/>
+            </a:pPr>
+            <a:r>
+              <a:rPr lang="es-ES" sz="2000" dirty="0"/>
+              <a:t>Grupos de investigación</a:t>
+            </a:r>
+          </a:p>
+          <a:p>
+            <a:pPr marL="342900" indent="-342900">
+              <a:buFont typeface="Wingdings" panose="05000000000000000000" pitchFamily="2" charset="2"/>
+              <a:buChar char="q"/>
+            </a:pPr>
+            <a:r>
+              <a:rPr lang="es-ES" sz="2000" dirty="0"/>
+              <a:t>Otros tipos de proyectos</a:t>
+            </a:r>
+          </a:p>
+          <a:p>
+            <a:pPr marL="342900" indent="-342900">
+              <a:buFont typeface="Wingdings" panose="05000000000000000000" pitchFamily="2" charset="2"/>
+              <a:buChar char="q"/>
+            </a:pPr>
+            <a:r>
+              <a:rPr lang="es-ES" sz="2000" dirty="0"/>
+              <a:t>Actividades</a:t>
+            </a:r>
+          </a:p>
+          <a:p>
+            <a:pPr marL="342900" indent="-342900">
+              <a:buFont typeface="Wingdings" panose="05000000000000000000" pitchFamily="2" charset="2"/>
+              <a:buChar char="q"/>
+            </a:pPr>
+            <a:r>
+              <a:rPr lang="es-ES" sz="2000" dirty="0"/>
+              <a:t>Patentes</a:t>
+            </a:r>
+          </a:p>
+          <a:p>
+            <a:pPr marL="342900" indent="-342900">
+              <a:buFont typeface="Wingdings" panose="05000000000000000000" pitchFamily="2" charset="2"/>
+              <a:buChar char="q"/>
+            </a:pPr>
+            <a:endParaRPr lang="es-ES" sz="2000" dirty="0"/>
+          </a:p>
+          <a:p>
+            <a:pPr marL="342900" indent="-342900">
+              <a:buFont typeface="Wingdings" panose="05000000000000000000" pitchFamily="2" charset="2"/>
+              <a:buChar char="q"/>
+            </a:pPr>
+            <a:endParaRPr lang="es-ES" sz="2000" dirty="0"/>
+          </a:p>
+          <a:p>
+            <a:pPr marL="342900" indent="-342900">
+              <a:buFont typeface="Wingdings" panose="05000000000000000000" pitchFamily="2" charset="2"/>
+              <a:buChar char="q"/>
+            </a:pPr>
+            <a:r>
+              <a:rPr lang="es-ES" sz="2000" dirty="0"/>
+              <a:t>El objetivo de esta revisión es ver qué entraría dentro del SCOPE del proyecto y qué no. </a:t>
+            </a:r>
+          </a:p>
+          <a:p>
+            <a:endParaRPr lang="es-ES" sz="2000" dirty="0"/>
+          </a:p>
+          <a:p>
+            <a:endParaRPr lang="es-ES" sz="2000" dirty="0"/>
+          </a:p>
+        </p:txBody>
+      </p:sp>
+    </p:spTree>
+    <p:extLst>
+      <p:ext uri="{BB962C8B-B14F-4D97-AF65-F5344CB8AC3E}">
+        <p14:creationId xmlns:p14="http://schemas.microsoft.com/office/powerpoint/2010/main" val="1049052564"/>
+      </p:ext>
+    </p:extLst>
+  </p:cSld>
+  <p:clrMapOvr>
+    <a:masterClrMapping/>
+  </p:clrMapOvr>
+</p:sld>
+</file>
+
+<file path=ppt/slides/slide13.xml><?xml version="1.0" encoding="utf-8"?>
+<p:sld xmlns:a="http://schemas.openxmlformats.org/drawingml/2006/main" xmlns:r="http://schemas.openxmlformats.org/officeDocument/2006/relationships" xmlns:p="http://schemas.openxmlformats.org/presentationml/2006/main">
+  <p:cSld>
+    <p:spTree>
+      <p:nvGrpSpPr>
+        <p:cNvPr id="1" name=""/>
+        <p:cNvGrpSpPr/>
+        <p:nvPr/>
+      </p:nvGrpSpPr>
+      <p:grpSpPr>
+        <a:xfrm>
+          <a:off x="0" y="0"/>
+          <a:ext cx="0" cy="0"/>
+          <a:chOff x="0" y="0"/>
+          <a:chExt cx="0" cy="0"/>
+        </a:xfrm>
+      </p:grpSpPr>
+      <p:sp>
+        <p:nvSpPr>
+          <p:cNvPr id="2" name="CuadroTexto 1">
+            <a:extLst>
+              <a:ext uri="{FF2B5EF4-FFF2-40B4-BE49-F238E27FC236}">
+                <a16:creationId xmlns:a16="http://schemas.microsoft.com/office/drawing/2014/main" id="{C2868FB5-BED5-419D-A369-D81E9F984AF1}"/>
+              </a:ext>
+            </a:extLst>
+          </p:cNvPr>
+          <p:cNvSpPr txBox="1"/>
+          <p:nvPr/>
+        </p:nvSpPr>
+        <p:spPr>
+          <a:xfrm>
+            <a:off x="600364" y="1277830"/>
+            <a:ext cx="10935854" cy="6494085"/>
+          </a:xfrm>
+          <a:prstGeom prst="rect">
+            <a:avLst/>
+          </a:prstGeom>
+          <a:noFill/>
+        </p:spPr>
+        <p:txBody>
+          <a:bodyPr wrap="square" rtlCol="0">
+            <a:spAutoFit/>
+          </a:bodyPr>
+          <a:lstStyle/>
+          <a:p>
+            <a:r>
+              <a:rPr lang="es-ES" sz="2400" dirty="0">
+                <a:solidFill>
+                  <a:srgbClr val="6494ED"/>
+                </a:solidFill>
+                <a:latin typeface="Hypatia Sans Pro" panose="020B0502020204020303" pitchFamily="34" charset="0"/>
+                <a:ea typeface="+mj-ea"/>
+                <a:cs typeface="+mj-cs"/>
+              </a:rPr>
+              <a:t>Revisión del </a:t>
+            </a:r>
+            <a:r>
+              <a:rPr lang="es-ES" sz="2400" dirty="0" err="1">
+                <a:solidFill>
+                  <a:srgbClr val="6494ED"/>
+                </a:solidFill>
+                <a:latin typeface="Hypatia Sans Pro" panose="020B0502020204020303" pitchFamily="34" charset="0"/>
+                <a:ea typeface="+mj-ea"/>
+                <a:cs typeface="+mj-cs"/>
+              </a:rPr>
+              <a:t>dump</a:t>
+            </a:r>
+            <a:r>
+              <a:rPr lang="es-ES" sz="2400" dirty="0">
+                <a:solidFill>
+                  <a:srgbClr val="6494ED"/>
+                </a:solidFill>
+                <a:latin typeface="Hypatia Sans Pro" panose="020B0502020204020303" pitchFamily="34" charset="0"/>
+                <a:ea typeface="+mj-ea"/>
+                <a:cs typeface="+mj-cs"/>
+              </a:rPr>
+              <a:t> de Universidad de Murcia: Proyectos y su gestión</a:t>
+            </a:r>
+          </a:p>
+          <a:p>
+            <a:endParaRPr lang="es-ES" sz="2000" dirty="0"/>
+          </a:p>
+          <a:p>
+            <a:pPr marL="342900" indent="-342900">
+              <a:buFont typeface="Wingdings" panose="05000000000000000000" pitchFamily="2" charset="2"/>
+              <a:buChar char="q"/>
+            </a:pPr>
+            <a:r>
+              <a:rPr lang="es-ES" sz="2000" dirty="0"/>
+              <a:t>¿</a:t>
+            </a:r>
+            <a:r>
+              <a:rPr lang="es-ES" sz="1600" dirty="0"/>
+              <a:t>A qué nos referimos orígenes en Proyectos?</a:t>
+            </a:r>
+          </a:p>
+          <a:p>
+            <a:pPr marL="800100" lvl="1" indent="-342900">
+              <a:buFont typeface="Arial" panose="020B0604020202020204" pitchFamily="34" charset="0"/>
+              <a:buChar char="•"/>
+            </a:pPr>
+            <a:r>
+              <a:rPr lang="es-ES" sz="1600" dirty="0"/>
+              <a:t>Interpretamos que puede referirse a:</a:t>
+            </a:r>
+          </a:p>
+          <a:p>
+            <a:pPr marL="1257300" lvl="2" indent="-342900">
+              <a:buFont typeface="Arial" panose="020B0604020202020204" pitchFamily="34" charset="0"/>
+              <a:buChar char="•"/>
+            </a:pPr>
+            <a:r>
+              <a:rPr lang="es-ES" sz="1600" dirty="0" err="1"/>
+              <a:t>Contract</a:t>
+            </a:r>
+            <a:r>
+              <a:rPr lang="es-ES" sz="1600" dirty="0"/>
+              <a:t> asociado a un Project</a:t>
+            </a:r>
+          </a:p>
+          <a:p>
+            <a:pPr marL="1257300" lvl="2" indent="-342900">
+              <a:buFont typeface="Arial" panose="020B0604020202020204" pitchFamily="34" charset="0"/>
+              <a:buChar char="•"/>
+            </a:pPr>
+            <a:r>
+              <a:rPr lang="es-ES" sz="1600" dirty="0" err="1"/>
+              <a:t>ProjectFunding</a:t>
+            </a:r>
+            <a:r>
+              <a:rPr lang="es-ES" sz="1600" dirty="0"/>
+              <a:t> asociado a Project</a:t>
+            </a:r>
+          </a:p>
+          <a:p>
+            <a:pPr marL="342900" indent="-342900">
+              <a:buFont typeface="Wingdings" panose="05000000000000000000" pitchFamily="2" charset="2"/>
+              <a:buChar char="q"/>
+            </a:pPr>
+            <a:r>
+              <a:rPr lang="es-ES" sz="1600" dirty="0"/>
+              <a:t>Añadido propiedad </a:t>
+            </a:r>
+            <a:r>
+              <a:rPr lang="es-ES" sz="1600" dirty="0" err="1"/>
+              <a:t>parentProject</a:t>
+            </a:r>
+            <a:r>
+              <a:rPr lang="es-ES" sz="1600" dirty="0"/>
+              <a:t> y </a:t>
+            </a:r>
+            <a:r>
+              <a:rPr lang="es-ES" sz="1600" dirty="0" err="1"/>
+              <a:t>childProject</a:t>
+            </a:r>
+            <a:r>
+              <a:rPr lang="es-ES" sz="1600" dirty="0"/>
+              <a:t> para asegurar jerarquía entre proyectos</a:t>
+            </a:r>
+          </a:p>
+          <a:p>
+            <a:pPr marL="342900" indent="-342900">
+              <a:buFont typeface="Wingdings" panose="05000000000000000000" pitchFamily="2" charset="2"/>
+              <a:buChar char="q"/>
+            </a:pPr>
+            <a:r>
+              <a:rPr lang="es-ES" sz="1600" dirty="0"/>
+              <a:t>Añadido relación entre Project y </a:t>
+            </a:r>
+            <a:r>
+              <a:rPr lang="es-ES" sz="1600" dirty="0" err="1"/>
+              <a:t>Proposal</a:t>
+            </a:r>
+            <a:r>
+              <a:rPr lang="es-ES" sz="1600" dirty="0"/>
+              <a:t> (propuesta) y </a:t>
+            </a:r>
+            <a:r>
+              <a:rPr lang="es-ES" sz="1600" dirty="0" err="1"/>
+              <a:t>Report</a:t>
+            </a:r>
+            <a:r>
+              <a:rPr lang="es-ES" sz="1600" dirty="0"/>
+              <a:t> (justificaciones)</a:t>
+            </a:r>
+          </a:p>
+          <a:p>
+            <a:pPr marL="342900" indent="-342900">
+              <a:buFont typeface="Wingdings" panose="05000000000000000000" pitchFamily="2" charset="2"/>
+              <a:buChar char="q"/>
+            </a:pPr>
+            <a:r>
+              <a:rPr lang="es-ES" sz="1600" dirty="0"/>
+              <a:t>Tipo LIMITATIVO y FINALISTA, no añadido de momento, ¿es algo estándar y a incluir en el modelado del proyecto dentro de los tipos del proyecto?</a:t>
+            </a:r>
+          </a:p>
+          <a:p>
+            <a:pPr marL="342900" indent="-342900">
+              <a:buFont typeface="Wingdings" panose="05000000000000000000" pitchFamily="2" charset="2"/>
+              <a:buChar char="q"/>
+            </a:pPr>
+            <a:r>
+              <a:rPr lang="es-ES" sz="1600" dirty="0"/>
+              <a:t>Fechas de proyectos, sólo contemplamos fecha de inicio y fin</a:t>
+            </a:r>
+          </a:p>
+          <a:p>
+            <a:pPr marL="800100" lvl="1" indent="-342900">
+              <a:buFont typeface="Arial" panose="020B0604020202020204" pitchFamily="34" charset="0"/>
+              <a:buChar char="•"/>
+            </a:pPr>
+            <a:r>
+              <a:rPr lang="es-ES" sz="1600" dirty="0"/>
+              <a:t>¿debemos complicar modelo para incluir también inicio/fin expediente/facturación, </a:t>
+            </a:r>
+            <a:r>
+              <a:rPr lang="es-ES" sz="1600" dirty="0" err="1"/>
+              <a:t>etc</a:t>
+            </a:r>
+            <a:r>
+              <a:rPr lang="es-ES" sz="1600" dirty="0"/>
+              <a:t>?</a:t>
+            </a:r>
+          </a:p>
+          <a:p>
+            <a:pPr marL="800100" lvl="1" indent="-342900">
+              <a:buFont typeface="Arial" panose="020B0604020202020204" pitchFamily="34" charset="0"/>
+              <a:buChar char="•"/>
+            </a:pPr>
+            <a:r>
+              <a:rPr lang="es-ES" sz="1600" dirty="0"/>
+              <a:t>¿debemos poder registrar cambios de fecha y motivos?</a:t>
+            </a:r>
+          </a:p>
+          <a:p>
+            <a:pPr marL="342900" indent="-342900">
+              <a:buFont typeface="Wingdings" panose="05000000000000000000" pitchFamily="2" charset="2"/>
+              <a:buChar char="q"/>
+            </a:pPr>
+            <a:r>
+              <a:rPr lang="es-ES" sz="1600" dirty="0"/>
+              <a:t>Anualidades, no recogido explícitamente, recogemos la duración del proyecto y el </a:t>
+            </a:r>
+            <a:r>
+              <a:rPr lang="es-ES" sz="1600" dirty="0" err="1"/>
+              <a:t>funding</a:t>
+            </a:r>
+            <a:r>
+              <a:rPr lang="es-ES" sz="1600" dirty="0"/>
+              <a:t> año a año</a:t>
+            </a:r>
+          </a:p>
+          <a:p>
+            <a:pPr marL="342900" indent="-342900">
+              <a:buFont typeface="Wingdings" panose="05000000000000000000" pitchFamily="2" charset="2"/>
+              <a:buChar char="q"/>
+            </a:pPr>
+            <a:r>
+              <a:rPr lang="es-ES" sz="1600" dirty="0"/>
+              <a:t>En los importes no distinguimos entre solicitado y concedido, sólo recogemos concedido</a:t>
+            </a:r>
+          </a:p>
+          <a:p>
+            <a:pPr marL="342900" indent="-342900">
+              <a:buFont typeface="Wingdings" panose="05000000000000000000" pitchFamily="2" charset="2"/>
+              <a:buChar char="q"/>
+            </a:pPr>
+            <a:r>
+              <a:rPr lang="es-ES" sz="1600" dirty="0"/>
+              <a:t>No recogemos información de impuestos repercutidos</a:t>
+            </a:r>
+          </a:p>
+          <a:p>
+            <a:pPr marL="342900" indent="-342900">
+              <a:buFont typeface="Wingdings" panose="05000000000000000000" pitchFamily="2" charset="2"/>
+              <a:buChar char="q"/>
+            </a:pPr>
+            <a:r>
+              <a:rPr lang="es-ES" sz="1600" dirty="0"/>
+              <a:t>No recogemos previsión de gastos de proyectos, pero sí detalles de gastos e ingresos reales</a:t>
+            </a:r>
+          </a:p>
+          <a:p>
+            <a:pPr marL="342900" indent="-342900">
+              <a:buFont typeface="Wingdings" panose="05000000000000000000" pitchFamily="2" charset="2"/>
+              <a:buChar char="q"/>
+            </a:pPr>
+            <a:r>
+              <a:rPr lang="es-ES" sz="1600" dirty="0"/>
+              <a:t>No recogemos información sobre facturas a emitir</a:t>
+            </a:r>
+          </a:p>
+          <a:p>
+            <a:pPr marL="342900" indent="-342900">
+              <a:buFont typeface="Wingdings" panose="05000000000000000000" pitchFamily="2" charset="2"/>
+              <a:buChar char="q"/>
+            </a:pPr>
+            <a:r>
+              <a:rPr lang="es-ES" sz="1600" dirty="0"/>
+              <a:t>No están modelados los periodos y plazos de justificación de proyectos ni tampoco el ciclo de vida de las justificaciones </a:t>
+            </a:r>
+          </a:p>
+          <a:p>
+            <a:pPr marL="342900" indent="-342900">
+              <a:buFont typeface="Wingdings" panose="05000000000000000000" pitchFamily="2" charset="2"/>
+              <a:buChar char="q"/>
+            </a:pPr>
+            <a:r>
+              <a:rPr lang="es-ES" sz="1600" dirty="0"/>
+              <a:t>No está recogida información sobre las auditorías de los proyectos en el modelo ontológico</a:t>
+            </a:r>
+          </a:p>
+          <a:p>
+            <a:pPr marL="342900" indent="-342900">
+              <a:buFont typeface="Wingdings" panose="05000000000000000000" pitchFamily="2" charset="2"/>
+              <a:buChar char="q"/>
+            </a:pPr>
+            <a:endParaRPr lang="es-ES" sz="2000" dirty="0"/>
+          </a:p>
+          <a:p>
+            <a:pPr marL="800100" lvl="1" indent="-342900">
+              <a:buFont typeface="Arial" panose="020B0604020202020204" pitchFamily="34" charset="0"/>
+              <a:buChar char="•"/>
+            </a:pPr>
+            <a:endParaRPr lang="es-ES" sz="2000" dirty="0"/>
+          </a:p>
+          <a:p>
+            <a:endParaRPr lang="es-ES" sz="2000" dirty="0"/>
+          </a:p>
+          <a:p>
+            <a:endParaRPr lang="es-ES" sz="2000" dirty="0"/>
+          </a:p>
+        </p:txBody>
+      </p:sp>
+    </p:spTree>
+    <p:extLst>
+      <p:ext uri="{BB962C8B-B14F-4D97-AF65-F5344CB8AC3E}">
+        <p14:creationId xmlns:p14="http://schemas.microsoft.com/office/powerpoint/2010/main" val="972773272"/>
+      </p:ext>
+    </p:extLst>
+  </p:cSld>
+  <p:clrMapOvr>
+    <a:masterClrMapping/>
+  </p:clrMapOvr>
+</p:sld>
+</file>
+
+<file path=ppt/slides/slide14.xml><?xml version="1.0" encoding="utf-8"?>
+<p:sld xmlns:a="http://schemas.openxmlformats.org/drawingml/2006/main" xmlns:r="http://schemas.openxmlformats.org/officeDocument/2006/relationships" xmlns:p="http://schemas.openxmlformats.org/presentationml/2006/main">
+  <p:cSld>
+    <p:spTree>
+      <p:nvGrpSpPr>
+        <p:cNvPr id="1" name=""/>
+        <p:cNvGrpSpPr/>
+        <p:nvPr/>
+      </p:nvGrpSpPr>
+      <p:grpSpPr>
+        <a:xfrm>
+          <a:off x="0" y="0"/>
+          <a:ext cx="0" cy="0"/>
+          <a:chOff x="0" y="0"/>
+          <a:chExt cx="0" cy="0"/>
+        </a:xfrm>
+      </p:grpSpPr>
+      <p:sp>
+        <p:nvSpPr>
+          <p:cNvPr id="2" name="CuadroTexto 1">
+            <a:extLst>
+              <a:ext uri="{FF2B5EF4-FFF2-40B4-BE49-F238E27FC236}">
+                <a16:creationId xmlns:a16="http://schemas.microsoft.com/office/drawing/2014/main" id="{C2868FB5-BED5-419D-A369-D81E9F984AF1}"/>
+              </a:ext>
+            </a:extLst>
+          </p:cNvPr>
+          <p:cNvSpPr txBox="1"/>
+          <p:nvPr/>
+        </p:nvSpPr>
+        <p:spPr>
+          <a:xfrm>
+            <a:off x="600364" y="1277830"/>
+            <a:ext cx="10935854" cy="5386090"/>
+          </a:xfrm>
+          <a:prstGeom prst="rect">
+            <a:avLst/>
+          </a:prstGeom>
+          <a:noFill/>
+        </p:spPr>
+        <p:txBody>
+          <a:bodyPr wrap="square" rtlCol="0">
+            <a:spAutoFit/>
+          </a:bodyPr>
+          <a:lstStyle/>
+          <a:p>
+            <a:r>
+              <a:rPr lang="es-ES" sz="2400" dirty="0">
+                <a:solidFill>
+                  <a:srgbClr val="6494ED"/>
+                </a:solidFill>
+                <a:latin typeface="Hypatia Sans Pro" panose="020B0502020204020303" pitchFamily="34" charset="0"/>
+                <a:ea typeface="+mj-ea"/>
+                <a:cs typeface="+mj-cs"/>
+              </a:rPr>
+              <a:t>Revisión del </a:t>
+            </a:r>
+            <a:r>
+              <a:rPr lang="es-ES" sz="2400" dirty="0" err="1">
+                <a:solidFill>
+                  <a:srgbClr val="6494ED"/>
+                </a:solidFill>
+                <a:latin typeface="Hypatia Sans Pro" panose="020B0502020204020303" pitchFamily="34" charset="0"/>
+                <a:ea typeface="+mj-ea"/>
+                <a:cs typeface="+mj-cs"/>
+              </a:rPr>
+              <a:t>dump</a:t>
+            </a:r>
+            <a:r>
+              <a:rPr lang="es-ES" sz="2400" dirty="0">
+                <a:solidFill>
+                  <a:srgbClr val="6494ED"/>
+                </a:solidFill>
+                <a:latin typeface="Hypatia Sans Pro" panose="020B0502020204020303" pitchFamily="34" charset="0"/>
+                <a:ea typeface="+mj-ea"/>
+                <a:cs typeface="+mj-cs"/>
+              </a:rPr>
+              <a:t> de Universidad de Murcia: Recursos Humanos</a:t>
+            </a:r>
+          </a:p>
+          <a:p>
+            <a:endParaRPr lang="es-ES" sz="2000" dirty="0"/>
+          </a:p>
+          <a:p>
+            <a:pPr marL="342900" indent="-342900">
+              <a:buFont typeface="Wingdings" panose="05000000000000000000" pitchFamily="2" charset="2"/>
+              <a:buChar char="q"/>
+            </a:pPr>
+            <a:r>
+              <a:rPr lang="es-ES" sz="2000" dirty="0"/>
+              <a:t>Las ayudas de Recursos Humanos no están modeladas en ROH</a:t>
+            </a:r>
+          </a:p>
+          <a:p>
+            <a:pPr marL="800100" lvl="1" indent="-342900">
+              <a:buFont typeface="Arial" panose="020B0604020202020204" pitchFamily="34" charset="0"/>
+              <a:buChar char="•"/>
+            </a:pPr>
+            <a:r>
+              <a:rPr lang="es-ES" sz="2000" dirty="0"/>
+              <a:t>¿Creamos una nueva entidad a la par de Project? </a:t>
+            </a:r>
+          </a:p>
+          <a:p>
+            <a:pPr marL="342900" lvl="1" indent="-342900">
+              <a:buFont typeface="Wingdings" panose="05000000000000000000" pitchFamily="2" charset="2"/>
+              <a:buChar char="q"/>
+            </a:pPr>
+            <a:r>
+              <a:rPr lang="es-ES" sz="2000" dirty="0"/>
+              <a:t>Las convocatorias de Recursos Humanos son al fin y al cabo </a:t>
+            </a:r>
+            <a:r>
+              <a:rPr lang="es-ES" sz="2000" dirty="0" err="1"/>
+              <a:t>FundingProgram</a:t>
+            </a:r>
+            <a:endParaRPr lang="es-ES" sz="2000" dirty="0"/>
+          </a:p>
+          <a:p>
+            <a:pPr marL="342900" lvl="1" indent="-342900">
+              <a:buFont typeface="Wingdings" panose="05000000000000000000" pitchFamily="2" charset="2"/>
+              <a:buChar char="q"/>
+            </a:pPr>
+            <a:r>
+              <a:rPr lang="es-ES" sz="2000" dirty="0"/>
+              <a:t>Sí que modelamos </a:t>
+            </a:r>
+            <a:r>
+              <a:rPr lang="es-ES" sz="2000" dirty="0" err="1"/>
+              <a:t>Contract</a:t>
+            </a:r>
+            <a:r>
+              <a:rPr lang="es-ES" sz="2000" dirty="0"/>
+              <a:t>, bajo el cual se pueden recoger datos de Becas y Ayudas de Personal (Juan de la Cierva, Ramón y Cajal, ITN, etc.)</a:t>
+            </a:r>
+          </a:p>
+          <a:p>
+            <a:pPr marL="342900" lvl="1" indent="-342900">
+              <a:buFont typeface="Wingdings" panose="05000000000000000000" pitchFamily="2" charset="2"/>
+              <a:buChar char="q"/>
+            </a:pPr>
+            <a:r>
+              <a:rPr lang="es-ES" sz="2000" dirty="0"/>
+              <a:t>Hemos incluido que Contrato pueda tener asociado opcionalmente un </a:t>
+            </a:r>
+            <a:r>
+              <a:rPr lang="es-ES" sz="2000" dirty="0" err="1"/>
+              <a:t>DateTimeInterval</a:t>
+            </a:r>
+            <a:endParaRPr lang="es-ES" sz="2000" dirty="0"/>
+          </a:p>
+          <a:p>
+            <a:pPr marL="342900" lvl="1" indent="-342900">
+              <a:buFont typeface="Wingdings" panose="05000000000000000000" pitchFamily="2" charset="2"/>
+              <a:buChar char="q"/>
+            </a:pPr>
+            <a:r>
+              <a:rPr lang="es-ES" sz="2000" dirty="0"/>
+              <a:t>No se están recogiendo datos de la empresa gestora de la beca o contrato</a:t>
+            </a:r>
+          </a:p>
+          <a:p>
+            <a:pPr marL="342900" lvl="1" indent="-342900">
+              <a:buFont typeface="Wingdings" panose="05000000000000000000" pitchFamily="2" charset="2"/>
+              <a:buChar char="q"/>
+            </a:pPr>
+            <a:r>
+              <a:rPr lang="es-ES" sz="2000" dirty="0"/>
+              <a:t>Las becas no están completamente modeladas como en el modelo de información interno de Universidad de Murcia</a:t>
+            </a:r>
+          </a:p>
+          <a:p>
+            <a:pPr marL="342900" lvl="1" indent="-342900">
+              <a:buFont typeface="Wingdings" panose="05000000000000000000" pitchFamily="2" charset="2"/>
+              <a:buChar char="q"/>
+            </a:pPr>
+            <a:r>
+              <a:rPr lang="es-ES" sz="2000" dirty="0"/>
+              <a:t>Concesiones definitivas, finales y alegaciones de becas no están modeladas</a:t>
+            </a:r>
+          </a:p>
+          <a:p>
+            <a:pPr marL="342900" lvl="1" indent="-342900">
+              <a:buFont typeface="Wingdings" panose="05000000000000000000" pitchFamily="2" charset="2"/>
+              <a:buChar char="q"/>
+            </a:pPr>
+            <a:endParaRPr lang="es-ES" sz="2000" dirty="0"/>
+          </a:p>
+          <a:p>
+            <a:pPr marL="342900" indent="-342900">
+              <a:buFont typeface="Wingdings" panose="05000000000000000000" pitchFamily="2" charset="2"/>
+              <a:buChar char="q"/>
+            </a:pPr>
+            <a:endParaRPr lang="es-ES" sz="2000" dirty="0"/>
+          </a:p>
+          <a:p>
+            <a:pPr marL="800100" lvl="1" indent="-342900">
+              <a:buFont typeface="Arial" panose="020B0604020202020204" pitchFamily="34" charset="0"/>
+              <a:buChar char="•"/>
+            </a:pPr>
+            <a:endParaRPr lang="es-ES" sz="2000" dirty="0"/>
+          </a:p>
+          <a:p>
+            <a:endParaRPr lang="es-ES" sz="2000" dirty="0"/>
+          </a:p>
+          <a:p>
+            <a:endParaRPr lang="es-ES" sz="2000" dirty="0"/>
+          </a:p>
+        </p:txBody>
+      </p:sp>
+    </p:spTree>
+    <p:extLst>
+      <p:ext uri="{BB962C8B-B14F-4D97-AF65-F5344CB8AC3E}">
+        <p14:creationId xmlns:p14="http://schemas.microsoft.com/office/powerpoint/2010/main" val="3882183497"/>
+      </p:ext>
+    </p:extLst>
+  </p:cSld>
+  <p:clrMapOvr>
+    <a:masterClrMapping/>
+  </p:clrMapOvr>
+</p:sld>
+</file>
+
+<file path=ppt/slides/slide15.xml><?xml version="1.0" encoding="utf-8"?>
+<p:sld xmlns:a="http://schemas.openxmlformats.org/drawingml/2006/main" xmlns:r="http://schemas.openxmlformats.org/officeDocument/2006/relationships" xmlns:p="http://schemas.openxmlformats.org/presentationml/2006/main">
+  <p:cSld>
+    <p:spTree>
+      <p:nvGrpSpPr>
+        <p:cNvPr id="1" name=""/>
+        <p:cNvGrpSpPr/>
+        <p:nvPr/>
+      </p:nvGrpSpPr>
+      <p:grpSpPr>
+        <a:xfrm>
+          <a:off x="0" y="0"/>
+          <a:ext cx="0" cy="0"/>
+          <a:chOff x="0" y="0"/>
+          <a:chExt cx="0" cy="0"/>
+        </a:xfrm>
+      </p:grpSpPr>
+      <p:sp>
+        <p:nvSpPr>
+          <p:cNvPr id="2" name="CuadroTexto 1">
+            <a:extLst>
+              <a:ext uri="{FF2B5EF4-FFF2-40B4-BE49-F238E27FC236}">
+                <a16:creationId xmlns:a16="http://schemas.microsoft.com/office/drawing/2014/main" id="{C2868FB5-BED5-419D-A369-D81E9F984AF1}"/>
+              </a:ext>
+            </a:extLst>
+          </p:cNvPr>
+          <p:cNvSpPr txBox="1"/>
+          <p:nvPr/>
+        </p:nvSpPr>
+        <p:spPr>
+          <a:xfrm>
+            <a:off x="600364" y="1277830"/>
+            <a:ext cx="10935854" cy="4154984"/>
+          </a:xfrm>
+          <a:prstGeom prst="rect">
+            <a:avLst/>
+          </a:prstGeom>
+          <a:noFill/>
+        </p:spPr>
+        <p:txBody>
+          <a:bodyPr wrap="square" rtlCol="0">
+            <a:spAutoFit/>
+          </a:bodyPr>
+          <a:lstStyle/>
+          <a:p>
+            <a:r>
+              <a:rPr lang="es-ES" sz="2400" dirty="0">
+                <a:solidFill>
+                  <a:srgbClr val="6494ED"/>
+                </a:solidFill>
+                <a:latin typeface="Hypatia Sans Pro" panose="020B0502020204020303" pitchFamily="34" charset="0"/>
+                <a:ea typeface="+mj-ea"/>
+                <a:cs typeface="+mj-cs"/>
+              </a:rPr>
+              <a:t>Revisión del </a:t>
+            </a:r>
+            <a:r>
+              <a:rPr lang="es-ES" sz="2400" dirty="0" err="1">
+                <a:solidFill>
+                  <a:srgbClr val="6494ED"/>
+                </a:solidFill>
+                <a:latin typeface="Hypatia Sans Pro" panose="020B0502020204020303" pitchFamily="34" charset="0"/>
+                <a:ea typeface="+mj-ea"/>
+                <a:cs typeface="+mj-cs"/>
+              </a:rPr>
+              <a:t>dump</a:t>
+            </a:r>
+            <a:r>
+              <a:rPr lang="es-ES" sz="2400" dirty="0">
+                <a:solidFill>
+                  <a:srgbClr val="6494ED"/>
+                </a:solidFill>
+                <a:latin typeface="Hypatia Sans Pro" panose="020B0502020204020303" pitchFamily="34" charset="0"/>
+                <a:ea typeface="+mj-ea"/>
+                <a:cs typeface="+mj-cs"/>
+              </a:rPr>
+              <a:t> de Universidad de Murcia: Ayudas</a:t>
+            </a:r>
+          </a:p>
+          <a:p>
+            <a:endParaRPr lang="es-ES" sz="2000" dirty="0"/>
+          </a:p>
+          <a:p>
+            <a:pPr marL="342900" indent="-342900">
+              <a:buFont typeface="Wingdings" panose="05000000000000000000" pitchFamily="2" charset="2"/>
+              <a:buChar char="q"/>
+            </a:pPr>
+            <a:r>
+              <a:rPr lang="es-ES" sz="2000" dirty="0"/>
+              <a:t>El concepto más cercano asociado a Ayuda es </a:t>
+            </a:r>
+            <a:r>
+              <a:rPr lang="es-ES" sz="2000" dirty="0" err="1"/>
+              <a:t>Funding</a:t>
+            </a:r>
+            <a:r>
+              <a:rPr lang="es-ES" sz="2000" dirty="0"/>
+              <a:t> que está asociado a </a:t>
+            </a:r>
+            <a:r>
+              <a:rPr lang="es-ES" sz="2000" dirty="0" err="1"/>
+              <a:t>FundingProgram</a:t>
+            </a:r>
+            <a:r>
+              <a:rPr lang="es-ES" sz="2000" dirty="0"/>
+              <a:t> y a su vez a Project</a:t>
+            </a:r>
+          </a:p>
+          <a:p>
+            <a:pPr marL="342900" indent="-342900">
+              <a:buFont typeface="Wingdings" panose="05000000000000000000" pitchFamily="2" charset="2"/>
+              <a:buChar char="q"/>
+            </a:pPr>
+            <a:r>
+              <a:rPr lang="es-ES" sz="2000" dirty="0"/>
+              <a:t>En ROH no se refleja un alto nivel de detalle sobre las partidas que cubre la ayuda ni en tiempo de propuesta de la misma ni durante la ejecución de la misma (tras aprobación)</a:t>
+            </a:r>
+          </a:p>
+          <a:p>
+            <a:pPr marL="342900" indent="-342900">
+              <a:buFont typeface="Wingdings" panose="05000000000000000000" pitchFamily="2" charset="2"/>
+              <a:buChar char="q"/>
+            </a:pPr>
+            <a:r>
+              <a:rPr lang="es-ES" sz="2000" dirty="0"/>
+              <a:t>Tenemos el concepto </a:t>
+            </a:r>
+            <a:r>
+              <a:rPr lang="es-ES" sz="2000" dirty="0" err="1"/>
+              <a:t>Funding</a:t>
+            </a:r>
+            <a:r>
+              <a:rPr lang="es-ES" sz="2000" dirty="0"/>
+              <a:t> asociado a </a:t>
+            </a:r>
+            <a:r>
+              <a:rPr lang="es-ES" sz="2000" dirty="0" err="1"/>
+              <a:t>FundingProgram</a:t>
+            </a:r>
+            <a:r>
+              <a:rPr lang="es-ES" sz="2000" dirty="0"/>
+              <a:t>, de ese modo se podrían trazar los datos de concesiones a ayudas lanzadas</a:t>
+            </a:r>
+          </a:p>
+          <a:p>
+            <a:pPr marL="342900" indent="-342900">
+              <a:buFont typeface="Wingdings" panose="05000000000000000000" pitchFamily="2" charset="2"/>
+              <a:buChar char="q"/>
+            </a:pPr>
+            <a:r>
+              <a:rPr lang="es-ES" sz="2000" dirty="0"/>
+              <a:t>No se gestiona el ciclo de vida de las ayudas con cosas como concesiones provisionales, definitivas, resolución de la ayuda</a:t>
+            </a:r>
+          </a:p>
+          <a:p>
+            <a:pPr marL="800100" lvl="1" indent="-342900">
+              <a:buFont typeface="Arial" panose="020B0604020202020204" pitchFamily="34" charset="0"/>
+              <a:buChar char="•"/>
+            </a:pPr>
+            <a:endParaRPr lang="es-ES" sz="2000" dirty="0"/>
+          </a:p>
+          <a:p>
+            <a:endParaRPr lang="es-ES" sz="2000" dirty="0"/>
+          </a:p>
+          <a:p>
+            <a:endParaRPr lang="es-ES" sz="2000" dirty="0"/>
+          </a:p>
+        </p:txBody>
+      </p:sp>
+    </p:spTree>
+    <p:extLst>
+      <p:ext uri="{BB962C8B-B14F-4D97-AF65-F5344CB8AC3E}">
+        <p14:creationId xmlns:p14="http://schemas.microsoft.com/office/powerpoint/2010/main" val="2087146614"/>
+      </p:ext>
+    </p:extLst>
+  </p:cSld>
+  <p:clrMapOvr>
+    <a:masterClrMapping/>
+  </p:clrMapOvr>
+</p:sld>
+</file>
+
+<file path=ppt/slides/slide16.xml><?xml version="1.0" encoding="utf-8"?>
+<p:sld xmlns:a="http://schemas.openxmlformats.org/drawingml/2006/main" xmlns:r="http://schemas.openxmlformats.org/officeDocument/2006/relationships" xmlns:p="http://schemas.openxmlformats.org/presentationml/2006/main">
+  <p:cSld>
+    <p:spTree>
+      <p:nvGrpSpPr>
+        <p:cNvPr id="1" name=""/>
+        <p:cNvGrpSpPr/>
+        <p:nvPr/>
+      </p:nvGrpSpPr>
+      <p:grpSpPr>
+        <a:xfrm>
+          <a:off x="0" y="0"/>
+          <a:ext cx="0" cy="0"/>
+          <a:chOff x="0" y="0"/>
+          <a:chExt cx="0" cy="0"/>
+        </a:xfrm>
+      </p:grpSpPr>
+      <p:sp>
+        <p:nvSpPr>
+          <p:cNvPr id="2" name="CuadroTexto 1">
+            <a:extLst>
+              <a:ext uri="{FF2B5EF4-FFF2-40B4-BE49-F238E27FC236}">
+                <a16:creationId xmlns:a16="http://schemas.microsoft.com/office/drawing/2014/main" id="{C2868FB5-BED5-419D-A369-D81E9F984AF1}"/>
+              </a:ext>
+            </a:extLst>
+          </p:cNvPr>
+          <p:cNvSpPr txBox="1"/>
+          <p:nvPr/>
+        </p:nvSpPr>
+        <p:spPr>
+          <a:xfrm>
+            <a:off x="600364" y="1277830"/>
+            <a:ext cx="10935854" cy="2308324"/>
+          </a:xfrm>
+          <a:prstGeom prst="rect">
+            <a:avLst/>
+          </a:prstGeom>
+          <a:noFill/>
+        </p:spPr>
+        <p:txBody>
+          <a:bodyPr wrap="square" rtlCol="0">
+            <a:spAutoFit/>
+          </a:bodyPr>
+          <a:lstStyle/>
+          <a:p>
+            <a:r>
+              <a:rPr lang="es-ES" sz="2400" dirty="0">
+                <a:solidFill>
+                  <a:srgbClr val="6494ED"/>
+                </a:solidFill>
+                <a:latin typeface="Hypatia Sans Pro" panose="020B0502020204020303" pitchFamily="34" charset="0"/>
+                <a:ea typeface="+mj-ea"/>
+                <a:cs typeface="+mj-cs"/>
+              </a:rPr>
+              <a:t>Revisión del </a:t>
+            </a:r>
+            <a:r>
+              <a:rPr lang="es-ES" sz="2400" dirty="0" err="1">
+                <a:solidFill>
+                  <a:srgbClr val="6494ED"/>
+                </a:solidFill>
+                <a:latin typeface="Hypatia Sans Pro" panose="020B0502020204020303" pitchFamily="34" charset="0"/>
+                <a:ea typeface="+mj-ea"/>
+                <a:cs typeface="+mj-cs"/>
+              </a:rPr>
+              <a:t>dump</a:t>
+            </a:r>
+            <a:r>
+              <a:rPr lang="es-ES" sz="2400" dirty="0">
+                <a:solidFill>
+                  <a:srgbClr val="6494ED"/>
+                </a:solidFill>
+                <a:latin typeface="Hypatia Sans Pro" panose="020B0502020204020303" pitchFamily="34" charset="0"/>
+                <a:ea typeface="+mj-ea"/>
+                <a:cs typeface="+mj-cs"/>
+              </a:rPr>
+              <a:t> de Universidad de Murcia: Contratos</a:t>
+            </a:r>
+          </a:p>
+          <a:p>
+            <a:endParaRPr lang="es-ES" sz="2000" dirty="0"/>
+          </a:p>
+          <a:p>
+            <a:pPr marL="342900" indent="-342900">
+              <a:buFont typeface="Wingdings" panose="05000000000000000000" pitchFamily="2" charset="2"/>
+              <a:buChar char="q"/>
+            </a:pPr>
+            <a:r>
+              <a:rPr lang="es-ES" sz="2000" dirty="0"/>
+              <a:t>¿Diferencias más claras entre ayudas y contratos? </a:t>
+            </a:r>
+          </a:p>
+          <a:p>
+            <a:pPr marL="342900" indent="-342900">
+              <a:buFont typeface="Wingdings" panose="05000000000000000000" pitchFamily="2" charset="2"/>
+              <a:buChar char="q"/>
+            </a:pPr>
+            <a:r>
+              <a:rPr lang="es-ES" sz="2000" dirty="0"/>
+              <a:t>Existe en ROH una entidad llamada </a:t>
+            </a:r>
+            <a:r>
+              <a:rPr lang="es-ES" sz="2000" dirty="0" err="1"/>
+              <a:t>Contract</a:t>
+            </a:r>
+            <a:r>
+              <a:rPr lang="es-ES" sz="2000" dirty="0"/>
+              <a:t> que tiene metadatos sobre contratos de proyectos y contratos de personas</a:t>
+            </a:r>
+          </a:p>
+          <a:p>
+            <a:pPr marL="342900" indent="-342900">
+              <a:buFont typeface="Wingdings" panose="05000000000000000000" pitchFamily="2" charset="2"/>
+              <a:buChar char="q"/>
+            </a:pPr>
+            <a:r>
+              <a:rPr lang="es-ES" sz="2000" dirty="0"/>
+              <a:t>Debería añadirse a la entidad </a:t>
+            </a:r>
+            <a:r>
+              <a:rPr lang="es-ES" sz="2000" dirty="0" err="1"/>
+              <a:t>Contract</a:t>
+            </a:r>
+            <a:r>
+              <a:rPr lang="es-ES" sz="2000" dirty="0"/>
+              <a:t> más metadatos, para reflejar todos los campos descritos </a:t>
+            </a:r>
+          </a:p>
+          <a:p>
+            <a:pPr marL="342900" indent="-342900">
+              <a:buFont typeface="Wingdings" panose="05000000000000000000" pitchFamily="2" charset="2"/>
+              <a:buChar char="q"/>
+            </a:pPr>
+            <a:r>
+              <a:rPr lang="es-ES" sz="2000" dirty="0"/>
+              <a:t>Incluye aspectos no contemplados como prórrogas de contratos y pago de comisiones</a:t>
+            </a:r>
+          </a:p>
+        </p:txBody>
+      </p:sp>
+    </p:spTree>
+    <p:extLst>
+      <p:ext uri="{BB962C8B-B14F-4D97-AF65-F5344CB8AC3E}">
+        <p14:creationId xmlns:p14="http://schemas.microsoft.com/office/powerpoint/2010/main" val="3168271438"/>
+      </p:ext>
+    </p:extLst>
+  </p:cSld>
+  <p:clrMapOvr>
+    <a:masterClrMapping/>
+  </p:clrMapOvr>
+</p:sld>
+</file>
+
+<file path=ppt/slides/slide17.xml><?xml version="1.0" encoding="utf-8"?>
+<p:sld xmlns:a="http://schemas.openxmlformats.org/drawingml/2006/main" xmlns:r="http://schemas.openxmlformats.org/officeDocument/2006/relationships" xmlns:p="http://schemas.openxmlformats.org/presentationml/2006/main">
+  <p:cSld>
+    <p:spTree>
+      <p:nvGrpSpPr>
+        <p:cNvPr id="1" name=""/>
+        <p:cNvGrpSpPr/>
+        <p:nvPr/>
+      </p:nvGrpSpPr>
+      <p:grpSpPr>
+        <a:xfrm>
+          <a:off x="0" y="0"/>
+          <a:ext cx="0" cy="0"/>
+          <a:chOff x="0" y="0"/>
+          <a:chExt cx="0" cy="0"/>
+        </a:xfrm>
+      </p:grpSpPr>
+      <p:sp>
+        <p:nvSpPr>
+          <p:cNvPr id="2" name="CuadroTexto 1">
+            <a:extLst>
+              <a:ext uri="{FF2B5EF4-FFF2-40B4-BE49-F238E27FC236}">
+                <a16:creationId xmlns:a16="http://schemas.microsoft.com/office/drawing/2014/main" id="{C2868FB5-BED5-419D-A369-D81E9F984AF1}"/>
+              </a:ext>
+            </a:extLst>
+          </p:cNvPr>
+          <p:cNvSpPr txBox="1"/>
+          <p:nvPr/>
+        </p:nvSpPr>
+        <p:spPr>
+          <a:xfrm>
+            <a:off x="600364" y="1277830"/>
+            <a:ext cx="10935854" cy="2616101"/>
+          </a:xfrm>
+          <a:prstGeom prst="rect">
+            <a:avLst/>
+          </a:prstGeom>
+          <a:noFill/>
+        </p:spPr>
+        <p:txBody>
+          <a:bodyPr wrap="square" rtlCol="0">
+            <a:spAutoFit/>
+          </a:bodyPr>
+          <a:lstStyle/>
+          <a:p>
+            <a:r>
+              <a:rPr lang="es-ES" sz="2400" dirty="0">
+                <a:solidFill>
+                  <a:srgbClr val="6494ED"/>
+                </a:solidFill>
+                <a:latin typeface="Hypatia Sans Pro" panose="020B0502020204020303" pitchFamily="34" charset="0"/>
+                <a:ea typeface="+mj-ea"/>
+                <a:cs typeface="+mj-cs"/>
+              </a:rPr>
+              <a:t>Revisión del </a:t>
+            </a:r>
+            <a:r>
+              <a:rPr lang="es-ES" sz="2400" dirty="0" err="1">
+                <a:solidFill>
+                  <a:srgbClr val="6494ED"/>
+                </a:solidFill>
+                <a:latin typeface="Hypatia Sans Pro" panose="020B0502020204020303" pitchFamily="34" charset="0"/>
+                <a:ea typeface="+mj-ea"/>
+                <a:cs typeface="+mj-cs"/>
+              </a:rPr>
+              <a:t>dump</a:t>
+            </a:r>
+            <a:r>
+              <a:rPr lang="es-ES" sz="2400" dirty="0">
+                <a:solidFill>
+                  <a:srgbClr val="6494ED"/>
+                </a:solidFill>
+                <a:latin typeface="Hypatia Sans Pro" panose="020B0502020204020303" pitchFamily="34" charset="0"/>
+                <a:ea typeface="+mj-ea"/>
+                <a:cs typeface="+mj-cs"/>
+              </a:rPr>
+              <a:t> de Universidad de Murcia: Grupos de Investigación</a:t>
+            </a:r>
+          </a:p>
+          <a:p>
+            <a:endParaRPr lang="es-ES" sz="2000" dirty="0"/>
+          </a:p>
+          <a:p>
+            <a:pPr marL="342900" indent="-342900">
+              <a:buFont typeface="Wingdings" panose="05000000000000000000" pitchFamily="2" charset="2"/>
+              <a:buChar char="q"/>
+            </a:pPr>
+            <a:r>
+              <a:rPr lang="es-ES" sz="2000" dirty="0"/>
+              <a:t>Modelado bajo el concepto </a:t>
+            </a:r>
+            <a:r>
+              <a:rPr lang="es-ES" sz="2000" dirty="0" err="1"/>
+              <a:t>Organization</a:t>
+            </a:r>
+            <a:r>
+              <a:rPr lang="es-ES" sz="2000" dirty="0"/>
+              <a:t> in ROH</a:t>
+            </a:r>
+          </a:p>
+          <a:p>
+            <a:pPr marL="342900" indent="-342900">
+              <a:buFont typeface="Wingdings" panose="05000000000000000000" pitchFamily="2" charset="2"/>
+              <a:buChar char="q"/>
+            </a:pPr>
+            <a:r>
+              <a:rPr lang="es-ES" sz="2000" dirty="0"/>
+              <a:t>Las propiedades </a:t>
+            </a:r>
+            <a:r>
+              <a:rPr lang="es-ES" sz="2000" dirty="0" err="1"/>
+              <a:t>parentOrganization</a:t>
+            </a:r>
+            <a:r>
+              <a:rPr lang="es-ES" sz="2000" dirty="0"/>
+              <a:t> y </a:t>
+            </a:r>
+            <a:r>
+              <a:rPr lang="es-ES" sz="2000" dirty="0" err="1"/>
+              <a:t>childOrganization</a:t>
+            </a:r>
+            <a:r>
+              <a:rPr lang="es-ES" sz="2000" dirty="0"/>
+              <a:t> permiten la creación de relaciones a demanda, flexibles en cuanto a las taxonomías de organizaciones que pueden crearse</a:t>
+            </a:r>
+          </a:p>
+          <a:p>
+            <a:pPr marL="342900" indent="-342900">
+              <a:buFont typeface="Wingdings" panose="05000000000000000000" pitchFamily="2" charset="2"/>
+              <a:buChar char="q"/>
+            </a:pPr>
+            <a:r>
+              <a:rPr lang="es-ES" sz="2000" dirty="0"/>
+              <a:t>La entidad </a:t>
+            </a:r>
+            <a:r>
+              <a:rPr lang="es-ES" sz="2000" dirty="0" err="1"/>
+              <a:t>Participation</a:t>
+            </a:r>
+            <a:r>
+              <a:rPr lang="es-ES" sz="2000" dirty="0"/>
+              <a:t> recoge la participación de </a:t>
+            </a:r>
+            <a:r>
+              <a:rPr lang="es-ES" sz="2000" dirty="0" err="1"/>
+              <a:t>Person</a:t>
+            </a:r>
+            <a:r>
+              <a:rPr lang="es-ES" sz="2000" dirty="0"/>
+              <a:t> en </a:t>
+            </a:r>
+            <a:r>
+              <a:rPr lang="es-ES" sz="2000" dirty="0" err="1"/>
+              <a:t>ResearchResult</a:t>
+            </a:r>
+            <a:r>
+              <a:rPr lang="es-ES" sz="2000" dirty="0"/>
+              <a:t> y de </a:t>
+            </a:r>
+            <a:r>
+              <a:rPr lang="es-ES" sz="2000" dirty="0" err="1"/>
+              <a:t>Organization</a:t>
+            </a:r>
+            <a:r>
+              <a:rPr lang="es-ES" sz="2000" dirty="0"/>
+              <a:t> Project</a:t>
+            </a:r>
+          </a:p>
+          <a:p>
+            <a:pPr marL="342900" indent="-342900">
+              <a:buFont typeface="Wingdings" panose="05000000000000000000" pitchFamily="2" charset="2"/>
+              <a:buChar char="q"/>
+            </a:pPr>
+            <a:endParaRPr lang="es-ES" sz="2000" dirty="0"/>
+          </a:p>
+        </p:txBody>
+      </p:sp>
+    </p:spTree>
+    <p:extLst>
+      <p:ext uri="{BB962C8B-B14F-4D97-AF65-F5344CB8AC3E}">
+        <p14:creationId xmlns:p14="http://schemas.microsoft.com/office/powerpoint/2010/main" val="3020234086"/>
+      </p:ext>
+    </p:extLst>
+  </p:cSld>
+  <p:clrMapOvr>
+    <a:masterClrMapping/>
+  </p:clrMapOvr>
+</p:sld>
+</file>
+
+<file path=ppt/slides/slide18.xml><?xml version="1.0" encoding="utf-8"?>
+<p:sld xmlns:a="http://schemas.openxmlformats.org/drawingml/2006/main" xmlns:r="http://schemas.openxmlformats.org/officeDocument/2006/relationships" xmlns:p="http://schemas.openxmlformats.org/presentationml/2006/main">
+  <p:cSld>
+    <p:spTree>
+      <p:nvGrpSpPr>
+        <p:cNvPr id="1" name=""/>
+        <p:cNvGrpSpPr/>
+        <p:nvPr/>
+      </p:nvGrpSpPr>
+      <p:grpSpPr>
+        <a:xfrm>
+          <a:off x="0" y="0"/>
+          <a:ext cx="0" cy="0"/>
+          <a:chOff x="0" y="0"/>
+          <a:chExt cx="0" cy="0"/>
+        </a:xfrm>
+      </p:grpSpPr>
+      <p:sp>
+        <p:nvSpPr>
+          <p:cNvPr id="2" name="CuadroTexto 1">
+            <a:extLst>
+              <a:ext uri="{FF2B5EF4-FFF2-40B4-BE49-F238E27FC236}">
+                <a16:creationId xmlns:a16="http://schemas.microsoft.com/office/drawing/2014/main" id="{C2868FB5-BED5-419D-A369-D81E9F984AF1}"/>
+              </a:ext>
+            </a:extLst>
+          </p:cNvPr>
+          <p:cNvSpPr txBox="1"/>
+          <p:nvPr/>
+        </p:nvSpPr>
+        <p:spPr>
+          <a:xfrm>
+            <a:off x="600364" y="1277830"/>
+            <a:ext cx="10935854" cy="1384995"/>
+          </a:xfrm>
+          <a:prstGeom prst="rect">
+            <a:avLst/>
+          </a:prstGeom>
+          <a:noFill/>
+        </p:spPr>
+        <p:txBody>
+          <a:bodyPr wrap="square" rtlCol="0">
+            <a:spAutoFit/>
+          </a:bodyPr>
+          <a:lstStyle/>
+          <a:p>
+            <a:r>
+              <a:rPr lang="es-ES" sz="2400" dirty="0">
+                <a:solidFill>
+                  <a:srgbClr val="6494ED"/>
+                </a:solidFill>
+                <a:latin typeface="Hypatia Sans Pro" panose="020B0502020204020303" pitchFamily="34" charset="0"/>
+                <a:ea typeface="+mj-ea"/>
+                <a:cs typeface="+mj-cs"/>
+              </a:rPr>
+              <a:t>Revisión del </a:t>
+            </a:r>
+            <a:r>
+              <a:rPr lang="es-ES" sz="2400" dirty="0" err="1">
+                <a:solidFill>
+                  <a:srgbClr val="6494ED"/>
+                </a:solidFill>
+                <a:latin typeface="Hypatia Sans Pro" panose="020B0502020204020303" pitchFamily="34" charset="0"/>
+                <a:ea typeface="+mj-ea"/>
+                <a:cs typeface="+mj-cs"/>
+              </a:rPr>
+              <a:t>dump</a:t>
+            </a:r>
+            <a:r>
+              <a:rPr lang="es-ES" sz="2400" dirty="0">
+                <a:solidFill>
+                  <a:srgbClr val="6494ED"/>
+                </a:solidFill>
+                <a:latin typeface="Hypatia Sans Pro" panose="020B0502020204020303" pitchFamily="34" charset="0"/>
+                <a:ea typeface="+mj-ea"/>
+                <a:cs typeface="+mj-cs"/>
+              </a:rPr>
+              <a:t> de Universidad de Murcia: Otros tipos de proyectos</a:t>
+            </a:r>
+          </a:p>
+          <a:p>
+            <a:endParaRPr lang="es-ES" sz="2000" dirty="0"/>
+          </a:p>
+          <a:p>
+            <a:pPr marL="342900" indent="-342900">
+              <a:buFont typeface="Wingdings" panose="05000000000000000000" pitchFamily="2" charset="2"/>
+              <a:buChar char="q"/>
+            </a:pPr>
+            <a:r>
+              <a:rPr lang="es-ES" sz="2000" dirty="0"/>
+              <a:t>No hay descripción en el documento de la Universidad de Murcia</a:t>
+            </a:r>
+          </a:p>
+          <a:p>
+            <a:pPr marL="342900" indent="-342900">
+              <a:buFont typeface="Wingdings" panose="05000000000000000000" pitchFamily="2" charset="2"/>
+              <a:buChar char="q"/>
+            </a:pPr>
+            <a:endParaRPr lang="es-ES" sz="2000" dirty="0"/>
+          </a:p>
+        </p:txBody>
+      </p:sp>
+    </p:spTree>
+    <p:extLst>
+      <p:ext uri="{BB962C8B-B14F-4D97-AF65-F5344CB8AC3E}">
+        <p14:creationId xmlns:p14="http://schemas.microsoft.com/office/powerpoint/2010/main" val="1325423798"/>
+      </p:ext>
+    </p:extLst>
+  </p:cSld>
+  <p:clrMapOvr>
+    <a:masterClrMapping/>
+  </p:clrMapOvr>
+</p:sld>
+</file>
+
+<file path=ppt/slides/slide19.xml><?xml version="1.0" encoding="utf-8"?>
+<p:sld xmlns:a="http://schemas.openxmlformats.org/drawingml/2006/main" xmlns:r="http://schemas.openxmlformats.org/officeDocument/2006/relationships" xmlns:p="http://schemas.openxmlformats.org/presentationml/2006/main">
+  <p:cSld>
+    <p:spTree>
+      <p:nvGrpSpPr>
+        <p:cNvPr id="1" name=""/>
+        <p:cNvGrpSpPr/>
+        <p:nvPr/>
+      </p:nvGrpSpPr>
+      <p:grpSpPr>
+        <a:xfrm>
+          <a:off x="0" y="0"/>
+          <a:ext cx="0" cy="0"/>
+          <a:chOff x="0" y="0"/>
+          <a:chExt cx="0" cy="0"/>
+        </a:xfrm>
+      </p:grpSpPr>
+      <p:sp>
+        <p:nvSpPr>
+          <p:cNvPr id="2" name="CuadroTexto 1">
+            <a:extLst>
+              <a:ext uri="{FF2B5EF4-FFF2-40B4-BE49-F238E27FC236}">
+                <a16:creationId xmlns:a16="http://schemas.microsoft.com/office/drawing/2014/main" id="{C2868FB5-BED5-419D-A369-D81E9F984AF1}"/>
+              </a:ext>
+            </a:extLst>
+          </p:cNvPr>
+          <p:cNvSpPr txBox="1"/>
+          <p:nvPr/>
+        </p:nvSpPr>
+        <p:spPr>
+          <a:xfrm>
+            <a:off x="600364" y="1277830"/>
+            <a:ext cx="10935854" cy="2616101"/>
+          </a:xfrm>
+          <a:prstGeom prst="rect">
+            <a:avLst/>
+          </a:prstGeom>
+          <a:noFill/>
+        </p:spPr>
+        <p:txBody>
+          <a:bodyPr wrap="square" rtlCol="0">
+            <a:spAutoFit/>
+          </a:bodyPr>
+          <a:lstStyle/>
+          <a:p>
+            <a:r>
+              <a:rPr lang="es-ES" sz="2400" dirty="0">
+                <a:solidFill>
+                  <a:srgbClr val="6494ED"/>
+                </a:solidFill>
+                <a:latin typeface="Hypatia Sans Pro" panose="020B0502020204020303" pitchFamily="34" charset="0"/>
+                <a:ea typeface="+mj-ea"/>
+                <a:cs typeface="+mj-cs"/>
+              </a:rPr>
+              <a:t>Revisión del </a:t>
+            </a:r>
+            <a:r>
+              <a:rPr lang="es-ES" sz="2400" dirty="0" err="1">
+                <a:solidFill>
+                  <a:srgbClr val="6494ED"/>
+                </a:solidFill>
+                <a:latin typeface="Hypatia Sans Pro" panose="020B0502020204020303" pitchFamily="34" charset="0"/>
+                <a:ea typeface="+mj-ea"/>
+                <a:cs typeface="+mj-cs"/>
+              </a:rPr>
+              <a:t>dump</a:t>
+            </a:r>
+            <a:r>
+              <a:rPr lang="es-ES" sz="2400" dirty="0">
+                <a:solidFill>
+                  <a:srgbClr val="6494ED"/>
+                </a:solidFill>
+                <a:latin typeface="Hypatia Sans Pro" panose="020B0502020204020303" pitchFamily="34" charset="0"/>
+                <a:ea typeface="+mj-ea"/>
+                <a:cs typeface="+mj-cs"/>
+              </a:rPr>
+              <a:t> de Universidad de Murcia: Actividades</a:t>
+            </a:r>
+          </a:p>
+          <a:p>
+            <a:endParaRPr lang="es-ES" sz="2000" dirty="0"/>
+          </a:p>
+          <a:p>
+            <a:pPr marL="342900" indent="-342900">
+              <a:buFont typeface="Wingdings" panose="05000000000000000000" pitchFamily="2" charset="2"/>
+              <a:buChar char="q"/>
+            </a:pPr>
+            <a:r>
+              <a:rPr lang="es-ES" sz="2000" dirty="0"/>
+              <a:t>Discutir qué tipos de actividad deberían contemplarse. Existe </a:t>
+            </a:r>
+            <a:r>
+              <a:rPr lang="es-ES" sz="2000" dirty="0" err="1"/>
+              <a:t>Activity</a:t>
+            </a:r>
+            <a:r>
+              <a:rPr lang="es-ES" sz="2000" dirty="0"/>
+              <a:t> en ROH</a:t>
+            </a:r>
+          </a:p>
+          <a:p>
+            <a:pPr marL="342900" indent="-342900">
+              <a:buFont typeface="Wingdings" panose="05000000000000000000" pitchFamily="2" charset="2"/>
+              <a:buChar char="q"/>
+            </a:pPr>
+            <a:r>
+              <a:rPr lang="es-ES" sz="2000" dirty="0"/>
+              <a:t>De momento en ROH no se pueden agrupar las Actividades</a:t>
+            </a:r>
+          </a:p>
+          <a:p>
+            <a:pPr marL="342900" indent="-342900">
+              <a:buFont typeface="Wingdings" panose="05000000000000000000" pitchFamily="2" charset="2"/>
+              <a:buChar char="q"/>
+            </a:pPr>
+            <a:r>
+              <a:rPr lang="es-ES" sz="2000" dirty="0"/>
+              <a:t>Hay relación </a:t>
+            </a:r>
+            <a:r>
+              <a:rPr lang="es-ES" sz="2000" dirty="0" err="1"/>
+              <a:t>projectActivity</a:t>
+            </a:r>
+            <a:r>
+              <a:rPr lang="es-ES" sz="2000" dirty="0"/>
+              <a:t> entre Project y </a:t>
+            </a:r>
+            <a:r>
+              <a:rPr lang="es-ES" sz="2000" dirty="0" err="1"/>
+              <a:t>Activity</a:t>
+            </a:r>
+            <a:endParaRPr lang="es-ES" sz="2000" dirty="0"/>
+          </a:p>
+          <a:p>
+            <a:pPr marL="342900" indent="-342900">
+              <a:buFont typeface="Wingdings" panose="05000000000000000000" pitchFamily="2" charset="2"/>
+              <a:buChar char="q"/>
+            </a:pPr>
+            <a:r>
+              <a:rPr lang="es-ES" sz="2000" dirty="0"/>
+              <a:t>Hay relación entre Actividad y gasto en proyecto</a:t>
+            </a:r>
+          </a:p>
+          <a:p>
+            <a:pPr marL="342900" indent="-342900">
+              <a:buFont typeface="Wingdings" panose="05000000000000000000" pitchFamily="2" charset="2"/>
+              <a:buChar char="q"/>
+            </a:pPr>
+            <a:r>
+              <a:rPr lang="es-ES" sz="2000" dirty="0"/>
+              <a:t>En ROH no se recogen ni facturas ni información sobre impuestos de momento</a:t>
+            </a:r>
+          </a:p>
+          <a:p>
+            <a:pPr marL="342900" indent="-342900">
+              <a:buFont typeface="Wingdings" panose="05000000000000000000" pitchFamily="2" charset="2"/>
+              <a:buChar char="q"/>
+            </a:pPr>
+            <a:endParaRPr lang="es-ES" sz="2000" dirty="0"/>
+          </a:p>
+        </p:txBody>
+      </p:sp>
+    </p:spTree>
+    <p:extLst>
+      <p:ext uri="{BB962C8B-B14F-4D97-AF65-F5344CB8AC3E}">
+        <p14:creationId xmlns:p14="http://schemas.microsoft.com/office/powerpoint/2010/main" val="2365481352"/>
       </p:ext>
     </p:extLst>
   </p:cSld>
@@ -3661,6 +5396,498 @@
 </p:sld>
 </file>
 
+<file path=ppt/slides/slide20.xml><?xml version="1.0" encoding="utf-8"?>
+<p:sld xmlns:a="http://schemas.openxmlformats.org/drawingml/2006/main" xmlns:r="http://schemas.openxmlformats.org/officeDocument/2006/relationships" xmlns:p="http://schemas.openxmlformats.org/presentationml/2006/main">
+  <p:cSld>
+    <p:spTree>
+      <p:nvGrpSpPr>
+        <p:cNvPr id="1" name=""/>
+        <p:cNvGrpSpPr/>
+        <p:nvPr/>
+      </p:nvGrpSpPr>
+      <p:grpSpPr>
+        <a:xfrm>
+          <a:off x="0" y="0"/>
+          <a:ext cx="0" cy="0"/>
+          <a:chOff x="0" y="0"/>
+          <a:chExt cx="0" cy="0"/>
+        </a:xfrm>
+      </p:grpSpPr>
+      <p:sp>
+        <p:nvSpPr>
+          <p:cNvPr id="2" name="CuadroTexto 1">
+            <a:extLst>
+              <a:ext uri="{FF2B5EF4-FFF2-40B4-BE49-F238E27FC236}">
+                <a16:creationId xmlns:a16="http://schemas.microsoft.com/office/drawing/2014/main" id="{C2868FB5-BED5-419D-A369-D81E9F984AF1}"/>
+              </a:ext>
+            </a:extLst>
+          </p:cNvPr>
+          <p:cNvSpPr txBox="1"/>
+          <p:nvPr/>
+        </p:nvSpPr>
+        <p:spPr>
+          <a:xfrm>
+            <a:off x="600364" y="1277830"/>
+            <a:ext cx="10935854" cy="2000548"/>
+          </a:xfrm>
+          <a:prstGeom prst="rect">
+            <a:avLst/>
+          </a:prstGeom>
+          <a:noFill/>
+        </p:spPr>
+        <p:txBody>
+          <a:bodyPr wrap="square" rtlCol="0">
+            <a:spAutoFit/>
+          </a:bodyPr>
+          <a:lstStyle/>
+          <a:p>
+            <a:r>
+              <a:rPr lang="es-ES" sz="2400" dirty="0">
+                <a:solidFill>
+                  <a:srgbClr val="6494ED"/>
+                </a:solidFill>
+                <a:latin typeface="Hypatia Sans Pro" panose="020B0502020204020303" pitchFamily="34" charset="0"/>
+                <a:ea typeface="+mj-ea"/>
+                <a:cs typeface="+mj-cs"/>
+              </a:rPr>
+              <a:t>Revisión del </a:t>
+            </a:r>
+            <a:r>
+              <a:rPr lang="es-ES" sz="2400" dirty="0" err="1">
+                <a:solidFill>
+                  <a:srgbClr val="6494ED"/>
+                </a:solidFill>
+                <a:latin typeface="Hypatia Sans Pro" panose="020B0502020204020303" pitchFamily="34" charset="0"/>
+                <a:ea typeface="+mj-ea"/>
+                <a:cs typeface="+mj-cs"/>
+              </a:rPr>
+              <a:t>dump</a:t>
+            </a:r>
+            <a:r>
+              <a:rPr lang="es-ES" sz="2400" dirty="0">
+                <a:solidFill>
+                  <a:srgbClr val="6494ED"/>
+                </a:solidFill>
+                <a:latin typeface="Hypatia Sans Pro" panose="020B0502020204020303" pitchFamily="34" charset="0"/>
+                <a:ea typeface="+mj-ea"/>
+                <a:cs typeface="+mj-cs"/>
+              </a:rPr>
+              <a:t> de Universidad de Murcia: Patentes</a:t>
+            </a:r>
+          </a:p>
+          <a:p>
+            <a:endParaRPr lang="es-ES" sz="2000" dirty="0"/>
+          </a:p>
+          <a:p>
+            <a:pPr marL="342900" indent="-342900">
+              <a:buFont typeface="Wingdings" panose="05000000000000000000" pitchFamily="2" charset="2"/>
+              <a:buChar char="q"/>
+            </a:pPr>
+            <a:r>
+              <a:rPr lang="es-ES" sz="2000" dirty="0"/>
+              <a:t>Existe la entidad </a:t>
+            </a:r>
+            <a:r>
+              <a:rPr lang="es-ES" sz="2000" dirty="0" err="1"/>
+              <a:t>Patent</a:t>
+            </a:r>
+            <a:r>
+              <a:rPr lang="es-ES" sz="2000" dirty="0"/>
+              <a:t> en ROH</a:t>
+            </a:r>
+          </a:p>
+          <a:p>
+            <a:pPr marL="342900" indent="-342900">
+              <a:buFont typeface="Wingdings" panose="05000000000000000000" pitchFamily="2" charset="2"/>
+              <a:buChar char="q"/>
+            </a:pPr>
+            <a:r>
+              <a:rPr lang="es-ES" sz="2000" dirty="0"/>
+              <a:t>Sería necesario enriquecer con muchos metadatos la información de patentes: titulares, países, costes, inventores, sectores industriales </a:t>
+            </a:r>
+          </a:p>
+          <a:p>
+            <a:pPr marL="342900" indent="-342900">
+              <a:buFont typeface="Wingdings" panose="05000000000000000000" pitchFamily="2" charset="2"/>
+              <a:buChar char="q"/>
+            </a:pPr>
+            <a:endParaRPr lang="es-ES" sz="2000" dirty="0"/>
+          </a:p>
+        </p:txBody>
+      </p:sp>
+    </p:spTree>
+    <p:extLst>
+      <p:ext uri="{BB962C8B-B14F-4D97-AF65-F5344CB8AC3E}">
+        <p14:creationId xmlns:p14="http://schemas.microsoft.com/office/powerpoint/2010/main" val="934761999"/>
+      </p:ext>
+    </p:extLst>
+  </p:cSld>
+  <p:clrMapOvr>
+    <a:masterClrMapping/>
+  </p:clrMapOvr>
+</p:sld>
+</file>
+
+<file path=ppt/slides/slide21.xml><?xml version="1.0" encoding="utf-8"?>
+<p:sld xmlns:a="http://schemas.openxmlformats.org/drawingml/2006/main" xmlns:r="http://schemas.openxmlformats.org/officeDocument/2006/relationships" xmlns:p="http://schemas.openxmlformats.org/presentationml/2006/main">
+  <p:cSld>
+    <p:spTree>
+      <p:nvGrpSpPr>
+        <p:cNvPr id="1" name=""/>
+        <p:cNvGrpSpPr/>
+        <p:nvPr/>
+      </p:nvGrpSpPr>
+      <p:grpSpPr>
+        <a:xfrm>
+          <a:off x="0" y="0"/>
+          <a:ext cx="0" cy="0"/>
+          <a:chOff x="0" y="0"/>
+          <a:chExt cx="0" cy="0"/>
+        </a:xfrm>
+      </p:grpSpPr>
+      <p:sp>
+        <p:nvSpPr>
+          <p:cNvPr id="2" name="CuadroTexto 1">
+            <a:extLst>
+              <a:ext uri="{FF2B5EF4-FFF2-40B4-BE49-F238E27FC236}">
+                <a16:creationId xmlns:a16="http://schemas.microsoft.com/office/drawing/2014/main" id="{C2868FB5-BED5-419D-A369-D81E9F984AF1}"/>
+              </a:ext>
+            </a:extLst>
+          </p:cNvPr>
+          <p:cNvSpPr txBox="1"/>
+          <p:nvPr/>
+        </p:nvSpPr>
+        <p:spPr>
+          <a:xfrm>
+            <a:off x="600364" y="1277830"/>
+            <a:ext cx="10935854" cy="1692771"/>
+          </a:xfrm>
+          <a:prstGeom prst="rect">
+            <a:avLst/>
+          </a:prstGeom>
+          <a:noFill/>
+        </p:spPr>
+        <p:txBody>
+          <a:bodyPr wrap="square" rtlCol="0">
+            <a:spAutoFit/>
+          </a:bodyPr>
+          <a:lstStyle/>
+          <a:p>
+            <a:r>
+              <a:rPr lang="es-ES" sz="2400" dirty="0">
+                <a:solidFill>
+                  <a:srgbClr val="6494ED"/>
+                </a:solidFill>
+                <a:latin typeface="Hypatia Sans Pro" panose="020B0502020204020303" pitchFamily="34" charset="0"/>
+                <a:ea typeface="+mj-ea"/>
+                <a:cs typeface="+mj-cs"/>
+              </a:rPr>
+              <a:t>Revisión del </a:t>
+            </a:r>
+            <a:r>
+              <a:rPr lang="es-ES" sz="2400" dirty="0" err="1">
+                <a:solidFill>
+                  <a:srgbClr val="6494ED"/>
+                </a:solidFill>
+                <a:latin typeface="Hypatia Sans Pro" panose="020B0502020204020303" pitchFamily="34" charset="0"/>
+                <a:ea typeface="+mj-ea"/>
+                <a:cs typeface="+mj-cs"/>
+              </a:rPr>
+              <a:t>dump</a:t>
+            </a:r>
+            <a:r>
+              <a:rPr lang="es-ES" sz="2400" dirty="0">
+                <a:solidFill>
+                  <a:srgbClr val="6494ED"/>
+                </a:solidFill>
+                <a:latin typeface="Hypatia Sans Pro" panose="020B0502020204020303" pitchFamily="34" charset="0"/>
+                <a:ea typeface="+mj-ea"/>
+                <a:cs typeface="+mj-cs"/>
+              </a:rPr>
+              <a:t> de Universidad de Murcia: Goliat</a:t>
+            </a:r>
+          </a:p>
+          <a:p>
+            <a:endParaRPr lang="es-ES" sz="2000" dirty="0"/>
+          </a:p>
+          <a:p>
+            <a:pPr marL="342900" indent="-342900">
+              <a:buFont typeface="Wingdings" panose="05000000000000000000" pitchFamily="2" charset="2"/>
+              <a:buChar char="q"/>
+            </a:pPr>
+            <a:r>
+              <a:rPr lang="es-ES" sz="2000" dirty="0"/>
+              <a:t>Las alarmas no están modeladas en ROH</a:t>
+            </a:r>
+          </a:p>
+          <a:p>
+            <a:pPr marL="342900" indent="-342900">
+              <a:buFont typeface="Wingdings" panose="05000000000000000000" pitchFamily="2" charset="2"/>
+              <a:buChar char="q"/>
+            </a:pPr>
+            <a:r>
+              <a:rPr lang="es-ES" sz="2000" dirty="0" err="1"/>
+              <a:t>Workpackage</a:t>
+            </a:r>
+            <a:r>
+              <a:rPr lang="es-ES" sz="2000" dirty="0"/>
+              <a:t>, </a:t>
+            </a:r>
+            <a:r>
+              <a:rPr lang="es-ES" sz="2000" dirty="0" err="1"/>
+              <a:t>work</a:t>
+            </a:r>
+            <a:r>
+              <a:rPr lang="es-ES" sz="2000" dirty="0"/>
+              <a:t> </a:t>
+            </a:r>
+            <a:r>
+              <a:rPr lang="es-ES" sz="2000" dirty="0" err="1"/>
+              <a:t>description</a:t>
+            </a:r>
+            <a:r>
+              <a:rPr lang="es-ES" sz="2000" dirty="0"/>
+              <a:t>, </a:t>
+            </a:r>
+            <a:r>
+              <a:rPr lang="es-ES" sz="2000" dirty="0" err="1"/>
+              <a:t>timesheets</a:t>
+            </a:r>
+            <a:r>
+              <a:rPr lang="es-ES" sz="2000" dirty="0"/>
+              <a:t> no están descritos en ROH</a:t>
+            </a:r>
+          </a:p>
+          <a:p>
+            <a:pPr marL="342900" indent="-342900">
+              <a:buFont typeface="Wingdings" panose="05000000000000000000" pitchFamily="2" charset="2"/>
+              <a:buChar char="q"/>
+            </a:pPr>
+            <a:endParaRPr lang="es-ES" sz="2000" dirty="0"/>
+          </a:p>
+        </p:txBody>
+      </p:sp>
+    </p:spTree>
+    <p:extLst>
+      <p:ext uri="{BB962C8B-B14F-4D97-AF65-F5344CB8AC3E}">
+        <p14:creationId xmlns:p14="http://schemas.microsoft.com/office/powerpoint/2010/main" val="3963684416"/>
+      </p:ext>
+    </p:extLst>
+  </p:cSld>
+  <p:clrMapOvr>
+    <a:masterClrMapping/>
+  </p:clrMapOvr>
+</p:sld>
+</file>
+
+<file path=ppt/slides/slide22.xml><?xml version="1.0" encoding="utf-8"?>
+<p:sld xmlns:a="http://schemas.openxmlformats.org/drawingml/2006/main" xmlns:r="http://schemas.openxmlformats.org/officeDocument/2006/relationships" xmlns:p="http://schemas.openxmlformats.org/presentationml/2006/main">
+  <p:cSld>
+    <p:spTree>
+      <p:nvGrpSpPr>
+        <p:cNvPr id="1" name=""/>
+        <p:cNvGrpSpPr/>
+        <p:nvPr/>
+      </p:nvGrpSpPr>
+      <p:grpSpPr>
+        <a:xfrm>
+          <a:off x="0" y="0"/>
+          <a:ext cx="0" cy="0"/>
+          <a:chOff x="0" y="0"/>
+          <a:chExt cx="0" cy="0"/>
+        </a:xfrm>
+      </p:grpSpPr>
+      <p:sp>
+        <p:nvSpPr>
+          <p:cNvPr id="2" name="CuadroTexto 1">
+            <a:extLst>
+              <a:ext uri="{FF2B5EF4-FFF2-40B4-BE49-F238E27FC236}">
+                <a16:creationId xmlns:a16="http://schemas.microsoft.com/office/drawing/2014/main" id="{C2868FB5-BED5-419D-A369-D81E9F984AF1}"/>
+              </a:ext>
+            </a:extLst>
+          </p:cNvPr>
+          <p:cNvSpPr txBox="1"/>
+          <p:nvPr/>
+        </p:nvSpPr>
+        <p:spPr>
+          <a:xfrm>
+            <a:off x="600364" y="1277830"/>
+            <a:ext cx="10935854" cy="3539430"/>
+          </a:xfrm>
+          <a:prstGeom prst="rect">
+            <a:avLst/>
+          </a:prstGeom>
+          <a:noFill/>
+        </p:spPr>
+        <p:txBody>
+          <a:bodyPr wrap="square" rtlCol="0">
+            <a:spAutoFit/>
+          </a:bodyPr>
+          <a:lstStyle/>
+          <a:p>
+            <a:r>
+              <a:rPr lang="es-ES" sz="2400" dirty="0">
+                <a:solidFill>
+                  <a:srgbClr val="6494ED"/>
+                </a:solidFill>
+                <a:latin typeface="Hypatia Sans Pro" panose="020B0502020204020303" pitchFamily="34" charset="0"/>
+                <a:ea typeface="+mj-ea"/>
+                <a:cs typeface="+mj-cs"/>
+              </a:rPr>
+              <a:t>Revisión del </a:t>
+            </a:r>
+            <a:r>
+              <a:rPr lang="es-ES" sz="2400" dirty="0" err="1">
+                <a:solidFill>
+                  <a:srgbClr val="6494ED"/>
+                </a:solidFill>
+                <a:latin typeface="Hypatia Sans Pro" panose="020B0502020204020303" pitchFamily="34" charset="0"/>
+                <a:ea typeface="+mj-ea"/>
+                <a:cs typeface="+mj-cs"/>
+              </a:rPr>
+              <a:t>dump</a:t>
+            </a:r>
+            <a:r>
+              <a:rPr lang="es-ES" sz="2400" dirty="0">
+                <a:solidFill>
+                  <a:srgbClr val="6494ED"/>
+                </a:solidFill>
+                <a:latin typeface="Hypatia Sans Pro" panose="020B0502020204020303" pitchFamily="34" charset="0"/>
+                <a:ea typeface="+mj-ea"/>
+                <a:cs typeface="+mj-cs"/>
+              </a:rPr>
+              <a:t> de Universidad de Murcia: Página</a:t>
+            </a:r>
+          </a:p>
+          <a:p>
+            <a:endParaRPr lang="es-ES" sz="2000" dirty="0"/>
+          </a:p>
+          <a:p>
+            <a:pPr marL="342900" indent="-342900">
+              <a:buFont typeface="Wingdings" panose="05000000000000000000" pitchFamily="2" charset="2"/>
+              <a:buChar char="q"/>
+            </a:pPr>
+            <a:r>
+              <a:rPr lang="es-ES" sz="2000" dirty="0"/>
+              <a:t>Existe una entidad </a:t>
+            </a:r>
+            <a:r>
+              <a:rPr lang="es-ES" sz="2000" dirty="0" err="1"/>
+              <a:t>Webpage</a:t>
+            </a:r>
+            <a:r>
+              <a:rPr lang="es-ES" sz="2000" dirty="0"/>
+              <a:t> que deriva de </a:t>
+            </a:r>
+            <a:r>
+              <a:rPr lang="es-ES" sz="2000" dirty="0" err="1"/>
+              <a:t>Document</a:t>
+            </a:r>
+            <a:r>
+              <a:rPr lang="es-ES" sz="2000" dirty="0"/>
+              <a:t> </a:t>
+            </a:r>
+          </a:p>
+          <a:p>
+            <a:pPr marL="342900" indent="-342900">
+              <a:buFont typeface="Wingdings" panose="05000000000000000000" pitchFamily="2" charset="2"/>
+              <a:buChar char="q"/>
+            </a:pPr>
+            <a:r>
+              <a:rPr lang="es-ES" sz="2000" dirty="0"/>
+              <a:t>Deberíamos crear </a:t>
+            </a:r>
+            <a:r>
+              <a:rPr lang="es-ES" sz="2000" dirty="0" err="1"/>
+              <a:t>ResearchGroupWebPage</a:t>
+            </a:r>
+            <a:r>
+              <a:rPr lang="es-ES" sz="2000" dirty="0"/>
+              <a:t> derivando de ella y relacionada con </a:t>
+            </a:r>
+            <a:r>
+              <a:rPr lang="es-ES" sz="2000" dirty="0" err="1"/>
+              <a:t>Organization</a:t>
+            </a:r>
+            <a:endParaRPr lang="es-ES" sz="2000" dirty="0"/>
+          </a:p>
+          <a:p>
+            <a:pPr marL="342900" indent="-342900">
+              <a:buFont typeface="Wingdings" panose="05000000000000000000" pitchFamily="2" charset="2"/>
+              <a:buChar char="q"/>
+            </a:pPr>
+            <a:r>
+              <a:rPr lang="es-ES" sz="2000" dirty="0"/>
+              <a:t>Página de alegaciones y reclamaciones no existe, ni hay concepto</a:t>
+            </a:r>
+          </a:p>
+          <a:p>
+            <a:pPr marL="342900" indent="-342900">
+              <a:buFont typeface="Wingdings" panose="05000000000000000000" pitchFamily="2" charset="2"/>
+              <a:buChar char="q"/>
+            </a:pPr>
+            <a:r>
+              <a:rPr lang="es-ES" sz="2000" dirty="0"/>
+              <a:t>Página de producción científica sería generable a partir de los datos de un grupo podrían generarse los detalles de producción científica de tal grupo</a:t>
+            </a:r>
+          </a:p>
+          <a:p>
+            <a:pPr marL="342900" indent="-342900">
+              <a:buFont typeface="Wingdings" panose="05000000000000000000" pitchFamily="2" charset="2"/>
+              <a:buChar char="q"/>
+            </a:pPr>
+            <a:r>
+              <a:rPr lang="es-ES" sz="2000" dirty="0"/>
+              <a:t>Página de participación en congresos también podría generarse a partir de </a:t>
+            </a:r>
+            <a:r>
+              <a:rPr lang="es-ES" sz="2000" dirty="0" err="1"/>
+              <a:t>Activity</a:t>
+            </a:r>
+            <a:endParaRPr lang="es-ES" sz="2000" dirty="0"/>
+          </a:p>
+          <a:p>
+            <a:pPr marL="342900" indent="-342900">
+              <a:buFont typeface="Wingdings" panose="05000000000000000000" pitchFamily="2" charset="2"/>
+              <a:buChar char="q"/>
+            </a:pPr>
+            <a:r>
+              <a:rPr lang="es-ES" sz="2000" dirty="0"/>
+              <a:t>No tengo claro Diseños, Estancias, Producción científica externa, Patentes, Tesis dirigidas</a:t>
+            </a:r>
+          </a:p>
+          <a:p>
+            <a:pPr marL="800100" lvl="1" indent="-342900">
+              <a:buFont typeface="Arial" panose="020B0604020202020204" pitchFamily="34" charset="0"/>
+              <a:buChar char="•"/>
+            </a:pPr>
+            <a:r>
+              <a:rPr lang="es-ES" sz="2000" dirty="0"/>
+              <a:t>Revisar qué páginas de qué conceptos de ROH deben generarse</a:t>
+            </a:r>
+          </a:p>
+          <a:p>
+            <a:pPr marL="342900" indent="-342900">
+              <a:buFont typeface="Wingdings" panose="05000000000000000000" pitchFamily="2" charset="2"/>
+              <a:buChar char="q"/>
+            </a:pPr>
+            <a:endParaRPr lang="es-ES" sz="2000" dirty="0"/>
+          </a:p>
+        </p:txBody>
+      </p:sp>
+    </p:spTree>
+    <p:extLst>
+      <p:ext uri="{BB962C8B-B14F-4D97-AF65-F5344CB8AC3E}">
+        <p14:creationId xmlns:p14="http://schemas.microsoft.com/office/powerpoint/2010/main" val="1901421524"/>
+      </p:ext>
+    </p:extLst>
+  </p:cSld>
+  <p:clrMapOvr>
+    <a:masterClrMapping/>
+  </p:clrMapOvr>
+</p:sld>
+</file>
+
 <file path=ppt/slides/slide3.xml><?xml version="1.0" encoding="utf-8"?>
 <p:sld xmlns:a="http://schemas.openxmlformats.org/drawingml/2006/main" xmlns:r="http://schemas.openxmlformats.org/officeDocument/2006/relationships" xmlns:p="http://schemas.openxmlformats.org/presentationml/2006/main">
   <p:cSld>
@@ -3930,6 +6157,1536 @@
         </p:nvSpPr>
         <p:spPr>
           <a:xfrm>
+            <a:off x="600364" y="1064869"/>
+            <a:ext cx="10935854" cy="984885"/>
+          </a:xfrm>
+          <a:prstGeom prst="rect">
+            <a:avLst/>
+          </a:prstGeom>
+          <a:noFill/>
+        </p:spPr>
+        <p:txBody>
+          <a:bodyPr wrap="square" rtlCol="0">
+            <a:spAutoFit/>
+          </a:bodyPr>
+          <a:lstStyle/>
+          <a:p>
+            <a:r>
+              <a:rPr lang="es-ES" sz="2800" dirty="0">
+                <a:solidFill>
+                  <a:srgbClr val="6494ED"/>
+                </a:solidFill>
+                <a:latin typeface="Hypatia Sans Pro" panose="020B0502020204020303" pitchFamily="34" charset="0"/>
+                <a:ea typeface="+mj-ea"/>
+                <a:cs typeface="+mj-cs"/>
+              </a:rPr>
+              <a:t>Ontologías reutilizadas</a:t>
+            </a:r>
+          </a:p>
+          <a:p>
+            <a:endParaRPr lang="es-ES" sz="600" dirty="0"/>
+          </a:p>
+          <a:p>
+            <a:endParaRPr lang="es-ES" sz="2400" dirty="0"/>
+          </a:p>
+        </p:txBody>
+      </p:sp>
+      <p:graphicFrame>
+        <p:nvGraphicFramePr>
+          <p:cNvPr id="3" name="Table 3">
+            <a:extLst>
+              <a:ext uri="{FF2B5EF4-FFF2-40B4-BE49-F238E27FC236}">
+                <a16:creationId xmlns:a16="http://schemas.microsoft.com/office/drawing/2014/main" id="{94904F81-48AC-408D-8DEB-2A1F2104C8E7}"/>
+              </a:ext>
+            </a:extLst>
+          </p:cNvPr>
+          <p:cNvGraphicFramePr>
+            <a:graphicFrameLocks noGrp="1"/>
+          </p:cNvGraphicFramePr>
+          <p:nvPr>
+            <p:extLst>
+              <p:ext uri="{D42A27DB-BD31-4B8C-83A1-F6EECF244321}">
+                <p14:modId xmlns:p14="http://schemas.microsoft.com/office/powerpoint/2010/main" val="1211252382"/>
+              </p:ext>
+            </p:extLst>
+          </p:nvPr>
+        </p:nvGraphicFramePr>
+        <p:xfrm>
+          <a:off x="203199" y="1472387"/>
+          <a:ext cx="11474027" cy="5550333"/>
+        </p:xfrm>
+        <a:graphic>
+          <a:graphicData uri="http://schemas.openxmlformats.org/drawingml/2006/table">
+            <a:tbl>
+              <a:tblPr firstRow="1" bandRow="1">
+                <a:tableStyleId>{5C22544A-7EE6-4342-B048-85BDC9FD1C3A}</a:tableStyleId>
+              </a:tblPr>
+              <a:tblGrid>
+                <a:gridCol w="792481">
+                  <a:extLst>
+                    <a:ext uri="{9D8B030D-6E8A-4147-A177-3AD203B41FA5}">
+                      <a16:colId xmlns:a16="http://schemas.microsoft.com/office/drawing/2014/main" val="834922122"/>
+                    </a:ext>
+                  </a:extLst>
+                </a:gridCol>
+                <a:gridCol w="2208107">
+                  <a:extLst>
+                    <a:ext uri="{9D8B030D-6E8A-4147-A177-3AD203B41FA5}">
+                      <a16:colId xmlns:a16="http://schemas.microsoft.com/office/drawing/2014/main" val="3357444744"/>
+                    </a:ext>
+                  </a:extLst>
+                </a:gridCol>
+                <a:gridCol w="8473439">
+                  <a:extLst>
+                    <a:ext uri="{9D8B030D-6E8A-4147-A177-3AD203B41FA5}">
+                      <a16:colId xmlns:a16="http://schemas.microsoft.com/office/drawing/2014/main" val="2843184187"/>
+                    </a:ext>
+                  </a:extLst>
+                </a:gridCol>
+              </a:tblGrid>
+              <a:tr h="342771">
+                <a:tc>
+                  <a:txBody>
+                    <a:bodyPr/>
+                    <a:lstStyle/>
+                    <a:p>
+                      <a:pPr algn="ctr"/>
+                      <a:r>
+                        <a:rPr lang="en-GB" sz="1000" dirty="0"/>
+                        <a:t>Prefix</a:t>
+                      </a:r>
+                    </a:p>
+                  </a:txBody>
+                  <a:tcPr/>
+                </a:tc>
+                <a:tc>
+                  <a:txBody>
+                    <a:bodyPr/>
+                    <a:lstStyle/>
+                    <a:p>
+                      <a:pPr algn="ctr"/>
+                      <a:r>
+                        <a:rPr lang="en-GB" sz="1000" dirty="0" err="1"/>
+                        <a:t>Ontología</a:t>
+                      </a:r>
+                      <a:endParaRPr lang="en-GB" sz="1000" dirty="0"/>
+                    </a:p>
+                  </a:txBody>
+                  <a:tcPr/>
+                </a:tc>
+                <a:tc>
+                  <a:txBody>
+                    <a:bodyPr/>
+                    <a:lstStyle/>
+                    <a:p>
+                      <a:pPr algn="ctr"/>
+                      <a:r>
+                        <a:rPr lang="en-GB" sz="1000" dirty="0" err="1"/>
+                        <a:t>Propósito</a:t>
+                      </a:r>
+                      <a:r>
+                        <a:rPr lang="en-GB" sz="1000" dirty="0"/>
+                        <a:t> </a:t>
+                      </a:r>
+                      <a:r>
+                        <a:rPr lang="en-GB" sz="1000" dirty="0" err="1"/>
+                        <a:t>en</a:t>
+                      </a:r>
+                      <a:r>
+                        <a:rPr lang="en-GB" sz="1000" dirty="0"/>
+                        <a:t> ROH</a:t>
+                      </a:r>
+                    </a:p>
+                  </a:txBody>
+                  <a:tcPr/>
+                </a:tc>
+                <a:extLst>
+                  <a:ext uri="{0D108BD9-81ED-4DB2-BD59-A6C34878D82A}">
+                    <a16:rowId xmlns:a16="http://schemas.microsoft.com/office/drawing/2014/main" val="4041336502"/>
+                  </a:ext>
+                </a:extLst>
+              </a:tr>
+              <a:tr h="342771">
+                <a:tc>
+                  <a:txBody>
+                    <a:bodyPr/>
+                    <a:lstStyle/>
+                    <a:p>
+                      <a:pPr algn="ctr" fontAlgn="b"/>
+                      <a:r>
+                        <a:rPr lang="es-ES" sz="1000" kern="1200" dirty="0" err="1">
+                          <a:solidFill>
+                            <a:schemeClr val="dk1"/>
+                          </a:solidFill>
+                          <a:latin typeface="Courier New" panose="02070309020205020404" pitchFamily="49" charset="0"/>
+                          <a:ea typeface="+mn-ea"/>
+                          <a:cs typeface="Courier New" panose="02070309020205020404" pitchFamily="49" charset="0"/>
+                        </a:rPr>
+                        <a:t>Bibo</a:t>
+                      </a:r>
+                      <a:endParaRPr lang="es-ES" sz="1000" kern="1200" dirty="0">
+                        <a:solidFill>
+                          <a:schemeClr val="dk1"/>
+                        </a:solidFill>
+                        <a:latin typeface="Courier New" panose="02070309020205020404" pitchFamily="49" charset="0"/>
+                        <a:ea typeface="+mn-ea"/>
+                        <a:cs typeface="Courier New" panose="02070309020205020404" pitchFamily="49" charset="0"/>
+                      </a:endParaRPr>
+                    </a:p>
+                  </a:txBody>
+                  <a:tcPr marL="7620" marR="7620" marT="7620" marB="0" anchor="b"/>
+                </a:tc>
+                <a:tc>
+                  <a:txBody>
+                    <a:bodyPr/>
+                    <a:lstStyle/>
+                    <a:p>
+                      <a:pPr algn="l" fontAlgn="b"/>
+                      <a:r>
+                        <a:rPr lang="es-ES" sz="1000" kern="1200" dirty="0">
+                          <a:solidFill>
+                            <a:schemeClr val="dk1"/>
+                          </a:solidFill>
+                          <a:latin typeface="+mn-lt"/>
+                          <a:ea typeface="+mn-ea"/>
+                          <a:cs typeface="+mn-cs"/>
+                          <a:hlinkClick r:id="rId2"/>
+                        </a:rPr>
+                        <a:t>http://purl.org/ontology/bibo/</a:t>
+                      </a:r>
+                      <a:r>
+                        <a:rPr lang="es-ES" sz="1000" kern="1200" dirty="0">
+                          <a:solidFill>
+                            <a:schemeClr val="dk1"/>
+                          </a:solidFill>
+                          <a:latin typeface="+mn-lt"/>
+                          <a:ea typeface="+mn-ea"/>
+                          <a:cs typeface="+mn-cs"/>
+                        </a:rPr>
+                        <a:t> </a:t>
+                      </a:r>
+                    </a:p>
+                  </a:txBody>
+                  <a:tcPr marL="7620" marR="7620" marT="7620" marB="0" anchor="b"/>
+                </a:tc>
+                <a:tc>
+                  <a:txBody>
+                    <a:bodyPr/>
+                    <a:lstStyle/>
+                    <a:p>
+                      <a:r>
+                        <a:rPr lang="en-US" sz="1000" dirty="0" err="1"/>
+                        <a:t>ResearchObjects</a:t>
+                      </a:r>
+                      <a:r>
+                        <a:rPr lang="en-US" sz="1000" dirty="0"/>
+                        <a:t> </a:t>
+                      </a:r>
+                      <a:r>
+                        <a:rPr lang="en-US" sz="1000" dirty="0" err="1"/>
+                        <a:t>relacionado</a:t>
+                      </a:r>
+                      <a:r>
+                        <a:rPr lang="en-US" sz="1000" dirty="0"/>
+                        <a:t> con </a:t>
+                      </a:r>
+                      <a:r>
+                        <a:rPr lang="en-US" sz="1000" dirty="0" err="1"/>
+                        <a:t>publicación</a:t>
+                      </a:r>
+                      <a:r>
+                        <a:rPr lang="en-US" sz="1000" dirty="0"/>
+                        <a:t> </a:t>
+                      </a:r>
+                      <a:r>
+                        <a:rPr lang="en-US" sz="1000" dirty="0" err="1"/>
+                        <a:t>basado</a:t>
+                      </a:r>
+                      <a:r>
+                        <a:rPr lang="en-US" sz="1000" dirty="0"/>
+                        <a:t> </a:t>
+                      </a:r>
+                      <a:r>
+                        <a:rPr lang="en-US" sz="1000" dirty="0" err="1"/>
+                        <a:t>en</a:t>
+                      </a:r>
+                      <a:r>
+                        <a:rPr lang="en-US" sz="1000" dirty="0"/>
+                        <a:t> los </a:t>
+                      </a:r>
+                      <a:r>
+                        <a:rPr lang="en-US" sz="1000" dirty="0" err="1"/>
+                        <a:t>tipos</a:t>
+                      </a:r>
+                      <a:r>
+                        <a:rPr lang="en-US" sz="1000" dirty="0"/>
+                        <a:t> </a:t>
+                      </a:r>
+                      <a:r>
+                        <a:rPr lang="en-US" sz="1000" dirty="0" err="1"/>
+                        <a:t>definidos</a:t>
+                      </a:r>
+                      <a:r>
+                        <a:rPr lang="en-US" sz="1000" dirty="0"/>
+                        <a:t> </a:t>
+                      </a:r>
+                      <a:r>
+                        <a:rPr lang="en-US" sz="1000" dirty="0" err="1"/>
+                        <a:t>en</a:t>
+                      </a:r>
+                      <a:r>
+                        <a:rPr lang="en-US" sz="1000" dirty="0"/>
+                        <a:t> BIBO. </a:t>
+                      </a:r>
+                      <a:r>
+                        <a:rPr lang="en-US" sz="1000" dirty="0" err="1"/>
+                        <a:t>Actualmente</a:t>
+                      </a:r>
+                      <a:r>
+                        <a:rPr lang="en-US" sz="1000" dirty="0"/>
+                        <a:t>, el </a:t>
+                      </a:r>
+                      <a:r>
+                        <a:rPr lang="en-US" sz="1000" dirty="0" err="1"/>
+                        <a:t>siguiente</a:t>
+                      </a:r>
+                      <a:r>
+                        <a:rPr lang="en-US" sz="1000" dirty="0"/>
+                        <a:t> conjunto de </a:t>
+                      </a:r>
+                      <a:r>
+                        <a:rPr lang="en-US" sz="1000" dirty="0" err="1"/>
+                        <a:t>entidades</a:t>
+                      </a:r>
+                      <a:r>
+                        <a:rPr lang="en-US" sz="1000" dirty="0"/>
+                        <a:t> </a:t>
+                      </a:r>
+                      <a:r>
+                        <a:rPr lang="en-US" sz="1000" dirty="0" err="1"/>
+                        <a:t>relacionadas</a:t>
+                      </a:r>
+                      <a:r>
+                        <a:rPr lang="en-US" sz="1000" dirty="0"/>
+                        <a:t> a </a:t>
+                      </a:r>
+                      <a:r>
+                        <a:rPr lang="en-US" sz="1000" dirty="0" err="1"/>
+                        <a:t>publicaciones</a:t>
+                      </a:r>
+                      <a:r>
+                        <a:rPr lang="en-US" sz="1000" dirty="0"/>
+                        <a:t> son </a:t>
+                      </a:r>
+                      <a:r>
+                        <a:rPr lang="en-US" sz="1000" dirty="0" err="1"/>
+                        <a:t>soportados</a:t>
+                      </a:r>
+                      <a:r>
+                        <a:rPr lang="en-US" sz="1000" dirty="0"/>
+                        <a:t>: </a:t>
+                      </a:r>
+                      <a:r>
+                        <a:rPr lang="en-US" sz="1000" dirty="0" err="1"/>
+                        <a:t>bibo</a:t>
+                      </a:r>
+                      <a:r>
+                        <a:rPr lang="en-US" sz="1000" dirty="0"/>
+                        <a:t>: </a:t>
+                      </a:r>
+                      <a:r>
+                        <a:rPr lang="en-US" sz="1000" dirty="0" err="1"/>
+                        <a:t>bibo:Collection</a:t>
+                      </a:r>
+                      <a:r>
+                        <a:rPr lang="en-US" sz="1000" dirty="0"/>
+                        <a:t> (Periodical, Journal, Magazine y </a:t>
+                      </a:r>
+                      <a:r>
+                        <a:rPr lang="en-US" sz="1000" dirty="0" err="1"/>
+                        <a:t>bibo:Document</a:t>
+                      </a:r>
+                      <a:r>
+                        <a:rPr lang="en-US" sz="1000" dirty="0"/>
+                        <a:t> (Article, </a:t>
+                      </a:r>
+                      <a:r>
+                        <a:rPr lang="en-US" sz="1000" dirty="0" err="1"/>
+                        <a:t>ConferencePaper</a:t>
+                      </a:r>
+                      <a:r>
+                        <a:rPr lang="en-US" sz="1000" dirty="0"/>
+                        <a:t>, </a:t>
+                      </a:r>
+                      <a:r>
+                        <a:rPr lang="en-US" sz="1000" dirty="0" err="1"/>
+                        <a:t>EditorialArticle</a:t>
+                      </a:r>
+                      <a:r>
+                        <a:rPr lang="en-US" sz="1000" dirty="0"/>
+                        <a:t>, Book, Proceedings, </a:t>
+                      </a:r>
+                      <a:r>
+                        <a:rPr lang="en-US" sz="1000" dirty="0" err="1"/>
+                        <a:t>ConferencePaper</a:t>
+                      </a:r>
+                      <a:r>
+                        <a:rPr lang="en-US" sz="1000" dirty="0"/>
+                        <a:t>, Chapter, Thesis)</a:t>
+                      </a:r>
+                      <a:endParaRPr lang="en-GB" sz="1000" dirty="0"/>
+                    </a:p>
+                  </a:txBody>
+                  <a:tcPr/>
+                </a:tc>
+                <a:extLst>
+                  <a:ext uri="{0D108BD9-81ED-4DB2-BD59-A6C34878D82A}">
+                    <a16:rowId xmlns:a16="http://schemas.microsoft.com/office/drawing/2014/main" val="1523079415"/>
+                  </a:ext>
+                </a:extLst>
+              </a:tr>
+              <a:tr h="342771">
+                <a:tc>
+                  <a:txBody>
+                    <a:bodyPr/>
+                    <a:lstStyle/>
+                    <a:p>
+                      <a:pPr algn="ctr" fontAlgn="b"/>
+                      <a:r>
+                        <a:rPr lang="es-ES" sz="1000" kern="1200" dirty="0" err="1">
+                          <a:solidFill>
+                            <a:schemeClr val="dk1"/>
+                          </a:solidFill>
+                          <a:latin typeface="Courier New" panose="02070309020205020404" pitchFamily="49" charset="0"/>
+                          <a:ea typeface="+mn-ea"/>
+                          <a:cs typeface="Courier New" panose="02070309020205020404" pitchFamily="49" charset="0"/>
+                        </a:rPr>
+                        <a:t>Gn</a:t>
+                      </a:r>
+                      <a:endParaRPr lang="es-ES" sz="1000" kern="1200" dirty="0">
+                        <a:solidFill>
+                          <a:schemeClr val="dk1"/>
+                        </a:solidFill>
+                        <a:latin typeface="Courier New" panose="02070309020205020404" pitchFamily="49" charset="0"/>
+                        <a:ea typeface="+mn-ea"/>
+                        <a:cs typeface="Courier New" panose="02070309020205020404" pitchFamily="49" charset="0"/>
+                      </a:endParaRPr>
+                    </a:p>
+                  </a:txBody>
+                  <a:tcPr marL="7620" marR="7620" marT="7620" marB="0" anchor="b"/>
+                </a:tc>
+                <a:tc>
+                  <a:txBody>
+                    <a:bodyPr/>
+                    <a:lstStyle/>
+                    <a:p>
+                      <a:pPr algn="l" fontAlgn="b"/>
+                      <a:r>
+                        <a:rPr lang="es-ES" sz="1000" kern="1200" dirty="0">
+                          <a:solidFill>
+                            <a:schemeClr val="dk1"/>
+                          </a:solidFill>
+                          <a:latin typeface="+mn-lt"/>
+                          <a:ea typeface="+mn-ea"/>
+                          <a:cs typeface="+mn-cs"/>
+                          <a:hlinkClick r:id="rId3"/>
+                        </a:rPr>
+                        <a:t>http://www.geonames.org/ontology#</a:t>
+                      </a:r>
+                      <a:r>
+                        <a:rPr lang="es-ES" sz="1000" kern="1200" dirty="0">
+                          <a:solidFill>
+                            <a:schemeClr val="dk1"/>
+                          </a:solidFill>
+                          <a:latin typeface="+mn-lt"/>
+                          <a:ea typeface="+mn-ea"/>
+                          <a:cs typeface="+mn-cs"/>
+                        </a:rPr>
+                        <a:t>   </a:t>
+                      </a:r>
+                    </a:p>
+                  </a:txBody>
+                  <a:tcPr marL="7620" marR="7620" marT="7620" marB="0" anchor="b"/>
+                </a:tc>
+                <a:tc>
+                  <a:txBody>
+                    <a:bodyPr/>
+                    <a:lstStyle/>
+                    <a:p>
+                      <a:r>
+                        <a:rPr lang="en-GB" sz="1000" dirty="0" err="1"/>
+                        <a:t>Utilizada</a:t>
+                      </a:r>
+                      <a:r>
+                        <a:rPr lang="en-GB" sz="1000" dirty="0"/>
+                        <a:t> para </a:t>
+                      </a:r>
+                      <a:r>
+                        <a:rPr lang="en-GB" sz="1000" dirty="0" err="1"/>
+                        <a:t>asociar</a:t>
+                      </a:r>
+                      <a:r>
+                        <a:rPr lang="en-GB" sz="1000" dirty="0"/>
+                        <a:t> </a:t>
+                      </a:r>
+                      <a:r>
+                        <a:rPr lang="en-GB" sz="1000" dirty="0" err="1"/>
+                        <a:t>ámbito</a:t>
+                      </a:r>
+                      <a:r>
+                        <a:rPr lang="en-GB" sz="1000" dirty="0"/>
+                        <a:t> </a:t>
+                      </a:r>
+                      <a:r>
+                        <a:rPr lang="en-GB" sz="1000" dirty="0" err="1"/>
+                        <a:t>geográfico</a:t>
+                      </a:r>
+                      <a:r>
+                        <a:rPr lang="en-GB" sz="1000" dirty="0"/>
+                        <a:t> a Project, Activity and Organization</a:t>
+                      </a:r>
+                    </a:p>
+                  </a:txBody>
+                  <a:tcPr/>
+                </a:tc>
+                <a:extLst>
+                  <a:ext uri="{0D108BD9-81ED-4DB2-BD59-A6C34878D82A}">
+                    <a16:rowId xmlns:a16="http://schemas.microsoft.com/office/drawing/2014/main" val="2870440789"/>
+                  </a:ext>
+                </a:extLst>
+              </a:tr>
+              <a:tr h="514157">
+                <a:tc>
+                  <a:txBody>
+                    <a:bodyPr/>
+                    <a:lstStyle/>
+                    <a:p>
+                      <a:pPr algn="ctr" fontAlgn="b"/>
+                      <a:r>
+                        <a:rPr lang="es-ES" sz="1000" kern="1200" dirty="0" err="1">
+                          <a:solidFill>
+                            <a:schemeClr val="dk1"/>
+                          </a:solidFill>
+                          <a:latin typeface="Courier New" panose="02070309020205020404" pitchFamily="49" charset="0"/>
+                          <a:ea typeface="+mn-ea"/>
+                          <a:cs typeface="Courier New" panose="02070309020205020404" pitchFamily="49" charset="0"/>
+                        </a:rPr>
+                        <a:t>foaf</a:t>
+                      </a:r>
+                      <a:endParaRPr lang="es-ES" sz="1000" kern="1200" dirty="0">
+                        <a:solidFill>
+                          <a:schemeClr val="dk1"/>
+                        </a:solidFill>
+                        <a:latin typeface="Courier New" panose="02070309020205020404" pitchFamily="49" charset="0"/>
+                        <a:ea typeface="+mn-ea"/>
+                        <a:cs typeface="Courier New" panose="02070309020205020404" pitchFamily="49" charset="0"/>
+                      </a:endParaRPr>
+                    </a:p>
+                  </a:txBody>
+                  <a:tcPr marL="7620" marR="7620" marT="7620" marB="0" anchor="b"/>
+                </a:tc>
+                <a:tc>
+                  <a:txBody>
+                    <a:bodyPr/>
+                    <a:lstStyle/>
+                    <a:p>
+                      <a:pPr algn="l" fontAlgn="b"/>
+                      <a:r>
+                        <a:rPr lang="es-ES" sz="1000" kern="1200" dirty="0">
+                          <a:solidFill>
+                            <a:schemeClr val="dk1"/>
+                          </a:solidFill>
+                          <a:latin typeface="+mn-lt"/>
+                          <a:ea typeface="+mn-ea"/>
+                          <a:cs typeface="+mn-cs"/>
+                          <a:hlinkClick r:id="rId4"/>
+                        </a:rPr>
+                        <a:t>http://xmlns.com/foaf/0.1/Person</a:t>
+                      </a:r>
+                      <a:r>
+                        <a:rPr lang="es-ES" sz="1000" kern="1200" dirty="0">
+                          <a:solidFill>
+                            <a:schemeClr val="dk1"/>
+                          </a:solidFill>
+                          <a:latin typeface="+mn-lt"/>
+                          <a:ea typeface="+mn-ea"/>
+                          <a:cs typeface="+mn-cs"/>
+                        </a:rPr>
+                        <a:t> </a:t>
+                      </a:r>
+                    </a:p>
+                  </a:txBody>
+                  <a:tcPr marL="7620" marR="7620" marT="7620" marB="0" anchor="b"/>
+                </a:tc>
+                <a:tc>
+                  <a:txBody>
+                    <a:bodyPr/>
+                    <a:lstStyle/>
+                    <a:p>
+                      <a:r>
+                        <a:rPr lang="en-GB" sz="1000" dirty="0" err="1"/>
+                        <a:t>foaf:Agent</a:t>
+                      </a:r>
+                      <a:r>
+                        <a:rPr lang="en-GB" sz="1000" dirty="0"/>
+                        <a:t> con </a:t>
+                      </a:r>
+                      <a:r>
+                        <a:rPr lang="en-GB" sz="1000" dirty="0" err="1"/>
+                        <a:t>subclases</a:t>
+                      </a:r>
+                      <a:r>
+                        <a:rPr lang="en-GB" sz="1000" dirty="0"/>
+                        <a:t> </a:t>
+                      </a:r>
+                      <a:r>
+                        <a:rPr lang="en-GB" sz="1000" dirty="0" err="1"/>
+                        <a:t>foaf:Person</a:t>
+                      </a:r>
+                      <a:r>
+                        <a:rPr lang="en-GB" sz="1000" dirty="0"/>
+                        <a:t> y </a:t>
+                      </a:r>
+                      <a:r>
+                        <a:rPr lang="en-GB" sz="1000" dirty="0" err="1"/>
+                        <a:t>foaf:Organization</a:t>
+                      </a:r>
+                      <a:r>
+                        <a:rPr lang="en-GB" sz="1000" dirty="0"/>
+                        <a:t> y </a:t>
+                      </a:r>
+                      <a:r>
+                        <a:rPr lang="en-GB" sz="1000" dirty="0" err="1"/>
+                        <a:t>foaf:OnlineAccont</a:t>
+                      </a:r>
+                      <a:r>
+                        <a:rPr lang="en-GB" sz="1000" dirty="0"/>
+                        <a:t> son </a:t>
+                      </a:r>
+                      <a:r>
+                        <a:rPr lang="en-GB" sz="1000" dirty="0" err="1"/>
+                        <a:t>amplicamente</a:t>
+                      </a:r>
+                      <a:r>
+                        <a:rPr lang="en-GB" sz="1000" dirty="0"/>
+                        <a:t> </a:t>
+                      </a:r>
+                      <a:r>
+                        <a:rPr lang="en-GB" sz="1000" dirty="0" err="1"/>
+                        <a:t>utilizadas</a:t>
+                      </a:r>
+                      <a:r>
+                        <a:rPr lang="en-GB" sz="1000" dirty="0"/>
+                        <a:t> </a:t>
+                      </a:r>
+                      <a:r>
+                        <a:rPr lang="en-GB" sz="1000" dirty="0" err="1"/>
+                        <a:t>en</a:t>
+                      </a:r>
+                      <a:r>
+                        <a:rPr lang="en-GB" sz="1000" dirty="0"/>
+                        <a:t> ROH</a:t>
+                      </a:r>
+                    </a:p>
+                  </a:txBody>
+                  <a:tcPr/>
+                </a:tc>
+                <a:extLst>
+                  <a:ext uri="{0D108BD9-81ED-4DB2-BD59-A6C34878D82A}">
+                    <a16:rowId xmlns:a16="http://schemas.microsoft.com/office/drawing/2014/main" val="871703300"/>
+                  </a:ext>
+                </a:extLst>
+              </a:tr>
+              <a:tr h="514157">
+                <a:tc>
+                  <a:txBody>
+                    <a:bodyPr/>
+                    <a:lstStyle/>
+                    <a:p>
+                      <a:pPr algn="ctr" fontAlgn="b"/>
+                      <a:r>
+                        <a:rPr lang="es-ES" sz="1000" kern="1200" dirty="0" err="1">
+                          <a:solidFill>
+                            <a:schemeClr val="dk1"/>
+                          </a:solidFill>
+                          <a:latin typeface="Courier New" panose="02070309020205020404" pitchFamily="49" charset="0"/>
+                          <a:ea typeface="+mn-ea"/>
+                          <a:cs typeface="Courier New" panose="02070309020205020404" pitchFamily="49" charset="0"/>
+                        </a:rPr>
+                        <a:t>ns</a:t>
+                      </a:r>
+                      <a:endParaRPr lang="es-ES" sz="1000" kern="1200" dirty="0">
+                        <a:solidFill>
+                          <a:schemeClr val="dk1"/>
+                        </a:solidFill>
+                        <a:latin typeface="Courier New" panose="02070309020205020404" pitchFamily="49" charset="0"/>
+                        <a:ea typeface="+mn-ea"/>
+                        <a:cs typeface="Courier New" panose="02070309020205020404" pitchFamily="49" charset="0"/>
+                      </a:endParaRPr>
+                    </a:p>
+                  </a:txBody>
+                  <a:tcPr marL="7620" marR="7620" marT="7620" marB="0" anchor="b"/>
+                </a:tc>
+                <a:tc>
+                  <a:txBody>
+                    <a:bodyPr/>
+                    <a:lstStyle/>
+                    <a:p>
+                      <a:pPr algn="l" fontAlgn="b"/>
+                      <a:r>
+                        <a:rPr lang="es-ES" sz="1000" kern="1200" dirty="0">
+                          <a:solidFill>
+                            <a:schemeClr val="dk1"/>
+                          </a:solidFill>
+                          <a:latin typeface="+mn-lt"/>
+                          <a:ea typeface="+mn-ea"/>
+                          <a:cs typeface="+mn-cs"/>
+                          <a:hlinkClick r:id="rId5"/>
+                        </a:rPr>
+                        <a:t>http://creativecommons.org/ns#</a:t>
+                      </a:r>
+                      <a:r>
+                        <a:rPr lang="es-ES" sz="1000" kern="1200" dirty="0">
+                          <a:solidFill>
+                            <a:schemeClr val="dk1"/>
+                          </a:solidFill>
+                          <a:latin typeface="+mn-lt"/>
+                          <a:ea typeface="+mn-ea"/>
+                          <a:cs typeface="+mn-cs"/>
+                        </a:rPr>
+                        <a:t> </a:t>
+                      </a:r>
+                    </a:p>
+                  </a:txBody>
+                  <a:tcPr marL="7620" marR="7620" marT="7620" marB="0" anchor="b"/>
+                </a:tc>
+                <a:tc>
+                  <a:txBody>
+                    <a:bodyPr/>
+                    <a:lstStyle/>
+                    <a:p>
+                      <a:r>
+                        <a:rPr lang="en-GB" sz="1000" dirty="0" err="1"/>
+                        <a:t>Usado</a:t>
+                      </a:r>
+                      <a:r>
+                        <a:rPr lang="en-GB" sz="1000" dirty="0"/>
+                        <a:t> para </a:t>
+                      </a:r>
+                      <a:r>
+                        <a:rPr lang="en-GB" sz="1000" dirty="0" err="1"/>
+                        <a:t>vincular</a:t>
+                      </a:r>
+                      <a:r>
+                        <a:rPr lang="en-GB" sz="1000" dirty="0"/>
+                        <a:t> </a:t>
+                      </a:r>
+                      <a:r>
+                        <a:rPr lang="en-GB" sz="1000" dirty="0" err="1"/>
+                        <a:t>licencia</a:t>
+                      </a:r>
+                      <a:r>
+                        <a:rPr lang="en-GB" sz="1000" dirty="0"/>
+                        <a:t> Creative Commons Share Alike 4.0 a ROH</a:t>
+                      </a:r>
+                    </a:p>
+                  </a:txBody>
+                  <a:tcPr/>
+                </a:tc>
+                <a:extLst>
+                  <a:ext uri="{0D108BD9-81ED-4DB2-BD59-A6C34878D82A}">
+                    <a16:rowId xmlns:a16="http://schemas.microsoft.com/office/drawing/2014/main" val="3545582867"/>
+                  </a:ext>
+                </a:extLst>
+              </a:tr>
+              <a:tr h="514157">
+                <a:tc>
+                  <a:txBody>
+                    <a:bodyPr/>
+                    <a:lstStyle/>
+                    <a:p>
+                      <a:pPr algn="ctr" fontAlgn="b"/>
+                      <a:r>
+                        <a:rPr lang="es-ES" sz="1000" kern="1200" dirty="0" err="1">
+                          <a:solidFill>
+                            <a:schemeClr val="dk1"/>
+                          </a:solidFill>
+                          <a:latin typeface="Courier New" panose="02070309020205020404" pitchFamily="49" charset="0"/>
+                          <a:ea typeface="+mn-ea"/>
+                          <a:cs typeface="Courier New" panose="02070309020205020404" pitchFamily="49" charset="0"/>
+                        </a:rPr>
+                        <a:t>skos</a:t>
+                      </a:r>
+                      <a:endParaRPr lang="es-ES" sz="1000" kern="1200" dirty="0">
+                        <a:solidFill>
+                          <a:schemeClr val="dk1"/>
+                        </a:solidFill>
+                        <a:latin typeface="Courier New" panose="02070309020205020404" pitchFamily="49" charset="0"/>
+                        <a:ea typeface="+mn-ea"/>
+                        <a:cs typeface="Courier New" panose="02070309020205020404" pitchFamily="49" charset="0"/>
+                      </a:endParaRPr>
+                    </a:p>
+                  </a:txBody>
+                  <a:tcPr marL="7620" marR="7620" marT="7620" marB="0" anchor="b"/>
+                </a:tc>
+                <a:tc>
+                  <a:txBody>
+                    <a:bodyPr/>
+                    <a:lstStyle/>
+                    <a:p>
+                      <a:pPr algn="l" fontAlgn="b"/>
+                      <a:r>
+                        <a:rPr lang="es-ES" sz="1000" kern="1200" dirty="0">
+                          <a:solidFill>
+                            <a:schemeClr val="dk1"/>
+                          </a:solidFill>
+                          <a:latin typeface="+mn-lt"/>
+                          <a:ea typeface="+mn-ea"/>
+                          <a:cs typeface="+mn-cs"/>
+                          <a:hlinkClick r:id="rId6"/>
+                        </a:rPr>
+                        <a:t>http://www.w3.org/2004/02/skos/core</a:t>
+                      </a:r>
+                      <a:r>
+                        <a:rPr lang="es-ES" sz="1000" kern="1200" dirty="0">
+                          <a:solidFill>
+                            <a:schemeClr val="dk1"/>
+                          </a:solidFill>
+                          <a:latin typeface="+mn-lt"/>
+                          <a:ea typeface="+mn-ea"/>
+                          <a:cs typeface="+mn-cs"/>
+                        </a:rPr>
+                        <a:t> </a:t>
+                      </a:r>
+                    </a:p>
+                  </a:txBody>
+                  <a:tcPr marL="7620" marR="7620" marT="7620" marB="0" anchor="b"/>
+                </a:tc>
+                <a:tc>
+                  <a:txBody>
+                    <a:bodyPr/>
+                    <a:lstStyle/>
+                    <a:p>
+                      <a:r>
+                        <a:rPr lang="en-GB" sz="1000" dirty="0"/>
+                        <a:t>Se </a:t>
+                      </a:r>
+                      <a:r>
+                        <a:rPr lang="en-GB" sz="1000" dirty="0" err="1"/>
+                        <a:t>reutiliza</a:t>
+                      </a:r>
+                      <a:r>
+                        <a:rPr lang="en-GB" sz="1000" dirty="0"/>
+                        <a:t> </a:t>
+                      </a:r>
+                      <a:r>
+                        <a:rPr lang="en-GB" sz="1000" dirty="0" err="1"/>
+                        <a:t>skos:Concept</a:t>
+                      </a:r>
+                      <a:r>
+                        <a:rPr lang="en-GB" sz="1000" dirty="0"/>
+                        <a:t> que define </a:t>
+                      </a:r>
+                      <a:r>
+                        <a:rPr lang="en-GB" sz="1000" dirty="0" err="1"/>
+                        <a:t>subclasess</a:t>
+                      </a:r>
+                      <a:r>
+                        <a:rPr lang="en-GB" sz="1000" dirty="0"/>
+                        <a:t> </a:t>
+                      </a:r>
+                      <a:r>
+                        <a:rPr lang="en-GB" sz="1000" dirty="0" err="1"/>
+                        <a:t>roh:Keyword</a:t>
+                      </a:r>
+                      <a:r>
+                        <a:rPr lang="en-GB" sz="1000" dirty="0"/>
+                        <a:t>, </a:t>
+                      </a:r>
+                      <a:r>
+                        <a:rPr lang="en-GB" sz="1000" dirty="0" err="1"/>
+                        <a:t>roh:ResearchLine</a:t>
+                      </a:r>
+                      <a:r>
+                        <a:rPr lang="en-GB" sz="1000" dirty="0"/>
+                        <a:t> y </a:t>
+                      </a:r>
+                      <a:r>
+                        <a:rPr lang="en-GB" sz="1000" dirty="0" err="1"/>
+                        <a:t>rohes:KnowledgeArea</a:t>
+                      </a:r>
+                      <a:endParaRPr lang="en-GB" sz="1000" dirty="0"/>
+                    </a:p>
+                  </a:txBody>
+                  <a:tcPr/>
+                </a:tc>
+                <a:extLst>
+                  <a:ext uri="{0D108BD9-81ED-4DB2-BD59-A6C34878D82A}">
+                    <a16:rowId xmlns:a16="http://schemas.microsoft.com/office/drawing/2014/main" val="475663362"/>
+                  </a:ext>
+                </a:extLst>
+              </a:tr>
+              <a:tr h="514157">
+                <a:tc>
+                  <a:txBody>
+                    <a:bodyPr/>
+                    <a:lstStyle/>
+                    <a:p>
+                      <a:pPr algn="ctr" fontAlgn="b"/>
+                      <a:r>
+                        <a:rPr lang="es-ES" sz="1000" kern="1200" dirty="0">
+                          <a:solidFill>
+                            <a:schemeClr val="dk1"/>
+                          </a:solidFill>
+                          <a:latin typeface="Courier New" panose="02070309020205020404" pitchFamily="49" charset="0"/>
+                          <a:ea typeface="+mn-ea"/>
+                          <a:cs typeface="Courier New" panose="02070309020205020404" pitchFamily="49" charset="0"/>
+                        </a:rPr>
+                        <a:t>vivo</a:t>
+                      </a:r>
+                    </a:p>
+                  </a:txBody>
+                  <a:tcPr marL="7620" marR="7620" marT="7620" marB="0" anchor="b"/>
+                </a:tc>
+                <a:tc>
+                  <a:txBody>
+                    <a:bodyPr/>
+                    <a:lstStyle/>
+                    <a:p>
+                      <a:pPr algn="l" fontAlgn="b"/>
+                      <a:r>
+                        <a:rPr lang="es-ES" sz="1000" kern="1200" dirty="0">
+                          <a:solidFill>
+                            <a:schemeClr val="dk1"/>
+                          </a:solidFill>
+                          <a:latin typeface="+mn-lt"/>
+                          <a:ea typeface="+mn-ea"/>
+                          <a:cs typeface="+mn-cs"/>
+                          <a:hlinkClick r:id="rId7"/>
+                        </a:rPr>
+                        <a:t>http://vivoweb.org/ontology/core</a:t>
+                      </a:r>
+                      <a:r>
+                        <a:rPr lang="es-ES" sz="1000" kern="1200" dirty="0">
+                          <a:solidFill>
+                            <a:schemeClr val="dk1"/>
+                          </a:solidFill>
+                          <a:latin typeface="+mn-lt"/>
+                          <a:ea typeface="+mn-ea"/>
+                          <a:cs typeface="+mn-cs"/>
+                        </a:rPr>
+                        <a:t>  </a:t>
+                      </a:r>
+                    </a:p>
+                  </a:txBody>
+                  <a:tcPr marL="7620" marR="7620" marT="7620" marB="0" anchor="b"/>
+                </a:tc>
+                <a:tc>
+                  <a:txBody>
+                    <a:bodyPr/>
+                    <a:lstStyle/>
+                    <a:p>
+                      <a:r>
+                        <a:rPr lang="en-GB" sz="1000" dirty="0" err="1"/>
+                        <a:t>Utilizada</a:t>
+                      </a:r>
+                      <a:r>
+                        <a:rPr lang="en-GB" sz="1000" dirty="0"/>
+                        <a:t> </a:t>
+                      </a:r>
+                      <a:r>
+                        <a:rPr lang="en-GB" sz="1000" dirty="0" err="1"/>
+                        <a:t>ampliamente</a:t>
+                      </a:r>
+                      <a:r>
+                        <a:rPr lang="en-GB" sz="1000" dirty="0"/>
+                        <a:t> </a:t>
+                      </a:r>
+                      <a:r>
+                        <a:rPr lang="en-GB" sz="1000" dirty="0" err="1"/>
+                        <a:t>en</a:t>
+                      </a:r>
+                      <a:r>
+                        <a:rPr lang="en-GB" sz="1000" dirty="0"/>
+                        <a:t> ROH. </a:t>
+                      </a:r>
+                      <a:r>
+                        <a:rPr lang="en-GB" sz="1000" dirty="0" err="1"/>
+                        <a:t>Reutilizados</a:t>
+                      </a:r>
+                      <a:r>
+                        <a:rPr lang="en-GB" sz="1000" dirty="0"/>
+                        <a:t> los </a:t>
+                      </a:r>
+                      <a:r>
+                        <a:rPr lang="en-GB" sz="1000" dirty="0" err="1"/>
+                        <a:t>siguientes</a:t>
+                      </a:r>
+                      <a:r>
+                        <a:rPr lang="en-GB" sz="1000" dirty="0"/>
+                        <a:t> </a:t>
+                      </a:r>
+                      <a:r>
+                        <a:rPr lang="en-GB" sz="1000" dirty="0" err="1"/>
+                        <a:t>conceptos</a:t>
+                      </a:r>
+                      <a:r>
+                        <a:rPr lang="en-GB" sz="1000" dirty="0"/>
+                        <a:t>:</a:t>
+                      </a:r>
+                    </a:p>
+                    <a:p>
+                      <a:pPr marL="285750" indent="-285750">
+                        <a:buFont typeface="Arial" panose="020B0604020202020204" pitchFamily="34" charset="0"/>
+                        <a:buChar char="•"/>
+                      </a:pPr>
+                      <a:r>
+                        <a:rPr lang="en-GB" sz="1000" dirty="0" err="1"/>
+                        <a:t>Vivo:DateTimeInterval</a:t>
+                      </a:r>
+                      <a:r>
+                        <a:rPr lang="en-GB" sz="1000" dirty="0"/>
+                        <a:t> para </a:t>
+                      </a:r>
+                      <a:r>
+                        <a:rPr lang="en-GB" sz="1000" dirty="0" err="1"/>
+                        <a:t>especificar</a:t>
+                      </a:r>
+                      <a:r>
+                        <a:rPr lang="en-GB" sz="1000" dirty="0"/>
+                        <a:t> </a:t>
+                      </a:r>
+                      <a:r>
+                        <a:rPr lang="en-GB" sz="1000" dirty="0" err="1"/>
+                        <a:t>relaciones</a:t>
+                      </a:r>
+                      <a:r>
+                        <a:rPr lang="en-GB" sz="1000" dirty="0"/>
+                        <a:t> </a:t>
+                      </a:r>
+                      <a:r>
+                        <a:rPr lang="en-GB" sz="1000" dirty="0" err="1"/>
+                        <a:t>asociadas</a:t>
+                      </a:r>
+                      <a:r>
+                        <a:rPr lang="en-GB" sz="1000" dirty="0"/>
+                        <a:t> a un period temporal</a:t>
+                      </a:r>
+                    </a:p>
+                    <a:p>
+                      <a:pPr marL="285750" lvl="0" indent="-285750">
+                        <a:buFont typeface="Arial" panose="020B0604020202020204" pitchFamily="34" charset="0"/>
+                        <a:buChar char="•"/>
+                      </a:pPr>
+                      <a:r>
+                        <a:rPr lang="en-GB" sz="1000" dirty="0"/>
+                        <a:t>Position</a:t>
+                      </a:r>
+                    </a:p>
+                    <a:p>
+                      <a:pPr marL="285750" lvl="0" indent="-285750">
+                        <a:buFont typeface="Arial" panose="020B0604020202020204" pitchFamily="34" charset="0"/>
+                        <a:buChar char="•"/>
+                      </a:pPr>
+                      <a:r>
+                        <a:rPr lang="en-GB" sz="1000" dirty="0" err="1"/>
+                        <a:t>AcademicDegree</a:t>
+                      </a:r>
+                      <a:endParaRPr lang="en-GB" sz="1000" dirty="0"/>
+                    </a:p>
+                    <a:p>
+                      <a:pPr marL="285750" lvl="0" indent="-285750">
+                        <a:buFont typeface="Arial" panose="020B0604020202020204" pitchFamily="34" charset="0"/>
+                        <a:buChar char="•"/>
+                      </a:pPr>
+                      <a:r>
+                        <a:rPr lang="en-GB" sz="1000" dirty="0" err="1"/>
+                        <a:t>AwardedDegree</a:t>
+                      </a:r>
+                      <a:endParaRPr lang="en-GB" sz="1000" dirty="0"/>
+                    </a:p>
+                    <a:p>
+                      <a:pPr marL="285750" lvl="0" indent="-285750">
+                        <a:buFont typeface="Arial" panose="020B0604020202020204" pitchFamily="34" charset="0"/>
+                        <a:buChar char="•"/>
+                      </a:pPr>
+                      <a:endParaRPr lang="en-GB" sz="1000" dirty="0"/>
+                    </a:p>
+                  </a:txBody>
+                  <a:tcPr/>
+                </a:tc>
+                <a:extLst>
+                  <a:ext uri="{0D108BD9-81ED-4DB2-BD59-A6C34878D82A}">
+                    <a16:rowId xmlns:a16="http://schemas.microsoft.com/office/drawing/2014/main" val="3438705303"/>
+                  </a:ext>
+                </a:extLst>
+              </a:tr>
+              <a:tr h="514157">
+                <a:tc>
+                  <a:txBody>
+                    <a:bodyPr/>
+                    <a:lstStyle/>
+                    <a:p>
+                      <a:pPr algn="ctr" fontAlgn="b"/>
+                      <a:r>
+                        <a:rPr lang="es-ES" sz="1000" kern="1200" dirty="0" err="1">
+                          <a:solidFill>
+                            <a:schemeClr val="dk1"/>
+                          </a:solidFill>
+                          <a:latin typeface="Courier New" panose="02070309020205020404" pitchFamily="49" charset="0"/>
+                          <a:ea typeface="+mn-ea"/>
+                          <a:cs typeface="Courier New" panose="02070309020205020404" pitchFamily="49" charset="0"/>
+                        </a:rPr>
+                        <a:t>roh</a:t>
+                      </a:r>
+                      <a:endParaRPr lang="es-ES" sz="1000" kern="1200" dirty="0">
+                        <a:solidFill>
+                          <a:schemeClr val="dk1"/>
+                        </a:solidFill>
+                        <a:latin typeface="Courier New" panose="02070309020205020404" pitchFamily="49" charset="0"/>
+                        <a:ea typeface="+mn-ea"/>
+                        <a:cs typeface="Courier New" panose="02070309020205020404" pitchFamily="49" charset="0"/>
+                      </a:endParaRPr>
+                    </a:p>
+                  </a:txBody>
+                  <a:tcPr marL="7620" marR="7620" marT="7620" marB="0" anchor="b"/>
+                </a:tc>
+                <a:tc>
+                  <a:txBody>
+                    <a:bodyPr/>
+                    <a:lstStyle/>
+                    <a:p>
+                      <a:pPr algn="l" fontAlgn="b"/>
+                      <a:r>
+                        <a:rPr lang="es-ES" sz="1000" kern="1200" dirty="0">
+                          <a:solidFill>
+                            <a:schemeClr val="dk1"/>
+                          </a:solidFill>
+                          <a:latin typeface="+mn-lt"/>
+                          <a:ea typeface="+mn-ea"/>
+                          <a:cs typeface="+mn-cs"/>
+                          <a:hlinkClick r:id="rId8"/>
+                        </a:rPr>
+                        <a:t>http://purl.org/roh</a:t>
+                      </a:r>
+                      <a:r>
+                        <a:rPr lang="es-ES" sz="1000" kern="1200" dirty="0">
+                          <a:solidFill>
+                            <a:schemeClr val="dk1"/>
+                          </a:solidFill>
+                          <a:latin typeface="+mn-lt"/>
+                          <a:ea typeface="+mn-ea"/>
+                          <a:cs typeface="+mn-cs"/>
+                        </a:rPr>
+                        <a:t> </a:t>
+                      </a:r>
+                    </a:p>
+                  </a:txBody>
+                  <a:tcPr marL="7620" marR="7620" marT="7620" marB="0" anchor="b"/>
+                </a:tc>
+                <a:tc>
+                  <a:txBody>
+                    <a:bodyPr/>
+                    <a:lstStyle/>
+                    <a:p>
+                      <a:r>
+                        <a:rPr lang="en-GB" sz="1000" dirty="0"/>
+                        <a:t>Ha </a:t>
+                      </a:r>
+                      <a:r>
+                        <a:rPr lang="en-GB" sz="1000" dirty="0" err="1"/>
+                        <a:t>definido</a:t>
+                      </a:r>
+                      <a:r>
+                        <a:rPr lang="en-GB" sz="1000" dirty="0"/>
+                        <a:t> los </a:t>
+                      </a:r>
+                      <a:r>
+                        <a:rPr lang="en-GB" sz="1000" dirty="0" err="1"/>
+                        <a:t>siguientes</a:t>
+                      </a:r>
+                      <a:r>
+                        <a:rPr lang="en-GB" sz="1000" dirty="0"/>
+                        <a:t> </a:t>
+                      </a:r>
+                      <a:r>
+                        <a:rPr lang="en-GB" sz="1000" dirty="0" err="1"/>
+                        <a:t>conceptos</a:t>
+                      </a:r>
+                      <a:r>
+                        <a:rPr lang="en-GB" sz="1000" dirty="0"/>
+                        <a:t>, </a:t>
+                      </a:r>
+                      <a:r>
+                        <a:rPr lang="en-GB" sz="1000" dirty="0" err="1"/>
+                        <a:t>reutilizando</a:t>
+                      </a:r>
+                      <a:r>
+                        <a:rPr lang="en-GB" sz="1000" dirty="0"/>
+                        <a:t> </a:t>
+                      </a:r>
+                      <a:r>
+                        <a:rPr lang="en-GB" sz="1000" dirty="0" err="1"/>
+                        <a:t>conceptos</a:t>
+                      </a:r>
+                      <a:r>
+                        <a:rPr lang="en-GB" sz="1000" dirty="0"/>
+                        <a:t> de </a:t>
+                      </a:r>
+                      <a:r>
+                        <a:rPr lang="en-GB" sz="1000" dirty="0" err="1"/>
+                        <a:t>otras</a:t>
+                      </a:r>
+                      <a:r>
+                        <a:rPr lang="en-GB" sz="1000" dirty="0"/>
+                        <a:t> </a:t>
+                      </a:r>
+                      <a:r>
+                        <a:rPr lang="en-GB" sz="1000" dirty="0" err="1"/>
+                        <a:t>ontologías</a:t>
+                      </a:r>
+                      <a:r>
+                        <a:rPr lang="en-GB" sz="1000" dirty="0"/>
+                        <a:t>:</a:t>
+                      </a:r>
+                    </a:p>
+                    <a:p>
+                      <a:pPr marL="285750" indent="-285750">
+                        <a:buFont typeface="Arial" panose="020B0604020202020204" pitchFamily="34" charset="0"/>
+                        <a:buChar char="•"/>
+                      </a:pPr>
+                      <a:r>
+                        <a:rPr lang="en-GB" sz="1000" dirty="0"/>
+                        <a:t>Activity </a:t>
+                      </a:r>
+                      <a:r>
+                        <a:rPr lang="en-GB" sz="1000" dirty="0" err="1"/>
+                        <a:t>heredada</a:t>
+                      </a:r>
+                      <a:r>
+                        <a:rPr lang="en-GB" sz="1000" dirty="0"/>
+                        <a:t> de </a:t>
+                      </a:r>
+                      <a:r>
+                        <a:rPr lang="en-GB" sz="1000" dirty="0" err="1"/>
+                        <a:t>Vivo:DateTimeInterval</a:t>
+                      </a:r>
+                      <a:r>
+                        <a:rPr lang="en-GB" sz="1000" dirty="0"/>
+                        <a:t>, </a:t>
+                      </a:r>
+                      <a:r>
+                        <a:rPr lang="en-GB" sz="1000" dirty="0" err="1"/>
+                        <a:t>también</a:t>
+                      </a:r>
+                      <a:r>
+                        <a:rPr lang="en-GB" sz="1000" dirty="0"/>
+                        <a:t> Position, Project, Role</a:t>
+                      </a:r>
+                    </a:p>
+                    <a:p>
+                      <a:pPr marL="285750" indent="-285750">
+                        <a:buFont typeface="Arial" panose="020B0604020202020204" pitchFamily="34" charset="0"/>
+                        <a:buChar char="•"/>
+                      </a:pPr>
+                      <a:r>
+                        <a:rPr lang="en-GB" sz="1000" dirty="0"/>
+                        <a:t>Contract </a:t>
+                      </a:r>
+                      <a:r>
+                        <a:rPr lang="en-GB" sz="1000" dirty="0" err="1"/>
+                        <a:t>asociado</a:t>
+                      </a:r>
+                      <a:r>
+                        <a:rPr lang="en-GB" sz="1000" dirty="0"/>
+                        <a:t> a Proyecto, Organization y Person </a:t>
+                      </a:r>
+                    </a:p>
+                    <a:p>
+                      <a:pPr marL="285750" indent="-285750">
+                        <a:buFont typeface="Arial" panose="020B0604020202020204" pitchFamily="34" charset="0"/>
+                        <a:buChar char="•"/>
+                      </a:pPr>
+                      <a:r>
+                        <a:rPr lang="en-GB" sz="1000" dirty="0" err="1"/>
+                        <a:t>PhDThesis</a:t>
+                      </a:r>
+                      <a:r>
+                        <a:rPr lang="en-GB" sz="1000" dirty="0"/>
+                        <a:t> </a:t>
+                      </a:r>
+                      <a:r>
+                        <a:rPr lang="en-GB" sz="1000" dirty="0" err="1"/>
+                        <a:t>hereda</a:t>
+                      </a:r>
+                      <a:r>
+                        <a:rPr lang="en-GB" sz="1000" dirty="0"/>
+                        <a:t> de </a:t>
+                      </a:r>
+                      <a:r>
+                        <a:rPr lang="en-GB" sz="1000" dirty="0" err="1"/>
+                        <a:t>bibo:Thesis</a:t>
+                      </a:r>
+                      <a:endParaRPr lang="en-GB" sz="1000" dirty="0"/>
+                    </a:p>
+                    <a:p>
+                      <a:pPr marL="285750" indent="-285750">
+                        <a:buFont typeface="Arial" panose="020B0604020202020204" pitchFamily="34" charset="0"/>
+                        <a:buChar char="•"/>
+                      </a:pPr>
+                      <a:r>
+                        <a:rPr lang="en-GB" sz="1000" dirty="0" err="1"/>
+                        <a:t>NonAcademicPosition</a:t>
+                      </a:r>
+                      <a:r>
+                        <a:rPr lang="en-GB" sz="1000" dirty="0"/>
+                        <a:t> y </a:t>
+                      </a:r>
+                      <a:r>
+                        <a:rPr lang="en-GB" sz="1000" dirty="0" err="1"/>
+                        <a:t>AcademicPosition</a:t>
+                      </a:r>
+                      <a:r>
+                        <a:rPr lang="en-GB" sz="1000" dirty="0"/>
+                        <a:t> </a:t>
+                      </a:r>
+                      <a:r>
+                        <a:rPr lang="en-GB" sz="1000" dirty="0" err="1"/>
+                        <a:t>heredan</a:t>
+                      </a:r>
+                      <a:r>
+                        <a:rPr lang="en-GB" sz="1000" dirty="0"/>
+                        <a:t> de </a:t>
+                      </a:r>
+                      <a:r>
+                        <a:rPr lang="en-GB" sz="1000" dirty="0" err="1"/>
+                        <a:t>vivo:Position</a:t>
+                      </a:r>
+                      <a:endParaRPr lang="en-GB" sz="1000" dirty="0"/>
+                    </a:p>
+                    <a:p>
+                      <a:pPr marL="285750" indent="-285750" algn="l">
+                        <a:buFont typeface="Arial" panose="020B0604020202020204" pitchFamily="34" charset="0"/>
+                        <a:buChar char="•"/>
+                      </a:pPr>
+                      <a:r>
+                        <a:rPr lang="en-GB" sz="1000" dirty="0"/>
+                        <a:t>Project y </a:t>
+                      </a:r>
+                      <a:r>
+                        <a:rPr lang="en-GB" sz="1000" dirty="0" err="1"/>
+                        <a:t>ProjectExpense</a:t>
+                      </a:r>
+                      <a:endParaRPr lang="en-GB" sz="1000" dirty="0"/>
+                    </a:p>
+                    <a:p>
+                      <a:pPr marL="285750" indent="-285750" algn="l">
+                        <a:buFont typeface="Arial" panose="020B0604020202020204" pitchFamily="34" charset="0"/>
+                        <a:buChar char="•"/>
+                      </a:pPr>
+                      <a:r>
+                        <a:rPr lang="en-GB" sz="1000" dirty="0"/>
+                        <a:t>Funder, Funding, </a:t>
+                      </a:r>
+                      <a:r>
+                        <a:rPr lang="en-GB" sz="1000" dirty="0" err="1"/>
+                        <a:t>FundingProgramme</a:t>
+                      </a:r>
+                      <a:r>
+                        <a:rPr lang="en-GB" sz="1000" dirty="0"/>
+                        <a:t>, </a:t>
+                      </a:r>
+                      <a:r>
+                        <a:rPr lang="en-GB" sz="1000" dirty="0" err="1"/>
+                        <a:t>FundingAmount</a:t>
+                      </a:r>
+                      <a:endParaRPr lang="en-GB" sz="1000" dirty="0"/>
+                    </a:p>
+                    <a:p>
+                      <a:pPr marL="285750" indent="-285750" algn="l">
+                        <a:buFont typeface="Arial" panose="020B0604020202020204" pitchFamily="34" charset="0"/>
+                        <a:buChar char="•"/>
+                      </a:pPr>
+                      <a:r>
+                        <a:rPr lang="en-GB" sz="1000" dirty="0" err="1"/>
+                        <a:t>GeographicalScope</a:t>
+                      </a:r>
+                      <a:r>
+                        <a:rPr lang="en-GB" sz="1000" dirty="0"/>
+                        <a:t> </a:t>
+                      </a:r>
+                      <a:r>
+                        <a:rPr lang="en-GB" sz="1000" dirty="0" err="1"/>
+                        <a:t>heredad</a:t>
+                      </a:r>
+                      <a:r>
+                        <a:rPr lang="en-GB" sz="1000" dirty="0"/>
+                        <a:t> </a:t>
+                      </a:r>
+                      <a:r>
+                        <a:rPr lang="en-GB" sz="1000" dirty="0" err="1"/>
+                        <a:t>gn:GeoScopeFeatures</a:t>
+                      </a:r>
+                      <a:endParaRPr lang="en-GB" sz="1000" dirty="0"/>
+                    </a:p>
+                    <a:p>
+                      <a:pPr marL="285750" indent="-285750" algn="l">
+                        <a:buFont typeface="Arial" panose="020B0604020202020204" pitchFamily="34" charset="0"/>
+                        <a:buChar char="•"/>
+                      </a:pPr>
+                      <a:r>
+                        <a:rPr lang="en-GB" sz="1000" dirty="0"/>
+                        <a:t>Researcher </a:t>
+                      </a:r>
+                      <a:r>
+                        <a:rPr lang="en-GB" sz="1000" dirty="0" err="1"/>
+                        <a:t>hereda</a:t>
+                      </a:r>
+                      <a:r>
+                        <a:rPr lang="en-GB" sz="1000" dirty="0"/>
+                        <a:t> de </a:t>
+                      </a:r>
+                      <a:r>
+                        <a:rPr lang="en-GB" sz="1000" dirty="0" err="1"/>
+                        <a:t>foaf:Person</a:t>
+                      </a:r>
+                      <a:endParaRPr lang="en-GB" sz="1000" dirty="0"/>
+                    </a:p>
+                    <a:p>
+                      <a:pPr marL="285750" indent="-285750" algn="l">
+                        <a:buFont typeface="Arial" panose="020B0604020202020204" pitchFamily="34" charset="0"/>
+                        <a:buChar char="•"/>
+                      </a:pPr>
+                      <a:r>
+                        <a:rPr lang="en-GB" sz="1000" dirty="0" err="1"/>
+                        <a:t>Añadido</a:t>
+                      </a:r>
+                      <a:r>
+                        <a:rPr lang="en-GB" sz="1000" dirty="0"/>
+                        <a:t> </a:t>
+                      </a:r>
+                      <a:r>
+                        <a:rPr lang="en-GB" sz="1000" dirty="0" err="1"/>
+                        <a:t>roh:Proposal</a:t>
+                      </a:r>
+                      <a:r>
+                        <a:rPr lang="en-GB" sz="1000" dirty="0"/>
+                        <a:t> de </a:t>
+                      </a:r>
+                      <a:r>
+                        <a:rPr lang="en-GB" sz="1000" dirty="0" err="1"/>
+                        <a:t>bibo:Document</a:t>
+                      </a:r>
+                      <a:r>
+                        <a:rPr lang="en-GB" sz="1000" dirty="0"/>
+                        <a:t> para </a:t>
+                      </a:r>
+                      <a:r>
+                        <a:rPr lang="en-GB" sz="1000" dirty="0" err="1"/>
+                        <a:t>así</a:t>
+                      </a:r>
+                      <a:r>
+                        <a:rPr lang="en-GB" sz="1000" dirty="0"/>
+                        <a:t> </a:t>
+                      </a:r>
+                      <a:r>
+                        <a:rPr lang="en-GB" sz="1000" dirty="0" err="1"/>
+                        <a:t>poder</a:t>
+                      </a:r>
+                      <a:r>
+                        <a:rPr lang="en-GB" sz="1000" dirty="0"/>
+                        <a:t> </a:t>
+                      </a:r>
+                      <a:r>
+                        <a:rPr lang="en-GB" sz="1000" dirty="0" err="1"/>
+                        <a:t>asociar</a:t>
+                      </a:r>
+                      <a:r>
+                        <a:rPr lang="en-GB" sz="1000" dirty="0"/>
+                        <a:t> la </a:t>
+                      </a:r>
+                      <a:r>
+                        <a:rPr lang="en-GB" sz="1000" dirty="0" err="1"/>
+                        <a:t>memoria</a:t>
+                      </a:r>
+                      <a:r>
+                        <a:rPr lang="en-GB" sz="1000" dirty="0"/>
+                        <a:t> de la </a:t>
+                      </a:r>
+                      <a:r>
+                        <a:rPr lang="en-GB" sz="1000" dirty="0" err="1"/>
+                        <a:t>propuesta</a:t>
+                      </a:r>
+                      <a:r>
+                        <a:rPr lang="en-GB" sz="1000" dirty="0"/>
+                        <a:t> a un </a:t>
+                      </a:r>
+                      <a:r>
+                        <a:rPr lang="en-GB" sz="1000" dirty="0" err="1"/>
+                        <a:t>proyecto</a:t>
+                      </a:r>
+                      <a:endParaRPr lang="en-GB" sz="1000" dirty="0"/>
+                    </a:p>
+                    <a:p>
+                      <a:endParaRPr lang="en-GB" sz="1000" dirty="0"/>
+                    </a:p>
+                  </a:txBody>
+                  <a:tcPr/>
+                </a:tc>
+                <a:extLst>
+                  <a:ext uri="{0D108BD9-81ED-4DB2-BD59-A6C34878D82A}">
+                    <a16:rowId xmlns:a16="http://schemas.microsoft.com/office/drawing/2014/main" val="980190707"/>
+                  </a:ext>
+                </a:extLst>
+              </a:tr>
+            </a:tbl>
+          </a:graphicData>
+        </a:graphic>
+      </p:graphicFrame>
+    </p:spTree>
+    <p:extLst>
+      <p:ext uri="{BB962C8B-B14F-4D97-AF65-F5344CB8AC3E}">
+        <p14:creationId xmlns:p14="http://schemas.microsoft.com/office/powerpoint/2010/main" val="815991895"/>
+      </p:ext>
+    </p:extLst>
+  </p:cSld>
+  <p:clrMapOvr>
+    <a:masterClrMapping/>
+  </p:clrMapOvr>
+</p:sld>
+</file>
+
+<file path=ppt/slides/slide5.xml><?xml version="1.0" encoding="utf-8"?>
+<p:sld xmlns:a="http://schemas.openxmlformats.org/drawingml/2006/main" xmlns:r="http://schemas.openxmlformats.org/officeDocument/2006/relationships" xmlns:p="http://schemas.openxmlformats.org/presentationml/2006/main">
+  <p:cSld>
+    <p:spTree>
+      <p:nvGrpSpPr>
+        <p:cNvPr id="1" name=""/>
+        <p:cNvGrpSpPr/>
+        <p:nvPr/>
+      </p:nvGrpSpPr>
+      <p:grpSpPr>
+        <a:xfrm>
+          <a:off x="0" y="0"/>
+          <a:ext cx="0" cy="0"/>
+          <a:chOff x="0" y="0"/>
+          <a:chExt cx="0" cy="0"/>
+        </a:xfrm>
+      </p:grpSpPr>
+      <p:sp>
+        <p:nvSpPr>
+          <p:cNvPr id="2" name="CuadroTexto 1">
+            <a:extLst>
+              <a:ext uri="{FF2B5EF4-FFF2-40B4-BE49-F238E27FC236}">
+                <a16:creationId xmlns:a16="http://schemas.microsoft.com/office/drawing/2014/main" id="{C2868FB5-BED5-419D-A369-D81E9F984AF1}"/>
+              </a:ext>
+            </a:extLst>
+          </p:cNvPr>
+          <p:cNvSpPr txBox="1"/>
+          <p:nvPr/>
+        </p:nvSpPr>
+        <p:spPr>
+          <a:xfrm>
             <a:off x="600364" y="1459343"/>
             <a:ext cx="10935854" cy="3477875"/>
           </a:xfrm>
@@ -4039,7 +7796,7 @@
 </p:sld>
 </file>
 
-<file path=ppt/slides/slide5.xml><?xml version="1.0" encoding="utf-8"?>
+<file path=ppt/slides/slide6.xml><?xml version="1.0" encoding="utf-8"?>
 <p:sld xmlns:a="http://schemas.openxmlformats.org/drawingml/2006/main" xmlns:r="http://schemas.openxmlformats.org/officeDocument/2006/relationships" xmlns:p="http://schemas.openxmlformats.org/presentationml/2006/main">
   <p:cSld>
     <p:spTree>
@@ -4260,7 +8017,7 @@
 </p:sld>
 </file>
 
-<file path=ppt/slides/slide6.xml><?xml version="1.0" encoding="utf-8"?>
+<file path=ppt/slides/slide7.xml><?xml version="1.0" encoding="utf-8"?>
 <p:sld xmlns:a="http://schemas.openxmlformats.org/drawingml/2006/main" xmlns:r="http://schemas.openxmlformats.org/officeDocument/2006/relationships" xmlns:p="http://schemas.openxmlformats.org/presentationml/2006/main">
   <p:cSld>
     <p:spTree>
@@ -4292,7 +8049,7 @@
         <p:spPr>
           <a:xfrm>
             <a:off x="600364" y="1323879"/>
-            <a:ext cx="10935854" cy="6555641"/>
+            <a:ext cx="10935854" cy="7232749"/>
           </a:xfrm>
           <a:prstGeom prst="rect">
             <a:avLst/>
@@ -4314,7 +8071,54 @@
                 <a:ea typeface="+mj-ea"/>
                 <a:cs typeface="+mj-cs"/>
               </a:rPr>
-              <a:t>Reflexiones análisis preguntas de competencia</a:t>
+              <a:t>Reflexiones análisis preguntas de competencia </a:t>
+            </a:r>
+          </a:p>
+          <a:p>
+            <a:r>
+              <a:rPr lang="es-ES" sz="2800" dirty="0">
+                <a:solidFill>
+                  <a:srgbClr val="6494ED"/>
+                </a:solidFill>
+                <a:latin typeface="Hypatia Sans Pro" panose="020B0502020204020303" pitchFamily="34" charset="0"/>
+                <a:ea typeface="+mj-ea"/>
+                <a:cs typeface="+mj-cs"/>
+              </a:rPr>
+              <a:t>	</a:t>
+            </a:r>
+            <a:r>
+              <a:rPr lang="es-ES" sz="1200" dirty="0">
+                <a:solidFill>
+                  <a:srgbClr val="6494ED"/>
+                </a:solidFill>
+                <a:latin typeface="Hypatia Sans Pro" panose="020B0502020204020303" pitchFamily="34" charset="0"/>
+                <a:ea typeface="+mj-ea"/>
+                <a:cs typeface="+mj-cs"/>
+              </a:rPr>
+              <a:t>(Documento en: </a:t>
+            </a:r>
+            <a:r>
+              <a:rPr lang="es-ES" sz="1200" dirty="0">
+                <a:solidFill>
+                  <a:srgbClr val="6494ED"/>
+                </a:solidFill>
+                <a:latin typeface="Hypatia Sans Pro" panose="020B0502020204020303" pitchFamily="34" charset="0"/>
+                <a:ea typeface="+mj-ea"/>
+                <a:cs typeface="+mj-cs"/>
+                <a:hlinkClick r:id="rId2"/>
+              </a:rPr>
+              <a:t>https://github.com/HerculesCRUE/GnossDeustoOnto/raw/master/Comprobaci%C3%B3n%20preguntas%20competencia.xlsx</a:t>
+            </a:r>
+            <a:r>
+              <a:rPr lang="es-ES" sz="1200" dirty="0">
+                <a:solidFill>
+                  <a:srgbClr val="6494ED"/>
+                </a:solidFill>
+                <a:latin typeface="Hypatia Sans Pro" panose="020B0502020204020303" pitchFamily="34" charset="0"/>
+                <a:ea typeface="+mj-ea"/>
+                <a:cs typeface="+mj-cs"/>
+              </a:rPr>
+              <a:t>) </a:t>
             </a:r>
           </a:p>
           <a:p>
@@ -4394,8 +8198,14 @@
               <a:buChar char="•"/>
             </a:pPr>
             <a:r>
+              <a:rPr lang="es-ES" sz="1600" dirty="0">
+                <a:hlinkClick r:id="rId3"/>
+              </a:rPr>
+              <a:t>http://www.ciencia.gob.es/portal/site/MICINN/menuitem.8ce192e94ba842bea3bc811001432ea0/?vgnextoid=fa347440163e5310VgnVCM1000001d04140aRCRD&amp;vgnextfmt=default</a:t>
+            </a:r>
+            <a:r>
               <a:rPr lang="es-ES" sz="1600" dirty="0"/>
-              <a:t>http://www.ciencia.gob.es/portal/site/MICINN/menuitem.8ce192e94ba842bea3bc811001432ea0/?vgnextoid=fa347440163e5310VgnVCM1000001d04140aRCRD&amp;vgnextfmt=default </a:t>
+              <a:t>  </a:t>
             </a:r>
           </a:p>
           <a:p>
@@ -4404,8 +8214,14 @@
               <a:buChar char="•"/>
             </a:pPr>
             <a:r>
+              <a:rPr lang="es-ES" sz="1600" dirty="0">
+                <a:hlinkClick r:id="rId4"/>
+              </a:rPr>
+              <a:t>https://services.icono.fecyt.es/indicadores/Paginas/default.aspx?ind=198&amp;idPanel=1</a:t>
+            </a:r>
+            <a:r>
               <a:rPr lang="es-ES" sz="1600" dirty="0"/>
-              <a:t>https://services.icono.fecyt.es/indicadores/Paginas/default.aspx?ind=198&amp;idPanel=1</a:t>
+              <a:t> </a:t>
             </a:r>
           </a:p>
           <a:p>
@@ -4591,7 +8407,7 @@
 </p:sld>
 </file>
 
-<file path=ppt/slides/slide7.xml><?xml version="1.0" encoding="utf-8"?>
+<file path=ppt/slides/slide8.xml><?xml version="1.0" encoding="utf-8"?>
 <p:sld xmlns:a="http://schemas.openxmlformats.org/drawingml/2006/main" xmlns:r="http://schemas.openxmlformats.org/officeDocument/2006/relationships" xmlns:p="http://schemas.openxmlformats.org/presentationml/2006/main">
   <p:cSld>
     <p:spTree>
@@ -5066,7 +8882,7 @@
 </p:sld>
 </file>
 
-<file path=ppt/slides/slide8.xml><?xml version="1.0" encoding="utf-8"?>
+<file path=ppt/slides/slide9.xml><?xml version="1.0" encoding="utf-8"?>
 <p:sld xmlns:a="http://schemas.openxmlformats.org/drawingml/2006/main" xmlns:r="http://schemas.openxmlformats.org/officeDocument/2006/relationships" xmlns:p="http://schemas.openxmlformats.org/presentationml/2006/main">
   <p:cSld>
     <p:spTree>
@@ -5169,127 +8985,6 @@
     <p:extLst>
       <p:ext uri="{BB962C8B-B14F-4D97-AF65-F5344CB8AC3E}">
         <p14:creationId xmlns:p14="http://schemas.microsoft.com/office/powerpoint/2010/main" val="1414372595"/>
-      </p:ext>
-    </p:extLst>
-  </p:cSld>
-  <p:clrMapOvr>
-    <a:masterClrMapping/>
-  </p:clrMapOvr>
-</p:sld>
-</file>
-
-<file path=ppt/slides/slide9.xml><?xml version="1.0" encoding="utf-8"?>
-<p:sld xmlns:a="http://schemas.openxmlformats.org/drawingml/2006/main" xmlns:r="http://schemas.openxmlformats.org/officeDocument/2006/relationships" xmlns:p="http://schemas.openxmlformats.org/presentationml/2006/main">
-  <p:cSld>
-    <p:spTree>
-      <p:nvGrpSpPr>
-        <p:cNvPr id="1" name=""/>
-        <p:cNvGrpSpPr/>
-        <p:nvPr/>
-      </p:nvGrpSpPr>
-      <p:grpSpPr>
-        <a:xfrm>
-          <a:off x="0" y="0"/>
-          <a:ext cx="0" cy="0"/>
-          <a:chOff x="0" y="0"/>
-          <a:chExt cx="0" cy="0"/>
-        </a:xfrm>
-      </p:grpSpPr>
-      <p:sp>
-        <p:nvSpPr>
-          <p:cNvPr id="2" name="CuadroTexto 1">
-            <a:extLst>
-              <a:ext uri="{FF2B5EF4-FFF2-40B4-BE49-F238E27FC236}">
-                <a16:creationId xmlns:a16="http://schemas.microsoft.com/office/drawing/2014/main" id="{C2868FB5-BED5-419D-A369-D81E9F984AF1}"/>
-              </a:ext>
-            </a:extLst>
-          </p:cNvPr>
-          <p:cNvSpPr txBox="1"/>
-          <p:nvPr/>
-        </p:nvSpPr>
-        <p:spPr>
-          <a:xfrm>
-            <a:off x="600364" y="1459343"/>
-            <a:ext cx="10935854" cy="3108543"/>
-          </a:xfrm>
-          <a:prstGeom prst="rect">
-            <a:avLst/>
-          </a:prstGeom>
-          <a:noFill/>
-        </p:spPr>
-        <p:txBody>
-          <a:bodyPr wrap="square" rtlCol="0">
-            <a:spAutoFit/>
-          </a:bodyPr>
-          <a:lstStyle/>
-          <a:p>
-            <a:r>
-              <a:rPr lang="es-ES" sz="2800" dirty="0">
-                <a:solidFill>
-                  <a:srgbClr val="6494ED"/>
-                </a:solidFill>
-                <a:latin typeface="Hypatia Sans Pro" panose="020B0502020204020303" pitchFamily="34" charset="0"/>
-                <a:ea typeface="+mj-ea"/>
-                <a:cs typeface="+mj-cs"/>
-              </a:rPr>
-              <a:t>Reflexiones análisis preguntas de competencia: Rangos de valores</a:t>
-            </a:r>
-          </a:p>
-          <a:p>
-            <a:endParaRPr lang="es-ES" sz="2400" dirty="0"/>
-          </a:p>
-          <a:p>
-            <a:pPr marL="342900" indent="-342900">
-              <a:buFont typeface="Wingdings" panose="05000000000000000000" pitchFamily="2" charset="2"/>
-              <a:buChar char="q"/>
-            </a:pPr>
-            <a:r>
-              <a:rPr lang="es-ES" sz="2400" dirty="0" err="1"/>
-              <a:t>FundingProgram</a:t>
-            </a:r>
-            <a:r>
-              <a:rPr lang="es-ES" sz="2400" dirty="0"/>
-              <a:t>, necesario añadir instancias de programas de financiación, considerar que en un programa como H2020 hay diferentes </a:t>
-            </a:r>
-            <a:r>
-              <a:rPr lang="es-ES" sz="2400" dirty="0" err="1"/>
-              <a:t>topics</a:t>
-            </a:r>
-            <a:endParaRPr lang="es-ES" sz="2400" dirty="0"/>
-          </a:p>
-          <a:p>
-            <a:pPr marL="342900" indent="-342900">
-              <a:buFont typeface="Wingdings" panose="05000000000000000000" pitchFamily="2" charset="2"/>
-              <a:buChar char="q"/>
-            </a:pPr>
-            <a:r>
-              <a:rPr lang="es-ES" sz="2400" dirty="0"/>
-              <a:t>Position, necesario añadir todas las posibles </a:t>
-            </a:r>
-          </a:p>
-          <a:p>
-            <a:pPr marL="342900" indent="-342900">
-              <a:buFont typeface="Arial" panose="020B0604020202020204" pitchFamily="34" charset="0"/>
-              <a:buChar char="•"/>
-            </a:pPr>
-            <a:endParaRPr lang="es-ES" sz="2400" dirty="0"/>
-          </a:p>
-          <a:p>
-            <a:pPr marL="342900" indent="-342900">
-              <a:buFont typeface="Wingdings" panose="05000000000000000000" pitchFamily="2" charset="2"/>
-              <a:buChar char="q"/>
-            </a:pPr>
-            <a:endParaRPr lang="es-ES" sz="2400" dirty="0"/>
-          </a:p>
-          <a:p>
-            <a:endParaRPr lang="es-ES" sz="2400" dirty="0"/>
-          </a:p>
-        </p:txBody>
-      </p:sp>
-    </p:spTree>
-    <p:extLst>
-      <p:ext uri="{BB962C8B-B14F-4D97-AF65-F5344CB8AC3E}">
-        <p14:creationId xmlns:p14="http://schemas.microsoft.com/office/powerpoint/2010/main" val="1208421197"/>
       </p:ext>
     </p:extLst>
   </p:cSld>

</xml_diff>

<commit_message>
Introducidos links a ontología y comparativa con preguntas de competencia
</commit_message>
<xml_diff>
--- a/20200109 HERCULES ASIO -ROH-Validación.pptx
+++ b/20200109 HERCULES ASIO -ROH-Validación.pptx
@@ -517,6 +517,90 @@
     </a:lvl9pPr>
   </p:notesStyle>
 </p:notesMaster>
+</file>
+
+<file path=ppt/notesSlides/notesSlide1.xml><?xml version="1.0" encoding="utf-8"?>
+<p:notes xmlns:a="http://schemas.openxmlformats.org/drawingml/2006/main" xmlns:r="http://schemas.openxmlformats.org/officeDocument/2006/relationships" xmlns:p="http://schemas.openxmlformats.org/presentationml/2006/main">
+  <p:cSld>
+    <p:spTree>
+      <p:nvGrpSpPr>
+        <p:cNvPr id="1" name=""/>
+        <p:cNvGrpSpPr/>
+        <p:nvPr/>
+      </p:nvGrpSpPr>
+      <p:grpSpPr>
+        <a:xfrm>
+          <a:off x="0" y="0"/>
+          <a:ext cx="0" cy="0"/>
+          <a:chOff x="0" y="0"/>
+          <a:chExt cx="0" cy="0"/>
+        </a:xfrm>
+      </p:grpSpPr>
+      <p:sp>
+        <p:nvSpPr>
+          <p:cNvPr id="2" name="Slide Image Placeholder 1"/>
+          <p:cNvSpPr>
+            <a:spLocks noGrp="1" noRot="1" noChangeAspect="1"/>
+          </p:cNvSpPr>
+          <p:nvPr>
+            <p:ph type="sldImg"/>
+          </p:nvPr>
+        </p:nvSpPr>
+        <p:spPr/>
+      </p:sp>
+      <p:sp>
+        <p:nvSpPr>
+          <p:cNvPr id="3" name="Notes Placeholder 2"/>
+          <p:cNvSpPr>
+            <a:spLocks noGrp="1"/>
+          </p:cNvSpPr>
+          <p:nvPr>
+            <p:ph type="body" idx="1"/>
+          </p:nvPr>
+        </p:nvSpPr>
+        <p:spPr/>
+        <p:txBody>
+          <a:bodyPr/>
+          <a:lstStyle/>
+          <a:p>
+            <a:endParaRPr lang="en-GB" dirty="0"/>
+          </a:p>
+        </p:txBody>
+      </p:sp>
+      <p:sp>
+        <p:nvSpPr>
+          <p:cNvPr id="4" name="Slide Number Placeholder 3"/>
+          <p:cNvSpPr>
+            <a:spLocks noGrp="1"/>
+          </p:cNvSpPr>
+          <p:nvPr>
+            <p:ph type="sldNum" sz="quarter" idx="5"/>
+          </p:nvPr>
+        </p:nvSpPr>
+        <p:spPr/>
+        <p:txBody>
+          <a:bodyPr/>
+          <a:lstStyle/>
+          <a:p>
+            <a:fld id="{2786B88B-5F2B-48D9-9725-93E7A6924CF4}" type="slidenum">
+              <a:rPr lang="en-GB" smtClean="0"/>
+              <a:t>4</a:t>
+            </a:fld>
+            <a:endParaRPr lang="en-GB"/>
+          </a:p>
+        </p:txBody>
+      </p:sp>
+    </p:spTree>
+    <p:extLst>
+      <p:ext uri="{BB962C8B-B14F-4D97-AF65-F5344CB8AC3E}">
+        <p14:creationId xmlns:p14="http://schemas.microsoft.com/office/powerpoint/2010/main" val="539314430"/>
+      </p:ext>
+    </p:extLst>
+  </p:cSld>
+  <p:clrMapOvr>
+    <a:masterClrMapping/>
+  </p:clrMapOvr>
+</p:notes>
 </file>
 
 <file path=ppt/slideLayouts/slideLayout1.xml><?xml version="1.0" encoding="utf-8"?>
@@ -6157,8 +6241,8 @@
         </p:nvSpPr>
         <p:spPr>
           <a:xfrm>
-            <a:off x="600364" y="1064869"/>
-            <a:ext cx="10935854" cy="984885"/>
+            <a:off x="600364" y="976817"/>
+            <a:ext cx="10935854" cy="1046440"/>
           </a:xfrm>
           <a:prstGeom prst="rect">
             <a:avLst/>
@@ -6172,7 +6256,7 @@
           <a:lstStyle/>
           <a:p>
             <a:r>
-              <a:rPr lang="es-ES" sz="2800" dirty="0">
+              <a:rPr lang="es-ES" sz="2000" dirty="0">
                 <a:solidFill>
                   <a:srgbClr val="6494ED"/>
                 </a:solidFill>
@@ -6180,14 +6264,54 @@
                 <a:ea typeface="+mj-ea"/>
                 <a:cs typeface="+mj-cs"/>
               </a:rPr>
-              <a:t>Ontologías reutilizadas</a:t>
-            </a:r>
-          </a:p>
-          <a:p>
-            <a:endParaRPr lang="es-ES" sz="600" dirty="0"/>
-          </a:p>
-          <a:p>
-            <a:endParaRPr lang="es-ES" sz="2400" dirty="0"/>
+              <a:t>Ontologías reutilizadas. </a:t>
+            </a:r>
+            <a:r>
+              <a:rPr lang="es-ES" sz="2000">
+                <a:solidFill>
+                  <a:srgbClr val="6494ED"/>
+                </a:solidFill>
+                <a:latin typeface="Hypatia Sans Pro" panose="020B0502020204020303" pitchFamily="34" charset="0"/>
+                <a:ea typeface="+mj-ea"/>
+                <a:cs typeface="+mj-cs"/>
+              </a:rPr>
+              <a:t>ROH disponible </a:t>
+            </a:r>
+            <a:r>
+              <a:rPr lang="es-ES" sz="2000" dirty="0">
+                <a:solidFill>
+                  <a:srgbClr val="6494ED"/>
+                </a:solidFill>
+                <a:latin typeface="Hypatia Sans Pro" panose="020B0502020204020303" pitchFamily="34" charset="0"/>
+                <a:ea typeface="+mj-ea"/>
+                <a:cs typeface="+mj-cs"/>
+              </a:rPr>
+              <a:t>en: </a:t>
+            </a:r>
+            <a:r>
+              <a:rPr lang="es-ES" sz="2000" dirty="0">
+                <a:hlinkClick r:id="rId3"/>
+              </a:rPr>
+              <a:t>https://github.com/HerculesCRUE/GnossDeustoOnto/blob/master/roh.owl</a:t>
+            </a:r>
+            <a:r>
+              <a:rPr lang="es-ES" sz="2000" dirty="0"/>
+              <a:t> </a:t>
+            </a:r>
+            <a:endParaRPr lang="es-ES" sz="2000" dirty="0">
+              <a:solidFill>
+                <a:srgbClr val="6494ED"/>
+              </a:solidFill>
+              <a:latin typeface="Hypatia Sans Pro" panose="020B0502020204020303" pitchFamily="34" charset="0"/>
+              <a:ea typeface="+mj-ea"/>
+              <a:cs typeface="+mj-cs"/>
+            </a:endParaRPr>
+          </a:p>
+          <a:p>
+            <a:endParaRPr lang="es-ES" sz="400" dirty="0"/>
+          </a:p>
+          <a:p>
+            <a:endParaRPr lang="es-ES" dirty="0"/>
           </a:p>
         </p:txBody>
       </p:sp>
@@ -6206,14 +6330,14 @@
           <p:nvPr>
             <p:extLst>
               <p:ext uri="{D42A27DB-BD31-4B8C-83A1-F6EECF244321}">
-                <p14:modId xmlns:p14="http://schemas.microsoft.com/office/powerpoint/2010/main" val="1211252382"/>
+                <p14:modId xmlns:p14="http://schemas.microsoft.com/office/powerpoint/2010/main" val="1157777739"/>
               </p:ext>
             </p:extLst>
           </p:nvPr>
         </p:nvGraphicFramePr>
         <p:xfrm>
-          <a:off x="203199" y="1472387"/>
-          <a:ext cx="11474027" cy="5550333"/>
+          <a:off x="47413" y="1621394"/>
+          <a:ext cx="12076854" cy="5108373"/>
         </p:xfrm>
         <a:graphic>
           <a:graphicData uri="http://schemas.openxmlformats.org/drawingml/2006/table">
@@ -6222,21 +6346,21 @@
                 <a:tableStyleId>{5C22544A-7EE6-4342-B048-85BDC9FD1C3A}</a:tableStyleId>
               </a:tblPr>
               <a:tblGrid>
-                <a:gridCol w="792481">
+                <a:gridCol w="834117">
                   <a:extLst>
                     <a:ext uri="{9D8B030D-6E8A-4147-A177-3AD203B41FA5}">
                       <a16:colId xmlns:a16="http://schemas.microsoft.com/office/drawing/2014/main" val="834922122"/>
                     </a:ext>
                   </a:extLst>
                 </a:gridCol>
-                <a:gridCol w="2208107">
+                <a:gridCol w="2324117">
                   <a:extLst>
                     <a:ext uri="{9D8B030D-6E8A-4147-A177-3AD203B41FA5}">
                       <a16:colId xmlns:a16="http://schemas.microsoft.com/office/drawing/2014/main" val="3357444744"/>
                     </a:ext>
                   </a:extLst>
                 </a:gridCol>
-                <a:gridCol w="8473439">
+                <a:gridCol w="8918620">
                   <a:extLst>
                     <a:ext uri="{9D8B030D-6E8A-4147-A177-3AD203B41FA5}">
                       <a16:colId xmlns:a16="http://schemas.microsoft.com/office/drawing/2014/main" val="2843184187"/>
@@ -6252,7 +6376,7 @@
                     <a:p>
                       <a:pPr algn="ctr"/>
                       <a:r>
-                        <a:rPr lang="en-GB" sz="1000" dirty="0"/>
+                        <a:rPr lang="en-GB" sz="900" dirty="0"/>
                         <a:t>Prefix</a:t>
                       </a:r>
                     </a:p>
@@ -6266,10 +6390,10 @@
                     <a:p>
                       <a:pPr algn="ctr"/>
                       <a:r>
-                        <a:rPr lang="en-GB" sz="1000" dirty="0" err="1"/>
+                        <a:rPr lang="en-GB" sz="900" dirty="0" err="1"/>
                         <a:t>Ontología</a:t>
                       </a:r>
-                      <a:endParaRPr lang="en-GB" sz="1000" dirty="0"/>
+                      <a:endParaRPr lang="en-GB" sz="900" dirty="0"/>
                     </a:p>
                   </a:txBody>
                   <a:tcPr/>
@@ -6281,19 +6405,19 @@
                     <a:p>
                       <a:pPr algn="ctr"/>
                       <a:r>
-                        <a:rPr lang="en-GB" sz="1000" dirty="0" err="1"/>
+                        <a:rPr lang="en-GB" sz="900" dirty="0" err="1"/>
                         <a:t>Propósito</a:t>
                       </a:r>
                       <a:r>
-                        <a:rPr lang="en-GB" sz="1000" dirty="0"/>
+                        <a:rPr lang="en-GB" sz="900" dirty="0"/>
                         <a:t> </a:t>
                       </a:r>
                       <a:r>
-                        <a:rPr lang="en-GB" sz="1000" dirty="0" err="1"/>
+                        <a:rPr lang="en-GB" sz="900" dirty="0" err="1"/>
                         <a:t>en</a:t>
                       </a:r>
                       <a:r>
-                        <a:rPr lang="en-GB" sz="1000" dirty="0"/>
+                        <a:rPr lang="en-GB" sz="900" dirty="0"/>
                         <a:t> ROH</a:t>
                       </a:r>
                     </a:p>
@@ -6314,7 +6438,7 @@
                     <a:p>
                       <a:pPr algn="ctr" fontAlgn="b"/>
                       <a:r>
-                        <a:rPr lang="es-ES" sz="1000" kern="1200" dirty="0" err="1">
+                        <a:rPr lang="es-ES" sz="900" kern="1200" dirty="0" err="1">
                           <a:solidFill>
                             <a:schemeClr val="dk1"/>
                           </a:solidFill>
@@ -6324,7 +6448,7 @@
                         </a:rPr>
                         <a:t>Bibo</a:t>
                       </a:r>
-                      <a:endParaRPr lang="es-ES" sz="1000" kern="1200" dirty="0">
+                      <a:endParaRPr lang="es-ES" sz="900" kern="1200" dirty="0">
                         <a:solidFill>
                           <a:schemeClr val="dk1"/>
                         </a:solidFill>
@@ -6343,19 +6467,19 @@
                     <a:p>
                       <a:pPr algn="l" fontAlgn="b"/>
                       <a:r>
-                        <a:rPr lang="es-ES" sz="1000" kern="1200" dirty="0">
+                        <a:rPr lang="es-ES" sz="900" kern="1200" dirty="0">
                           <a:solidFill>
                             <a:schemeClr val="dk1"/>
                           </a:solidFill>
                           <a:latin typeface="+mn-lt"/>
                           <a:ea typeface="+mn-ea"/>
                           <a:cs typeface="+mn-cs"/>
-                          <a:hlinkClick r:id="rId2"/>
+                          <a:hlinkClick r:id="rId4"/>
                         </a:rPr>
                         <a:t>http://purl.org/ontology/bibo/</a:t>
                       </a:r>
                       <a:r>
-                        <a:rPr lang="es-ES" sz="1000" kern="1200" dirty="0">
+                        <a:rPr lang="es-ES" sz="900" kern="1200" dirty="0">
                           <a:solidFill>
                             <a:schemeClr val="dk1"/>
                           </a:solidFill>
@@ -6375,166 +6499,166 @@
                     <a:lstStyle/>
                     <a:p>
                       <a:r>
-                        <a:rPr lang="en-US" sz="1000" dirty="0" err="1"/>
+                        <a:rPr lang="en-US" sz="900" dirty="0" err="1"/>
                         <a:t>ResearchObjects</a:t>
                       </a:r>
                       <a:r>
-                        <a:rPr lang="en-US" sz="1000" dirty="0"/>
+                        <a:rPr lang="en-US" sz="900" dirty="0"/>
                         <a:t> </a:t>
                       </a:r>
                       <a:r>
-                        <a:rPr lang="en-US" sz="1000" dirty="0" err="1"/>
+                        <a:rPr lang="en-US" sz="900" dirty="0" err="1"/>
                         <a:t>relacionado</a:t>
                       </a:r>
                       <a:r>
-                        <a:rPr lang="en-US" sz="1000" dirty="0"/>
+                        <a:rPr lang="en-US" sz="900" dirty="0"/>
                         <a:t> con </a:t>
                       </a:r>
                       <a:r>
-                        <a:rPr lang="en-US" sz="1000" dirty="0" err="1"/>
+                        <a:rPr lang="en-US" sz="900" dirty="0" err="1"/>
                         <a:t>publicación</a:t>
                       </a:r>
                       <a:r>
-                        <a:rPr lang="en-US" sz="1000" dirty="0"/>
+                        <a:rPr lang="en-US" sz="900" dirty="0"/>
                         <a:t> </a:t>
                       </a:r>
                       <a:r>
-                        <a:rPr lang="en-US" sz="1000" dirty="0" err="1"/>
+                        <a:rPr lang="en-US" sz="900" dirty="0" err="1"/>
                         <a:t>basado</a:t>
                       </a:r>
                       <a:r>
-                        <a:rPr lang="en-US" sz="1000" dirty="0"/>
+                        <a:rPr lang="en-US" sz="900" dirty="0"/>
                         <a:t> </a:t>
                       </a:r>
                       <a:r>
-                        <a:rPr lang="en-US" sz="1000" dirty="0" err="1"/>
+                        <a:rPr lang="en-US" sz="900" dirty="0" err="1"/>
                         <a:t>en</a:t>
                       </a:r>
                       <a:r>
-                        <a:rPr lang="en-US" sz="1000" dirty="0"/>
+                        <a:rPr lang="en-US" sz="900" dirty="0"/>
                         <a:t> los </a:t>
                       </a:r>
                       <a:r>
-                        <a:rPr lang="en-US" sz="1000" dirty="0" err="1"/>
+                        <a:rPr lang="en-US" sz="900" dirty="0" err="1"/>
                         <a:t>tipos</a:t>
                       </a:r>
                       <a:r>
-                        <a:rPr lang="en-US" sz="1000" dirty="0"/>
+                        <a:rPr lang="en-US" sz="900" dirty="0"/>
                         <a:t> </a:t>
                       </a:r>
                       <a:r>
-                        <a:rPr lang="en-US" sz="1000" dirty="0" err="1"/>
+                        <a:rPr lang="en-US" sz="900" dirty="0" err="1"/>
                         <a:t>definidos</a:t>
                       </a:r>
                       <a:r>
-                        <a:rPr lang="en-US" sz="1000" dirty="0"/>
+                        <a:rPr lang="en-US" sz="900" dirty="0"/>
                         <a:t> </a:t>
                       </a:r>
                       <a:r>
-                        <a:rPr lang="en-US" sz="1000" dirty="0" err="1"/>
+                        <a:rPr lang="en-US" sz="900" dirty="0" err="1"/>
                         <a:t>en</a:t>
                       </a:r>
                       <a:r>
-                        <a:rPr lang="en-US" sz="1000" dirty="0"/>
+                        <a:rPr lang="en-US" sz="900" dirty="0"/>
                         <a:t> BIBO. </a:t>
                       </a:r>
                       <a:r>
-                        <a:rPr lang="en-US" sz="1000" dirty="0" err="1"/>
+                        <a:rPr lang="en-US" sz="900" dirty="0" err="1"/>
                         <a:t>Actualmente</a:t>
                       </a:r>
                       <a:r>
-                        <a:rPr lang="en-US" sz="1000" dirty="0"/>
+                        <a:rPr lang="en-US" sz="900" dirty="0"/>
                         <a:t>, el </a:t>
                       </a:r>
                       <a:r>
-                        <a:rPr lang="en-US" sz="1000" dirty="0" err="1"/>
+                        <a:rPr lang="en-US" sz="900" dirty="0" err="1"/>
                         <a:t>siguiente</a:t>
                       </a:r>
                       <a:r>
-                        <a:rPr lang="en-US" sz="1000" dirty="0"/>
+                        <a:rPr lang="en-US" sz="900" dirty="0"/>
                         <a:t> conjunto de </a:t>
                       </a:r>
                       <a:r>
-                        <a:rPr lang="en-US" sz="1000" dirty="0" err="1"/>
+                        <a:rPr lang="en-US" sz="900" dirty="0" err="1"/>
                         <a:t>entidades</a:t>
                       </a:r>
                       <a:r>
-                        <a:rPr lang="en-US" sz="1000" dirty="0"/>
+                        <a:rPr lang="en-US" sz="900" dirty="0"/>
                         <a:t> </a:t>
                       </a:r>
                       <a:r>
-                        <a:rPr lang="en-US" sz="1000" dirty="0" err="1"/>
+                        <a:rPr lang="en-US" sz="900" dirty="0" err="1"/>
                         <a:t>relacionadas</a:t>
                       </a:r>
                       <a:r>
-                        <a:rPr lang="en-US" sz="1000" dirty="0"/>
+                        <a:rPr lang="en-US" sz="900" dirty="0"/>
                         <a:t> a </a:t>
                       </a:r>
                       <a:r>
-                        <a:rPr lang="en-US" sz="1000" dirty="0" err="1"/>
+                        <a:rPr lang="en-US" sz="900" dirty="0" err="1"/>
                         <a:t>publicaciones</a:t>
                       </a:r>
                       <a:r>
-                        <a:rPr lang="en-US" sz="1000" dirty="0"/>
+                        <a:rPr lang="en-US" sz="900" dirty="0"/>
                         <a:t> son </a:t>
                       </a:r>
                       <a:r>
-                        <a:rPr lang="en-US" sz="1000" dirty="0" err="1"/>
+                        <a:rPr lang="en-US" sz="900" dirty="0" err="1"/>
                         <a:t>soportados</a:t>
                       </a:r>
                       <a:r>
-                        <a:rPr lang="en-US" sz="1000" dirty="0"/>
+                        <a:rPr lang="en-US" sz="900" dirty="0"/>
                         <a:t>: </a:t>
                       </a:r>
                       <a:r>
-                        <a:rPr lang="en-US" sz="1000" dirty="0" err="1"/>
+                        <a:rPr lang="en-US" sz="900" dirty="0" err="1"/>
                         <a:t>bibo</a:t>
                       </a:r>
                       <a:r>
-                        <a:rPr lang="en-US" sz="1000" dirty="0"/>
+                        <a:rPr lang="en-US" sz="900" dirty="0"/>
                         <a:t>: </a:t>
                       </a:r>
                       <a:r>
-                        <a:rPr lang="en-US" sz="1000" dirty="0" err="1"/>
+                        <a:rPr lang="en-US" sz="900" dirty="0" err="1"/>
                         <a:t>bibo:Collection</a:t>
                       </a:r>
                       <a:r>
-                        <a:rPr lang="en-US" sz="1000" dirty="0"/>
+                        <a:rPr lang="en-US" sz="900" dirty="0"/>
                         <a:t> (Periodical, Journal, Magazine y </a:t>
                       </a:r>
                       <a:r>
-                        <a:rPr lang="en-US" sz="1000" dirty="0" err="1"/>
+                        <a:rPr lang="en-US" sz="900" dirty="0" err="1"/>
                         <a:t>bibo:Document</a:t>
                       </a:r>
                       <a:r>
-                        <a:rPr lang="en-US" sz="1000" dirty="0"/>
+                        <a:rPr lang="en-US" sz="900" dirty="0"/>
                         <a:t> (Article, </a:t>
                       </a:r>
                       <a:r>
-                        <a:rPr lang="en-US" sz="1000" dirty="0" err="1"/>
+                        <a:rPr lang="en-US" sz="900" dirty="0" err="1"/>
                         <a:t>ConferencePaper</a:t>
                       </a:r>
                       <a:r>
-                        <a:rPr lang="en-US" sz="1000" dirty="0"/>
+                        <a:rPr lang="en-US" sz="900" dirty="0"/>
                         <a:t>, </a:t>
                       </a:r>
                       <a:r>
-                        <a:rPr lang="en-US" sz="1000" dirty="0" err="1"/>
+                        <a:rPr lang="en-US" sz="900" dirty="0" err="1"/>
                         <a:t>EditorialArticle</a:t>
                       </a:r>
                       <a:r>
-                        <a:rPr lang="en-US" sz="1000" dirty="0"/>
+                        <a:rPr lang="en-US" sz="900" dirty="0"/>
                         <a:t>, Book, Proceedings, </a:t>
                       </a:r>
                       <a:r>
-                        <a:rPr lang="en-US" sz="1000" dirty="0" err="1"/>
+                        <a:rPr lang="en-US" sz="900" dirty="0" err="1"/>
                         <a:t>ConferencePaper</a:t>
                       </a:r>
                       <a:r>
-                        <a:rPr lang="en-US" sz="1000" dirty="0"/>
+                        <a:rPr lang="en-US" sz="900" dirty="0"/>
                         <a:t>, Chapter, Thesis)</a:t>
                       </a:r>
-                      <a:endParaRPr lang="en-GB" sz="1000" dirty="0"/>
+                      <a:endParaRPr lang="en-GB" sz="900" dirty="0"/>
                     </a:p>
                   </a:txBody>
                   <a:tcPr/>
@@ -6553,7 +6677,7 @@
                     <a:p>
                       <a:pPr algn="ctr" fontAlgn="b"/>
                       <a:r>
-                        <a:rPr lang="es-ES" sz="1000" kern="1200" dirty="0" err="1">
+                        <a:rPr lang="es-ES" sz="900" kern="1200" dirty="0" err="1">
                           <a:solidFill>
                             <a:schemeClr val="dk1"/>
                           </a:solidFill>
@@ -6563,7 +6687,7 @@
                         </a:rPr>
                         <a:t>Gn</a:t>
                       </a:r>
-                      <a:endParaRPr lang="es-ES" sz="1000" kern="1200" dirty="0">
+                      <a:endParaRPr lang="es-ES" sz="900" kern="1200" dirty="0">
                         <a:solidFill>
                           <a:schemeClr val="dk1"/>
                         </a:solidFill>
@@ -6582,19 +6706,19 @@
                     <a:p>
                       <a:pPr algn="l" fontAlgn="b"/>
                       <a:r>
-                        <a:rPr lang="es-ES" sz="1000" kern="1200" dirty="0">
+                        <a:rPr lang="es-ES" sz="900" kern="1200" dirty="0">
                           <a:solidFill>
                             <a:schemeClr val="dk1"/>
                           </a:solidFill>
                           <a:latin typeface="+mn-lt"/>
                           <a:ea typeface="+mn-ea"/>
                           <a:cs typeface="+mn-cs"/>
-                          <a:hlinkClick r:id="rId3"/>
+                          <a:hlinkClick r:id="rId5"/>
                         </a:rPr>
                         <a:t>http://www.geonames.org/ontology#</a:t>
                       </a:r>
                       <a:r>
-                        <a:rPr lang="es-ES" sz="1000" kern="1200" dirty="0">
+                        <a:rPr lang="es-ES" sz="900" kern="1200" dirty="0">
                           <a:solidFill>
                             <a:schemeClr val="dk1"/>
                           </a:solidFill>
@@ -6614,35 +6738,35 @@
                     <a:lstStyle/>
                     <a:p>
                       <a:r>
-                        <a:rPr lang="en-GB" sz="1000" dirty="0" err="1"/>
+                        <a:rPr lang="en-GB" sz="900" dirty="0" err="1"/>
                         <a:t>Utilizada</a:t>
                       </a:r>
                       <a:r>
-                        <a:rPr lang="en-GB" sz="1000" dirty="0"/>
+                        <a:rPr lang="en-GB" sz="900" dirty="0"/>
                         <a:t> para </a:t>
                       </a:r>
                       <a:r>
-                        <a:rPr lang="en-GB" sz="1000" dirty="0" err="1"/>
+                        <a:rPr lang="en-GB" sz="900" dirty="0" err="1"/>
                         <a:t>asociar</a:t>
                       </a:r>
                       <a:r>
-                        <a:rPr lang="en-GB" sz="1000" dirty="0"/>
+                        <a:rPr lang="en-GB" sz="900" dirty="0"/>
                         <a:t> </a:t>
                       </a:r>
                       <a:r>
-                        <a:rPr lang="en-GB" sz="1000" dirty="0" err="1"/>
+                        <a:rPr lang="en-GB" sz="900" dirty="0" err="1"/>
                         <a:t>ámbito</a:t>
                       </a:r>
                       <a:r>
-                        <a:rPr lang="en-GB" sz="1000" dirty="0"/>
+                        <a:rPr lang="en-GB" sz="900" dirty="0"/>
                         <a:t> </a:t>
                       </a:r>
                       <a:r>
-                        <a:rPr lang="en-GB" sz="1000" dirty="0" err="1"/>
+                        <a:rPr lang="en-GB" sz="900" dirty="0" err="1"/>
                         <a:t>geográfico</a:t>
                       </a:r>
                       <a:r>
-                        <a:rPr lang="en-GB" sz="1000" dirty="0"/>
+                        <a:rPr lang="en-GB" sz="900" dirty="0"/>
                         <a:t> a Project, Activity and Organization</a:t>
                       </a:r>
                     </a:p>
@@ -6663,7 +6787,7 @@
                     <a:p>
                       <a:pPr algn="ctr" fontAlgn="b"/>
                       <a:r>
-                        <a:rPr lang="es-ES" sz="1000" kern="1200" dirty="0" err="1">
+                        <a:rPr lang="es-ES" sz="900" kern="1200" dirty="0" err="1">
                           <a:solidFill>
                             <a:schemeClr val="dk1"/>
                           </a:solidFill>
@@ -6673,7 +6797,7 @@
                         </a:rPr>
                         <a:t>foaf</a:t>
                       </a:r>
-                      <a:endParaRPr lang="es-ES" sz="1000" kern="1200" dirty="0">
+                      <a:endParaRPr lang="es-ES" sz="900" kern="1200" dirty="0">
                         <a:solidFill>
                           <a:schemeClr val="dk1"/>
                         </a:solidFill>
@@ -6692,19 +6816,19 @@
                     <a:p>
                       <a:pPr algn="l" fontAlgn="b"/>
                       <a:r>
-                        <a:rPr lang="es-ES" sz="1000" kern="1200" dirty="0">
+                        <a:rPr lang="es-ES" sz="900" kern="1200" dirty="0">
                           <a:solidFill>
                             <a:schemeClr val="dk1"/>
                           </a:solidFill>
                           <a:latin typeface="+mn-lt"/>
                           <a:ea typeface="+mn-ea"/>
                           <a:cs typeface="+mn-cs"/>
-                          <a:hlinkClick r:id="rId4"/>
+                          <a:hlinkClick r:id="rId6"/>
                         </a:rPr>
                         <a:t>http://xmlns.com/foaf/0.1/Person</a:t>
                       </a:r>
                       <a:r>
-                        <a:rPr lang="es-ES" sz="1000" kern="1200" dirty="0">
+                        <a:rPr lang="es-ES" sz="900" kern="1200" dirty="0">
                           <a:solidFill>
                             <a:schemeClr val="dk1"/>
                           </a:solidFill>
@@ -6724,67 +6848,67 @@
                     <a:lstStyle/>
                     <a:p>
                       <a:r>
-                        <a:rPr lang="en-GB" sz="1000" dirty="0" err="1"/>
+                        <a:rPr lang="en-GB" sz="900" dirty="0" err="1"/>
                         <a:t>foaf:Agent</a:t>
                       </a:r>
                       <a:r>
-                        <a:rPr lang="en-GB" sz="1000" dirty="0"/>
+                        <a:rPr lang="en-GB" sz="900" dirty="0"/>
                         <a:t> con </a:t>
                       </a:r>
                       <a:r>
-                        <a:rPr lang="en-GB" sz="1000" dirty="0" err="1"/>
+                        <a:rPr lang="en-GB" sz="900" dirty="0" err="1"/>
                         <a:t>subclases</a:t>
                       </a:r>
                       <a:r>
-                        <a:rPr lang="en-GB" sz="1000" dirty="0"/>
+                        <a:rPr lang="en-GB" sz="900" dirty="0"/>
                         <a:t> </a:t>
                       </a:r>
                       <a:r>
-                        <a:rPr lang="en-GB" sz="1000" dirty="0" err="1"/>
+                        <a:rPr lang="en-GB" sz="900" dirty="0" err="1"/>
                         <a:t>foaf:Person</a:t>
                       </a:r>
                       <a:r>
-                        <a:rPr lang="en-GB" sz="1000" dirty="0"/>
+                        <a:rPr lang="en-GB" sz="900" dirty="0"/>
                         <a:t> y </a:t>
                       </a:r>
                       <a:r>
-                        <a:rPr lang="en-GB" sz="1000" dirty="0" err="1"/>
+                        <a:rPr lang="en-GB" sz="900" dirty="0" err="1"/>
                         <a:t>foaf:Organization</a:t>
                       </a:r>
                       <a:r>
-                        <a:rPr lang="en-GB" sz="1000" dirty="0"/>
+                        <a:rPr lang="en-GB" sz="900" dirty="0"/>
                         <a:t> y </a:t>
                       </a:r>
                       <a:r>
-                        <a:rPr lang="en-GB" sz="1000" dirty="0" err="1"/>
+                        <a:rPr lang="en-GB" sz="900" dirty="0" err="1"/>
                         <a:t>foaf:OnlineAccont</a:t>
                       </a:r>
                       <a:r>
-                        <a:rPr lang="en-GB" sz="1000" dirty="0"/>
+                        <a:rPr lang="en-GB" sz="900" dirty="0"/>
                         <a:t> son </a:t>
                       </a:r>
                       <a:r>
-                        <a:rPr lang="en-GB" sz="1000" dirty="0" err="1"/>
+                        <a:rPr lang="en-GB" sz="900" dirty="0" err="1"/>
                         <a:t>amplicamente</a:t>
                       </a:r>
                       <a:r>
-                        <a:rPr lang="en-GB" sz="1000" dirty="0"/>
+                        <a:rPr lang="en-GB" sz="900" dirty="0"/>
                         <a:t> </a:t>
                       </a:r>
                       <a:r>
-                        <a:rPr lang="en-GB" sz="1000" dirty="0" err="1"/>
+                        <a:rPr lang="en-GB" sz="900" dirty="0" err="1"/>
                         <a:t>utilizadas</a:t>
                       </a:r>
                       <a:r>
-                        <a:rPr lang="en-GB" sz="1000" dirty="0"/>
+                        <a:rPr lang="en-GB" sz="900" dirty="0"/>
                         <a:t> </a:t>
                       </a:r>
                       <a:r>
-                        <a:rPr lang="en-GB" sz="1000" dirty="0" err="1"/>
+                        <a:rPr lang="en-GB" sz="900" dirty="0" err="1"/>
                         <a:t>en</a:t>
                       </a:r>
                       <a:r>
-                        <a:rPr lang="en-GB" sz="1000" dirty="0"/>
+                        <a:rPr lang="en-GB" sz="900" dirty="0"/>
                         <a:t> ROH</a:t>
                       </a:r>
                     </a:p>
@@ -6805,7 +6929,7 @@
                     <a:p>
                       <a:pPr algn="ctr" fontAlgn="b"/>
                       <a:r>
-                        <a:rPr lang="es-ES" sz="1000" kern="1200" dirty="0" err="1">
+                        <a:rPr lang="es-ES" sz="900" kern="1200" dirty="0" err="1">
                           <a:solidFill>
                             <a:schemeClr val="dk1"/>
                           </a:solidFill>
@@ -6815,7 +6939,7 @@
                         </a:rPr>
                         <a:t>ns</a:t>
                       </a:r>
-                      <a:endParaRPr lang="es-ES" sz="1000" kern="1200" dirty="0">
+                      <a:endParaRPr lang="es-ES" sz="900" kern="1200" dirty="0">
                         <a:solidFill>
                           <a:schemeClr val="dk1"/>
                         </a:solidFill>
@@ -6834,19 +6958,19 @@
                     <a:p>
                       <a:pPr algn="l" fontAlgn="b"/>
                       <a:r>
-                        <a:rPr lang="es-ES" sz="1000" kern="1200" dirty="0">
+                        <a:rPr lang="es-ES" sz="900" kern="1200" dirty="0">
                           <a:solidFill>
                             <a:schemeClr val="dk1"/>
                           </a:solidFill>
                           <a:latin typeface="+mn-lt"/>
                           <a:ea typeface="+mn-ea"/>
                           <a:cs typeface="+mn-cs"/>
-                          <a:hlinkClick r:id="rId5"/>
+                          <a:hlinkClick r:id="rId7"/>
                         </a:rPr>
                         <a:t>http://creativecommons.org/ns#</a:t>
                       </a:r>
                       <a:r>
-                        <a:rPr lang="es-ES" sz="1000" kern="1200" dirty="0">
+                        <a:rPr lang="es-ES" sz="900" kern="1200" dirty="0">
                           <a:solidFill>
                             <a:schemeClr val="dk1"/>
                           </a:solidFill>
@@ -6866,27 +6990,27 @@
                     <a:lstStyle/>
                     <a:p>
                       <a:r>
-                        <a:rPr lang="en-GB" sz="1000" dirty="0" err="1"/>
+                        <a:rPr lang="en-GB" sz="900" dirty="0" err="1"/>
                         <a:t>Usado</a:t>
                       </a:r>
                       <a:r>
-                        <a:rPr lang="en-GB" sz="1000" dirty="0"/>
+                        <a:rPr lang="en-GB" sz="900" dirty="0"/>
                         <a:t> para </a:t>
                       </a:r>
                       <a:r>
-                        <a:rPr lang="en-GB" sz="1000" dirty="0" err="1"/>
+                        <a:rPr lang="en-GB" sz="900" dirty="0" err="1"/>
                         <a:t>vincular</a:t>
                       </a:r>
                       <a:r>
-                        <a:rPr lang="en-GB" sz="1000" dirty="0"/>
+                        <a:rPr lang="en-GB" sz="900" dirty="0"/>
                         <a:t> </a:t>
                       </a:r>
                       <a:r>
-                        <a:rPr lang="en-GB" sz="1000" dirty="0" err="1"/>
+                        <a:rPr lang="en-GB" sz="900" dirty="0" err="1"/>
                         <a:t>licencia</a:t>
                       </a:r>
                       <a:r>
-                        <a:rPr lang="en-GB" sz="1000" dirty="0"/>
+                        <a:rPr lang="en-GB" sz="900" dirty="0"/>
                         <a:t> Creative Commons Share Alike 4.0 a ROH</a:t>
                       </a:r>
                     </a:p>
@@ -6907,7 +7031,7 @@
                     <a:p>
                       <a:pPr algn="ctr" fontAlgn="b"/>
                       <a:r>
-                        <a:rPr lang="es-ES" sz="1000" kern="1200" dirty="0" err="1">
+                        <a:rPr lang="es-ES" sz="900" kern="1200" dirty="0" err="1">
                           <a:solidFill>
                             <a:schemeClr val="dk1"/>
                           </a:solidFill>
@@ -6917,7 +7041,7 @@
                         </a:rPr>
                         <a:t>skos</a:t>
                       </a:r>
-                      <a:endParaRPr lang="es-ES" sz="1000" kern="1200" dirty="0">
+                      <a:endParaRPr lang="es-ES" sz="900" kern="1200" dirty="0">
                         <a:solidFill>
                           <a:schemeClr val="dk1"/>
                         </a:solidFill>
@@ -6936,19 +7060,19 @@
                     <a:p>
                       <a:pPr algn="l" fontAlgn="b"/>
                       <a:r>
-                        <a:rPr lang="es-ES" sz="1000" kern="1200" dirty="0">
+                        <a:rPr lang="es-ES" sz="900" kern="1200" dirty="0">
                           <a:solidFill>
                             <a:schemeClr val="dk1"/>
                           </a:solidFill>
                           <a:latin typeface="+mn-lt"/>
                           <a:ea typeface="+mn-ea"/>
                           <a:cs typeface="+mn-cs"/>
-                          <a:hlinkClick r:id="rId6"/>
+                          <a:hlinkClick r:id="rId8"/>
                         </a:rPr>
                         <a:t>http://www.w3.org/2004/02/skos/core</a:t>
                       </a:r>
                       <a:r>
-                        <a:rPr lang="es-ES" sz="1000" kern="1200" dirty="0">
+                        <a:rPr lang="es-ES" sz="900" kern="1200" dirty="0">
                           <a:solidFill>
                             <a:schemeClr val="dk1"/>
                           </a:solidFill>
@@ -6968,54 +7092,54 @@
                     <a:lstStyle/>
                     <a:p>
                       <a:r>
-                        <a:rPr lang="en-GB" sz="1000" dirty="0"/>
+                        <a:rPr lang="en-GB" sz="900" dirty="0"/>
                         <a:t>Se </a:t>
                       </a:r>
                       <a:r>
-                        <a:rPr lang="en-GB" sz="1000" dirty="0" err="1"/>
+                        <a:rPr lang="en-GB" sz="900" dirty="0" err="1"/>
                         <a:t>reutiliza</a:t>
                       </a:r>
                       <a:r>
-                        <a:rPr lang="en-GB" sz="1000" dirty="0"/>
+                        <a:rPr lang="en-GB" sz="900" dirty="0"/>
                         <a:t> </a:t>
                       </a:r>
                       <a:r>
-                        <a:rPr lang="en-GB" sz="1000" dirty="0" err="1"/>
+                        <a:rPr lang="en-GB" sz="900" dirty="0" err="1"/>
                         <a:t>skos:Concept</a:t>
                       </a:r>
                       <a:r>
-                        <a:rPr lang="en-GB" sz="1000" dirty="0"/>
+                        <a:rPr lang="en-GB" sz="900" dirty="0"/>
                         <a:t> que define </a:t>
                       </a:r>
                       <a:r>
-                        <a:rPr lang="en-GB" sz="1000" dirty="0" err="1"/>
+                        <a:rPr lang="en-GB" sz="900" dirty="0" err="1"/>
                         <a:t>subclasess</a:t>
                       </a:r>
                       <a:r>
-                        <a:rPr lang="en-GB" sz="1000" dirty="0"/>
+                        <a:rPr lang="en-GB" sz="900" dirty="0"/>
                         <a:t> </a:t>
                       </a:r>
                       <a:r>
-                        <a:rPr lang="en-GB" sz="1000" dirty="0" err="1"/>
+                        <a:rPr lang="en-GB" sz="900" dirty="0" err="1"/>
                         <a:t>roh:Keyword</a:t>
                       </a:r>
                       <a:r>
-                        <a:rPr lang="en-GB" sz="1000" dirty="0"/>
+                        <a:rPr lang="en-GB" sz="900" dirty="0"/>
                         <a:t>, </a:t>
                       </a:r>
                       <a:r>
-                        <a:rPr lang="en-GB" sz="1000" dirty="0" err="1"/>
+                        <a:rPr lang="en-GB" sz="900" dirty="0" err="1"/>
                         <a:t>roh:ResearchLine</a:t>
                       </a:r>
                       <a:r>
-                        <a:rPr lang="en-GB" sz="1000" dirty="0"/>
+                        <a:rPr lang="en-GB" sz="900" dirty="0"/>
                         <a:t> y </a:t>
                       </a:r>
                       <a:r>
-                        <a:rPr lang="en-GB" sz="1000" dirty="0" err="1"/>
+                        <a:rPr lang="en-GB" sz="900" dirty="0" err="1"/>
                         <a:t>rohes:KnowledgeArea</a:t>
                       </a:r>
-                      <a:endParaRPr lang="en-GB" sz="1000" dirty="0"/>
+                      <a:endParaRPr lang="en-GB" sz="900" dirty="0"/>
                     </a:p>
                   </a:txBody>
                   <a:tcPr/>
@@ -7034,7 +7158,7 @@
                     <a:p>
                       <a:pPr algn="ctr" fontAlgn="b"/>
                       <a:r>
-                        <a:rPr lang="es-ES" sz="1000" kern="1200" dirty="0">
+                        <a:rPr lang="es-ES" sz="900" kern="1200" dirty="0">
                           <a:solidFill>
                             <a:schemeClr val="dk1"/>
                           </a:solidFill>
@@ -7055,19 +7179,19 @@
                     <a:p>
                       <a:pPr algn="l" fontAlgn="b"/>
                       <a:r>
-                        <a:rPr lang="es-ES" sz="1000" kern="1200" dirty="0">
+                        <a:rPr lang="es-ES" sz="900" kern="1200" dirty="0">
                           <a:solidFill>
                             <a:schemeClr val="dk1"/>
                           </a:solidFill>
                           <a:latin typeface="+mn-lt"/>
                           <a:ea typeface="+mn-ea"/>
                           <a:cs typeface="+mn-cs"/>
-                          <a:hlinkClick r:id="rId7"/>
+                          <a:hlinkClick r:id="rId9"/>
                         </a:rPr>
                         <a:t>http://vivoweb.org/ontology/core</a:t>
                       </a:r>
                       <a:r>
-                        <a:rPr lang="es-ES" sz="1000" kern="1200" dirty="0">
+                        <a:rPr lang="es-ES" sz="900" kern="1200" dirty="0">
                           <a:solidFill>
                             <a:schemeClr val="dk1"/>
                           </a:solidFill>
@@ -7087,51 +7211,51 @@
                     <a:lstStyle/>
                     <a:p>
                       <a:r>
-                        <a:rPr lang="en-GB" sz="1000" dirty="0" err="1"/>
+                        <a:rPr lang="en-GB" sz="900" dirty="0" err="1"/>
                         <a:t>Utilizada</a:t>
                       </a:r>
                       <a:r>
-                        <a:rPr lang="en-GB" sz="1000" dirty="0"/>
+                        <a:rPr lang="en-GB" sz="900" dirty="0"/>
                         <a:t> </a:t>
                       </a:r>
                       <a:r>
-                        <a:rPr lang="en-GB" sz="1000" dirty="0" err="1"/>
+                        <a:rPr lang="en-GB" sz="900" dirty="0" err="1"/>
                         <a:t>ampliamente</a:t>
                       </a:r>
                       <a:r>
-                        <a:rPr lang="en-GB" sz="1000" dirty="0"/>
+                        <a:rPr lang="en-GB" sz="900" dirty="0"/>
                         <a:t> </a:t>
                       </a:r>
                       <a:r>
-                        <a:rPr lang="en-GB" sz="1000" dirty="0" err="1"/>
+                        <a:rPr lang="en-GB" sz="900" dirty="0" err="1"/>
                         <a:t>en</a:t>
                       </a:r>
                       <a:r>
-                        <a:rPr lang="en-GB" sz="1000" dirty="0"/>
+                        <a:rPr lang="en-GB" sz="900" dirty="0"/>
                         <a:t> ROH. </a:t>
                       </a:r>
                       <a:r>
-                        <a:rPr lang="en-GB" sz="1000" dirty="0" err="1"/>
+                        <a:rPr lang="en-GB" sz="900" dirty="0" err="1"/>
                         <a:t>Reutilizados</a:t>
                       </a:r>
                       <a:r>
-                        <a:rPr lang="en-GB" sz="1000" dirty="0"/>
+                        <a:rPr lang="en-GB" sz="900" dirty="0"/>
                         <a:t> los </a:t>
                       </a:r>
                       <a:r>
-                        <a:rPr lang="en-GB" sz="1000" dirty="0" err="1"/>
+                        <a:rPr lang="en-GB" sz="900" dirty="0" err="1"/>
                         <a:t>siguientes</a:t>
                       </a:r>
                       <a:r>
-                        <a:rPr lang="en-GB" sz="1000" dirty="0"/>
+                        <a:rPr lang="en-GB" sz="900" dirty="0"/>
                         <a:t> </a:t>
                       </a:r>
                       <a:r>
-                        <a:rPr lang="en-GB" sz="1000" dirty="0" err="1"/>
+                        <a:rPr lang="en-GB" sz="900" dirty="0" err="1"/>
                         <a:t>conceptos</a:t>
                       </a:r>
                       <a:r>
-                        <a:rPr lang="en-GB" sz="1000" dirty="0"/>
+                        <a:rPr lang="en-GB" sz="900" dirty="0"/>
                         <a:t>:</a:t>
                       </a:r>
                     </a:p>
@@ -7141,35 +7265,35 @@
                         <a:buChar char="•"/>
                       </a:pPr>
                       <a:r>
-                        <a:rPr lang="en-GB" sz="1000" dirty="0" err="1"/>
+                        <a:rPr lang="en-GB" sz="900" dirty="0" err="1"/>
                         <a:t>Vivo:DateTimeInterval</a:t>
                       </a:r>
                       <a:r>
-                        <a:rPr lang="en-GB" sz="1000" dirty="0"/>
+                        <a:rPr lang="en-GB" sz="900" dirty="0"/>
                         <a:t> para </a:t>
                       </a:r>
                       <a:r>
-                        <a:rPr lang="en-GB" sz="1000" dirty="0" err="1"/>
+                        <a:rPr lang="en-GB" sz="900" dirty="0" err="1"/>
                         <a:t>especificar</a:t>
                       </a:r>
                       <a:r>
-                        <a:rPr lang="en-GB" sz="1000" dirty="0"/>
+                        <a:rPr lang="en-GB" sz="900" dirty="0"/>
                         <a:t> </a:t>
                       </a:r>
                       <a:r>
-                        <a:rPr lang="en-GB" sz="1000" dirty="0" err="1"/>
+                        <a:rPr lang="en-GB" sz="900" dirty="0" err="1"/>
                         <a:t>relaciones</a:t>
                       </a:r>
                       <a:r>
-                        <a:rPr lang="en-GB" sz="1000" dirty="0"/>
+                        <a:rPr lang="en-GB" sz="900" dirty="0"/>
                         <a:t> </a:t>
                       </a:r>
                       <a:r>
-                        <a:rPr lang="en-GB" sz="1000" dirty="0" err="1"/>
+                        <a:rPr lang="en-GB" sz="900" dirty="0" err="1"/>
                         <a:t>asociadas</a:t>
                       </a:r>
                       <a:r>
-                        <a:rPr lang="en-GB" sz="1000" dirty="0"/>
+                        <a:rPr lang="en-GB" sz="900" dirty="0"/>
                         <a:t> a un period temporal</a:t>
                       </a:r>
                     </a:p>
@@ -7179,7 +7303,7 @@
                         <a:buChar char="•"/>
                       </a:pPr>
                       <a:r>
-                        <a:rPr lang="en-GB" sz="1000" dirty="0"/>
+                        <a:rPr lang="en-GB" sz="900" dirty="0"/>
                         <a:t>Position</a:t>
                       </a:r>
                     </a:p>
@@ -7189,10 +7313,10 @@
                         <a:buChar char="•"/>
                       </a:pPr>
                       <a:r>
-                        <a:rPr lang="en-GB" sz="1000" dirty="0" err="1"/>
+                        <a:rPr lang="en-GB" sz="900" dirty="0" err="1"/>
                         <a:t>AcademicDegree</a:t>
                       </a:r>
-                      <a:endParaRPr lang="en-GB" sz="1000" dirty="0"/>
+                      <a:endParaRPr lang="en-GB" sz="900" dirty="0"/>
                     </a:p>
                     <a:p>
                       <a:pPr marL="285750" lvl="0" indent="-285750">
@@ -7200,17 +7324,17 @@
                         <a:buChar char="•"/>
                       </a:pPr>
                       <a:r>
-                        <a:rPr lang="en-GB" sz="1000" dirty="0" err="1"/>
+                        <a:rPr lang="en-GB" sz="900" dirty="0" err="1"/>
                         <a:t>AwardedDegree</a:t>
                       </a:r>
-                      <a:endParaRPr lang="en-GB" sz="1000" dirty="0"/>
+                      <a:endParaRPr lang="en-GB" sz="900" dirty="0"/>
                     </a:p>
                     <a:p>
                       <a:pPr marL="285750" lvl="0" indent="-285750">
                         <a:buFont typeface="Arial" panose="020B0604020202020204" pitchFamily="34" charset="0"/>
                         <a:buChar char="•"/>
                       </a:pPr>
-                      <a:endParaRPr lang="en-GB" sz="1000" dirty="0"/>
+                      <a:endParaRPr lang="en-GB" sz="900" dirty="0"/>
                     </a:p>
                   </a:txBody>
                   <a:tcPr/>
@@ -7229,7 +7353,7 @@
                     <a:p>
                       <a:pPr algn="ctr" fontAlgn="b"/>
                       <a:r>
-                        <a:rPr lang="es-ES" sz="1000" kern="1200" dirty="0" err="1">
+                        <a:rPr lang="es-ES" sz="900" kern="1200" dirty="0" err="1">
                           <a:solidFill>
                             <a:schemeClr val="dk1"/>
                           </a:solidFill>
@@ -7239,7 +7363,7 @@
                         </a:rPr>
                         <a:t>roh</a:t>
                       </a:r>
-                      <a:endParaRPr lang="es-ES" sz="1000" kern="1200" dirty="0">
+                      <a:endParaRPr lang="es-ES" sz="900" kern="1200" dirty="0">
                         <a:solidFill>
                           <a:schemeClr val="dk1"/>
                         </a:solidFill>
@@ -7258,19 +7382,19 @@
                     <a:p>
                       <a:pPr algn="l" fontAlgn="b"/>
                       <a:r>
-                        <a:rPr lang="es-ES" sz="1000" kern="1200" dirty="0">
+                        <a:rPr lang="es-ES" sz="900" kern="1200" dirty="0">
                           <a:solidFill>
                             <a:schemeClr val="dk1"/>
                           </a:solidFill>
                           <a:latin typeface="+mn-lt"/>
                           <a:ea typeface="+mn-ea"/>
                           <a:cs typeface="+mn-cs"/>
-                          <a:hlinkClick r:id="rId8"/>
+                          <a:hlinkClick r:id="rId10"/>
                         </a:rPr>
                         <a:t>http://purl.org/roh</a:t>
                       </a:r>
                       <a:r>
-                        <a:rPr lang="es-ES" sz="1000" kern="1200" dirty="0">
+                        <a:rPr lang="es-ES" sz="900" kern="1200" dirty="0">
                           <a:solidFill>
                             <a:schemeClr val="dk1"/>
                           </a:solidFill>
@@ -7290,63 +7414,63 @@
                     <a:lstStyle/>
                     <a:p>
                       <a:r>
-                        <a:rPr lang="en-GB" sz="1000" dirty="0"/>
+                        <a:rPr lang="en-GB" sz="900" dirty="0"/>
                         <a:t>Ha </a:t>
                       </a:r>
                       <a:r>
-                        <a:rPr lang="en-GB" sz="1000" dirty="0" err="1"/>
+                        <a:rPr lang="en-GB" sz="900" dirty="0" err="1"/>
                         <a:t>definido</a:t>
                       </a:r>
                       <a:r>
-                        <a:rPr lang="en-GB" sz="1000" dirty="0"/>
+                        <a:rPr lang="en-GB" sz="900" dirty="0"/>
                         <a:t> los </a:t>
                       </a:r>
                       <a:r>
-                        <a:rPr lang="en-GB" sz="1000" dirty="0" err="1"/>
+                        <a:rPr lang="en-GB" sz="900" dirty="0" err="1"/>
                         <a:t>siguientes</a:t>
                       </a:r>
                       <a:r>
-                        <a:rPr lang="en-GB" sz="1000" dirty="0"/>
+                        <a:rPr lang="en-GB" sz="900" dirty="0"/>
                         <a:t> </a:t>
                       </a:r>
                       <a:r>
-                        <a:rPr lang="en-GB" sz="1000" dirty="0" err="1"/>
+                        <a:rPr lang="en-GB" sz="900" dirty="0" err="1"/>
                         <a:t>conceptos</a:t>
                       </a:r>
                       <a:r>
-                        <a:rPr lang="en-GB" sz="1000" dirty="0"/>
+                        <a:rPr lang="en-GB" sz="900" dirty="0"/>
                         <a:t>, </a:t>
                       </a:r>
                       <a:r>
-                        <a:rPr lang="en-GB" sz="1000" dirty="0" err="1"/>
+                        <a:rPr lang="en-GB" sz="900" dirty="0" err="1"/>
                         <a:t>reutilizando</a:t>
                       </a:r>
                       <a:r>
-                        <a:rPr lang="en-GB" sz="1000" dirty="0"/>
+                        <a:rPr lang="en-GB" sz="900" dirty="0"/>
                         <a:t> </a:t>
                       </a:r>
                       <a:r>
-                        <a:rPr lang="en-GB" sz="1000" dirty="0" err="1"/>
+                        <a:rPr lang="en-GB" sz="900" dirty="0" err="1"/>
                         <a:t>conceptos</a:t>
                       </a:r>
                       <a:r>
-                        <a:rPr lang="en-GB" sz="1000" dirty="0"/>
+                        <a:rPr lang="en-GB" sz="900" dirty="0"/>
                         <a:t> de </a:t>
                       </a:r>
                       <a:r>
-                        <a:rPr lang="en-GB" sz="1000" dirty="0" err="1"/>
+                        <a:rPr lang="en-GB" sz="900" dirty="0" err="1"/>
                         <a:t>otras</a:t>
                       </a:r>
                       <a:r>
-                        <a:rPr lang="en-GB" sz="1000" dirty="0"/>
+                        <a:rPr lang="en-GB" sz="900" dirty="0"/>
                         <a:t> </a:t>
                       </a:r>
                       <a:r>
-                        <a:rPr lang="en-GB" sz="1000" dirty="0" err="1"/>
+                        <a:rPr lang="en-GB" sz="900" dirty="0" err="1"/>
                         <a:t>ontologías</a:t>
                       </a:r>
                       <a:r>
-                        <a:rPr lang="en-GB" sz="1000" dirty="0"/>
+                        <a:rPr lang="en-GB" sz="900" dirty="0"/>
                         <a:t>:</a:t>
                       </a:r>
                     </a:p>
@@ -7356,31 +7480,31 @@
                         <a:buChar char="•"/>
                       </a:pPr>
                       <a:r>
-                        <a:rPr lang="en-GB" sz="1000" dirty="0"/>
+                        <a:rPr lang="en-GB" sz="900" dirty="0"/>
                         <a:t>Activity </a:t>
                       </a:r>
                       <a:r>
-                        <a:rPr lang="en-GB" sz="1000" dirty="0" err="1"/>
+                        <a:rPr lang="en-GB" sz="900" dirty="0" err="1"/>
                         <a:t>heredada</a:t>
                       </a:r>
                       <a:r>
-                        <a:rPr lang="en-GB" sz="1000" dirty="0"/>
+                        <a:rPr lang="en-GB" sz="900" dirty="0"/>
                         <a:t> de </a:t>
                       </a:r>
                       <a:r>
-                        <a:rPr lang="en-GB" sz="1000" dirty="0" err="1"/>
+                        <a:rPr lang="en-GB" sz="900" dirty="0" err="1"/>
                         <a:t>Vivo:DateTimeInterval</a:t>
                       </a:r>
                       <a:r>
-                        <a:rPr lang="en-GB" sz="1000" dirty="0"/>
+                        <a:rPr lang="en-GB" sz="900" dirty="0"/>
                         <a:t>, </a:t>
                       </a:r>
                       <a:r>
-                        <a:rPr lang="en-GB" sz="1000" dirty="0" err="1"/>
+                        <a:rPr lang="en-GB" sz="900" dirty="0" err="1"/>
                         <a:t>también</a:t>
                       </a:r>
                       <a:r>
-                        <a:rPr lang="en-GB" sz="1000" dirty="0"/>
+                        <a:rPr lang="en-GB" sz="900" dirty="0"/>
                         <a:t> Position, Project, Role</a:t>
                       </a:r>
                     </a:p>
@@ -7390,15 +7514,15 @@
                         <a:buChar char="•"/>
                       </a:pPr>
                       <a:r>
-                        <a:rPr lang="en-GB" sz="1000" dirty="0"/>
+                        <a:rPr lang="en-GB" sz="900" dirty="0"/>
                         <a:t>Contract </a:t>
                       </a:r>
                       <a:r>
-                        <a:rPr lang="en-GB" sz="1000" dirty="0" err="1"/>
+                        <a:rPr lang="en-GB" sz="900" dirty="0" err="1"/>
                         <a:t>asociado</a:t>
                       </a:r>
                       <a:r>
-                        <a:rPr lang="en-GB" sz="1000" dirty="0"/>
+                        <a:rPr lang="en-GB" sz="900" dirty="0"/>
                         <a:t> a Proyecto, Organization y Person </a:t>
                       </a:r>
                     </a:p>
@@ -7408,26 +7532,26 @@
                         <a:buChar char="•"/>
                       </a:pPr>
                       <a:r>
-                        <a:rPr lang="en-GB" sz="1000" dirty="0" err="1"/>
+                        <a:rPr lang="en-GB" sz="900" dirty="0" err="1"/>
                         <a:t>PhDThesis</a:t>
                       </a:r>
                       <a:r>
-                        <a:rPr lang="en-GB" sz="1000" dirty="0"/>
+                        <a:rPr lang="en-GB" sz="900" dirty="0"/>
                         <a:t> </a:t>
                       </a:r>
                       <a:r>
-                        <a:rPr lang="en-GB" sz="1000" dirty="0" err="1"/>
+                        <a:rPr lang="en-GB" sz="900" dirty="0" err="1"/>
                         <a:t>hereda</a:t>
                       </a:r>
                       <a:r>
-                        <a:rPr lang="en-GB" sz="1000" dirty="0"/>
+                        <a:rPr lang="en-GB" sz="900" dirty="0"/>
                         <a:t> de </a:t>
                       </a:r>
                       <a:r>
-                        <a:rPr lang="en-GB" sz="1000" dirty="0" err="1"/>
+                        <a:rPr lang="en-GB" sz="900" dirty="0" err="1"/>
                         <a:t>bibo:Thesis</a:t>
                       </a:r>
-                      <a:endParaRPr lang="en-GB" sz="1000" dirty="0"/>
+                      <a:endParaRPr lang="en-GB" sz="900" dirty="0"/>
                     </a:p>
                     <a:p>
                       <a:pPr marL="285750" indent="-285750">
@@ -7435,34 +7559,34 @@
                         <a:buChar char="•"/>
                       </a:pPr>
                       <a:r>
-                        <a:rPr lang="en-GB" sz="1000" dirty="0" err="1"/>
+                        <a:rPr lang="en-GB" sz="900" dirty="0" err="1"/>
                         <a:t>NonAcademicPosition</a:t>
                       </a:r>
                       <a:r>
-                        <a:rPr lang="en-GB" sz="1000" dirty="0"/>
+                        <a:rPr lang="en-GB" sz="900" dirty="0"/>
                         <a:t> y </a:t>
                       </a:r>
                       <a:r>
-                        <a:rPr lang="en-GB" sz="1000" dirty="0" err="1"/>
+                        <a:rPr lang="en-GB" sz="900" dirty="0" err="1"/>
                         <a:t>AcademicPosition</a:t>
                       </a:r>
                       <a:r>
-                        <a:rPr lang="en-GB" sz="1000" dirty="0"/>
+                        <a:rPr lang="en-GB" sz="900" dirty="0"/>
                         <a:t> </a:t>
                       </a:r>
                       <a:r>
-                        <a:rPr lang="en-GB" sz="1000" dirty="0" err="1"/>
+                        <a:rPr lang="en-GB" sz="900" dirty="0" err="1"/>
                         <a:t>heredan</a:t>
                       </a:r>
                       <a:r>
-                        <a:rPr lang="en-GB" sz="1000" dirty="0"/>
+                        <a:rPr lang="en-GB" sz="900" dirty="0"/>
                         <a:t> de </a:t>
                       </a:r>
                       <a:r>
-                        <a:rPr lang="en-GB" sz="1000" dirty="0" err="1"/>
+                        <a:rPr lang="en-GB" sz="900" dirty="0" err="1"/>
                         <a:t>vivo:Position</a:t>
                       </a:r>
-                      <a:endParaRPr lang="en-GB" sz="1000" dirty="0"/>
+                      <a:endParaRPr lang="en-GB" sz="900" dirty="0"/>
                     </a:p>
                     <a:p>
                       <a:pPr marL="285750" indent="-285750" algn="l">
@@ -7470,14 +7594,14 @@
                         <a:buChar char="•"/>
                       </a:pPr>
                       <a:r>
-                        <a:rPr lang="en-GB" sz="1000" dirty="0"/>
+                        <a:rPr lang="en-GB" sz="900" dirty="0"/>
                         <a:t>Project y </a:t>
                       </a:r>
                       <a:r>
-                        <a:rPr lang="en-GB" sz="1000" dirty="0" err="1"/>
+                        <a:rPr lang="en-GB" sz="900" dirty="0" err="1"/>
                         <a:t>ProjectExpense</a:t>
                       </a:r>
-                      <a:endParaRPr lang="en-GB" sz="1000" dirty="0"/>
+                      <a:endParaRPr lang="en-GB" sz="900" dirty="0"/>
                     </a:p>
                     <a:p>
                       <a:pPr marL="285750" indent="-285750" algn="l">
@@ -7485,22 +7609,22 @@
                         <a:buChar char="•"/>
                       </a:pPr>
                       <a:r>
-                        <a:rPr lang="en-GB" sz="1000" dirty="0"/>
+                        <a:rPr lang="en-GB" sz="900" dirty="0"/>
                         <a:t>Funder, Funding, </a:t>
                       </a:r>
                       <a:r>
-                        <a:rPr lang="en-GB" sz="1000" dirty="0" err="1"/>
+                        <a:rPr lang="en-GB" sz="900" dirty="0" err="1"/>
                         <a:t>FundingProgramme</a:t>
                       </a:r>
                       <a:r>
-                        <a:rPr lang="en-GB" sz="1000" dirty="0"/>
+                        <a:rPr lang="en-GB" sz="900" dirty="0"/>
                         <a:t>, </a:t>
                       </a:r>
                       <a:r>
-                        <a:rPr lang="en-GB" sz="1000" dirty="0" err="1"/>
+                        <a:rPr lang="en-GB" sz="900" dirty="0" err="1"/>
                         <a:t>FundingAmount</a:t>
                       </a:r>
-                      <a:endParaRPr lang="en-GB" sz="1000" dirty="0"/>
+                      <a:endParaRPr lang="en-GB" sz="900" dirty="0"/>
                     </a:p>
                     <a:p>
                       <a:pPr marL="285750" indent="-285750" algn="l">
@@ -7508,26 +7632,26 @@
                         <a:buChar char="•"/>
                       </a:pPr>
                       <a:r>
-                        <a:rPr lang="en-GB" sz="1000" dirty="0" err="1"/>
+                        <a:rPr lang="en-GB" sz="900" dirty="0" err="1"/>
                         <a:t>GeographicalScope</a:t>
                       </a:r>
                       <a:r>
-                        <a:rPr lang="en-GB" sz="1000" dirty="0"/>
+                        <a:rPr lang="en-GB" sz="900" dirty="0"/>
                         <a:t> </a:t>
                       </a:r>
                       <a:r>
-                        <a:rPr lang="en-GB" sz="1000" dirty="0" err="1"/>
+                        <a:rPr lang="en-GB" sz="900" dirty="0" err="1"/>
                         <a:t>heredad</a:t>
                       </a:r>
                       <a:r>
-                        <a:rPr lang="en-GB" sz="1000" dirty="0"/>
+                        <a:rPr lang="en-GB" sz="900" dirty="0"/>
                         <a:t> </a:t>
                       </a:r>
                       <a:r>
-                        <a:rPr lang="en-GB" sz="1000" dirty="0" err="1"/>
+                        <a:rPr lang="en-GB" sz="900" dirty="0" err="1"/>
                         <a:t>gn:GeoScopeFeatures</a:t>
                       </a:r>
-                      <a:endParaRPr lang="en-GB" sz="1000" dirty="0"/>
+                      <a:endParaRPr lang="en-GB" sz="900" dirty="0"/>
                     </a:p>
                     <a:p>
                       <a:pPr marL="285750" indent="-285750" algn="l">
@@ -7535,22 +7659,22 @@
                         <a:buChar char="•"/>
                       </a:pPr>
                       <a:r>
-                        <a:rPr lang="en-GB" sz="1000" dirty="0"/>
+                        <a:rPr lang="en-GB" sz="900" dirty="0"/>
                         <a:t>Researcher </a:t>
                       </a:r>
                       <a:r>
-                        <a:rPr lang="en-GB" sz="1000" dirty="0" err="1"/>
+                        <a:rPr lang="en-GB" sz="900" dirty="0" err="1"/>
                         <a:t>hereda</a:t>
                       </a:r>
                       <a:r>
-                        <a:rPr lang="en-GB" sz="1000" dirty="0"/>
+                        <a:rPr lang="en-GB" sz="900" dirty="0"/>
                         <a:t> de </a:t>
                       </a:r>
                       <a:r>
-                        <a:rPr lang="en-GB" sz="1000" dirty="0" err="1"/>
+                        <a:rPr lang="en-GB" sz="900" dirty="0" err="1"/>
                         <a:t>foaf:Person</a:t>
                       </a:r>
-                      <a:endParaRPr lang="en-GB" sz="1000" dirty="0"/>
+                      <a:endParaRPr lang="en-GB" sz="900" dirty="0"/>
                     </a:p>
                     <a:p>
                       <a:pPr marL="285750" indent="-285750" algn="l">
@@ -7558,77 +7682,77 @@
                         <a:buChar char="•"/>
                       </a:pPr>
                       <a:r>
-                        <a:rPr lang="en-GB" sz="1000" dirty="0" err="1"/>
+                        <a:rPr lang="en-GB" sz="900" dirty="0" err="1"/>
                         <a:t>Añadido</a:t>
                       </a:r>
                       <a:r>
-                        <a:rPr lang="en-GB" sz="1000" dirty="0"/>
+                        <a:rPr lang="en-GB" sz="900" dirty="0"/>
                         <a:t> </a:t>
                       </a:r>
                       <a:r>
-                        <a:rPr lang="en-GB" sz="1000" dirty="0" err="1"/>
+                        <a:rPr lang="en-GB" sz="900" dirty="0" err="1"/>
                         <a:t>roh:Proposal</a:t>
                       </a:r>
                       <a:r>
-                        <a:rPr lang="en-GB" sz="1000" dirty="0"/>
+                        <a:rPr lang="en-GB" sz="900" dirty="0"/>
                         <a:t> de </a:t>
                       </a:r>
                       <a:r>
-                        <a:rPr lang="en-GB" sz="1000" dirty="0" err="1"/>
+                        <a:rPr lang="en-GB" sz="900" dirty="0" err="1"/>
                         <a:t>bibo:Document</a:t>
                       </a:r>
                       <a:r>
-                        <a:rPr lang="en-GB" sz="1000" dirty="0"/>
+                        <a:rPr lang="en-GB" sz="900" dirty="0"/>
                         <a:t> para </a:t>
                       </a:r>
                       <a:r>
-                        <a:rPr lang="en-GB" sz="1000" dirty="0" err="1"/>
+                        <a:rPr lang="en-GB" sz="900" dirty="0" err="1"/>
                         <a:t>así</a:t>
                       </a:r>
                       <a:r>
-                        <a:rPr lang="en-GB" sz="1000" dirty="0"/>
+                        <a:rPr lang="en-GB" sz="900" dirty="0"/>
                         <a:t> </a:t>
                       </a:r>
                       <a:r>
-                        <a:rPr lang="en-GB" sz="1000" dirty="0" err="1"/>
+                        <a:rPr lang="en-GB" sz="900" dirty="0" err="1"/>
                         <a:t>poder</a:t>
                       </a:r>
                       <a:r>
-                        <a:rPr lang="en-GB" sz="1000" dirty="0"/>
+                        <a:rPr lang="en-GB" sz="900" dirty="0"/>
                         <a:t> </a:t>
                       </a:r>
                       <a:r>
-                        <a:rPr lang="en-GB" sz="1000" dirty="0" err="1"/>
+                        <a:rPr lang="en-GB" sz="900" dirty="0" err="1"/>
                         <a:t>asociar</a:t>
                       </a:r>
                       <a:r>
-                        <a:rPr lang="en-GB" sz="1000" dirty="0"/>
+                        <a:rPr lang="en-GB" sz="900" dirty="0"/>
                         <a:t> la </a:t>
                       </a:r>
                       <a:r>
-                        <a:rPr lang="en-GB" sz="1000" dirty="0" err="1"/>
+                        <a:rPr lang="en-GB" sz="900" dirty="0" err="1"/>
                         <a:t>memoria</a:t>
                       </a:r>
                       <a:r>
-                        <a:rPr lang="en-GB" sz="1000" dirty="0"/>
+                        <a:rPr lang="en-GB" sz="900" dirty="0"/>
                         <a:t> de la </a:t>
                       </a:r>
                       <a:r>
-                        <a:rPr lang="en-GB" sz="1000" dirty="0" err="1"/>
+                        <a:rPr lang="en-GB" sz="900" dirty="0" err="1"/>
                         <a:t>propuesta</a:t>
                       </a:r>
                       <a:r>
-                        <a:rPr lang="en-GB" sz="1000" dirty="0"/>
+                        <a:rPr lang="en-GB" sz="900" dirty="0"/>
                         <a:t> a un </a:t>
                       </a:r>
                       <a:r>
-                        <a:rPr lang="en-GB" sz="1000" dirty="0" err="1"/>
+                        <a:rPr lang="en-GB" sz="900" dirty="0" err="1"/>
                         <a:t>proyecto</a:t>
                       </a:r>
-                      <a:endParaRPr lang="en-GB" sz="1000" dirty="0"/>
+                      <a:endParaRPr lang="en-GB" sz="900" dirty="0"/>
                     </a:p>
                     <a:p>
-                      <a:endParaRPr lang="en-GB" sz="1000" dirty="0"/>
+                      <a:endParaRPr lang="en-GB" sz="900" dirty="0"/>
                     </a:p>
                   </a:txBody>
                   <a:tcPr/>

</xml_diff>

<commit_message>
actualizado con cambios introducidos por Iñigo para convertir programa en servicio RESTful
</commit_message>
<xml_diff>
--- a/20200109 HERCULES ASIO -ROH-Validación.pptx
+++ b/20200109 HERCULES ASIO -ROH-Validación.pptx
@@ -251,7 +251,7 @@
           <a:p>
             <a:fld id="{56E48EA3-3722-4C34-A311-3963E6171647}" type="datetimeFigureOut">
               <a:rPr lang="en-GB" smtClean="0"/>
-              <a:t>06/02/2020</a:t>
+              <a:t>17/02/2020</a:t>
             </a:fld>
             <a:endParaRPr lang="en-GB"/>
           </a:p>
@@ -3947,7 +3947,19 @@
             </a:pPr>
             <a:r>
               <a:rPr lang="es-ES" sz="2000" dirty="0"/>
-              <a:t>El objetivo de esta revisión es ver qué entraría dentro del SCOPE del proyecto y qué no. </a:t>
+              <a:t>El objetivo de esta revisión es ver qué entraría dentro del </a:t>
+            </a:r>
+            <a:r>
+              <a:rPr lang="es-ES" sz="2000" dirty="0">
+                <a:highlight>
+                  <a:srgbClr val="FFFF00"/>
+                </a:highlight>
+              </a:rPr>
+              <a:t>ALCANCE del proyecto y qué no</a:t>
+            </a:r>
+            <a:r>
+              <a:rPr lang="es-ES" sz="2000" dirty="0"/>
+              <a:t>. </a:t>
             </a:r>
           </a:p>
           <a:p>
@@ -4064,7 +4076,19 @@
             </a:r>
             <a:r>
               <a:rPr lang="es-ES" sz="1600" dirty="0"/>
-              <a:t>A qué nos referimos orígenes en Proyectos?</a:t>
+              <a:t>A qué nos referimos </a:t>
+            </a:r>
+            <a:r>
+              <a:rPr lang="es-ES" sz="1600" dirty="0">
+                <a:highlight>
+                  <a:srgbClr val="FFFF00"/>
+                </a:highlight>
+              </a:rPr>
+              <a:t>orígenes en Proyectos</a:t>
+            </a:r>
+            <a:r>
+              <a:rPr lang="es-ES" sz="1600" dirty="0"/>
+              <a:t>?</a:t>
             </a:r>
           </a:p>
           <a:p>
@@ -4407,7 +4431,15 @@
             </a:pPr>
             <a:r>
               <a:rPr lang="es-ES" sz="2000" dirty="0"/>
-              <a:t>Las ayudas de Recursos Humanos no están modeladas en ROH</a:t>
+              <a:t>Las </a:t>
+            </a:r>
+            <a:r>
+              <a:rPr lang="es-ES" sz="2000" dirty="0">
+                <a:highlight>
+                  <a:srgbClr val="FFFF00"/>
+                </a:highlight>
+              </a:rPr>
+              <a:t>ayudas de Recursos Humanos no están modeladas en ROH</a:t>
             </a:r>
           </a:p>
           <a:p>

</xml_diff>